<commit_message>
Updates to address splitting lecture
</commit_message>
<xml_diff>
--- a/presentation.pptx
+++ b/presentation.pptx
@@ -4,6 +4,9 @@
   <p:sldMasterIdLst>
     <p:sldMasterId id="2147483648" r:id="rId1"/>
   </p:sldMasterIdLst>
+  <p:notesMasterIdLst>
+    <p:notesMasterId r:id="rId20"/>
+  </p:notesMasterIdLst>
   <p:sldIdLst>
     <p:sldId id="256" r:id="rId2"/>
     <p:sldId id="272" r:id="rId3"/>
@@ -14,10 +17,10 @@
     <p:sldId id="262" r:id="rId8"/>
     <p:sldId id="263" r:id="rId9"/>
     <p:sldId id="264" r:id="rId10"/>
-    <p:sldId id="265" r:id="rId11"/>
-    <p:sldId id="266" r:id="rId12"/>
-    <p:sldId id="274" r:id="rId13"/>
-    <p:sldId id="273" r:id="rId14"/>
+    <p:sldId id="276" r:id="rId11"/>
+    <p:sldId id="275" r:id="rId12"/>
+    <p:sldId id="265" r:id="rId13"/>
+    <p:sldId id="274" r:id="rId14"/>
     <p:sldId id="267" r:id="rId15"/>
     <p:sldId id="268" r:id="rId16"/>
     <p:sldId id="269" r:id="rId17"/>
@@ -121,7 +124,362 @@
       </a:defRPr>
     </a:lvl9pPr>
   </p:defaultTextStyle>
+  <p:extLst>
+    <p:ext uri="{EFAFB233-063F-42B5-8137-9DF3F51BA10A}">
+      <p15:sldGuideLst xmlns:p15="http://schemas.microsoft.com/office/powerpoint/2012/main"/>
+    </p:ext>
+  </p:extLst>
 </p:presentation>
+</file>
+
+<file path=ppt/notesMasters/notesMaster1.xml><?xml version="1.0" encoding="utf-8"?>
+<p:notesMaster xmlns:a="http://schemas.openxmlformats.org/drawingml/2006/main" xmlns:r="http://schemas.openxmlformats.org/officeDocument/2006/relationships" xmlns:p="http://schemas.openxmlformats.org/presentationml/2006/main">
+  <p:cSld>
+    <p:bg>
+      <p:bgRef idx="1001">
+        <a:schemeClr val="bg1"/>
+      </p:bgRef>
+    </p:bg>
+    <p:spTree>
+      <p:nvGrpSpPr>
+        <p:cNvPr id="1" name=""/>
+        <p:cNvGrpSpPr/>
+        <p:nvPr/>
+      </p:nvGrpSpPr>
+      <p:grpSpPr>
+        <a:xfrm>
+          <a:off x="0" y="0"/>
+          <a:ext cx="0" cy="0"/>
+          <a:chOff x="0" y="0"/>
+          <a:chExt cx="0" cy="0"/>
+        </a:xfrm>
+      </p:grpSpPr>
+      <p:sp>
+        <p:nvSpPr>
+          <p:cNvPr id="2" name="Header Placeholder 1"/>
+          <p:cNvSpPr>
+            <a:spLocks noGrp="1"/>
+          </p:cNvSpPr>
+          <p:nvPr>
+            <p:ph type="hdr" sz="quarter"/>
+          </p:nvPr>
+        </p:nvSpPr>
+        <p:spPr>
+          <a:xfrm>
+            <a:off x="0" y="0"/>
+            <a:ext cx="2971800" cy="458788"/>
+          </a:xfrm>
+          <a:prstGeom prst="rect">
+            <a:avLst/>
+          </a:prstGeom>
+        </p:spPr>
+        <p:txBody>
+          <a:bodyPr vert="horz" lIns="91440" tIns="45720" rIns="91440" bIns="45720" rtlCol="0"/>
+          <a:lstStyle>
+            <a:lvl1pPr algn="l">
+              <a:defRPr sz="1200"/>
+            </a:lvl1pPr>
+          </a:lstStyle>
+          <a:p>
+            <a:endParaRPr lang="en-US"/>
+          </a:p>
+        </p:txBody>
+      </p:sp>
+      <p:sp>
+        <p:nvSpPr>
+          <p:cNvPr id="3" name="Date Placeholder 2"/>
+          <p:cNvSpPr>
+            <a:spLocks noGrp="1"/>
+          </p:cNvSpPr>
+          <p:nvPr>
+            <p:ph type="dt" idx="1"/>
+          </p:nvPr>
+        </p:nvSpPr>
+        <p:spPr>
+          <a:xfrm>
+            <a:off x="3884613" y="0"/>
+            <a:ext cx="2971800" cy="458788"/>
+          </a:xfrm>
+          <a:prstGeom prst="rect">
+            <a:avLst/>
+          </a:prstGeom>
+        </p:spPr>
+        <p:txBody>
+          <a:bodyPr vert="horz" lIns="91440" tIns="45720" rIns="91440" bIns="45720" rtlCol="0"/>
+          <a:lstStyle>
+            <a:lvl1pPr algn="r">
+              <a:defRPr sz="1200"/>
+            </a:lvl1pPr>
+          </a:lstStyle>
+          <a:p>
+            <a:fld id="{CDDA71D8-D820-6148-A8C3-6AB93A88404E}" type="datetimeFigureOut">
+              <a:rPr lang="en-US" smtClean="0"/>
+              <a:t>2/24/17</a:t>
+            </a:fld>
+            <a:endParaRPr lang="en-US"/>
+          </a:p>
+        </p:txBody>
+      </p:sp>
+      <p:sp>
+        <p:nvSpPr>
+          <p:cNvPr id="4" name="Slide Image Placeholder 3"/>
+          <p:cNvSpPr>
+            <a:spLocks noGrp="1" noRot="1" noChangeAspect="1"/>
+          </p:cNvSpPr>
+          <p:nvPr>
+            <p:ph type="sldImg" idx="2"/>
+          </p:nvPr>
+        </p:nvSpPr>
+        <p:spPr>
+          <a:xfrm>
+            <a:off x="685800" y="1143000"/>
+            <a:ext cx="5486400" cy="3086100"/>
+          </a:xfrm>
+          <a:prstGeom prst="rect">
+            <a:avLst/>
+          </a:prstGeom>
+          <a:noFill/>
+          <a:ln w="12700">
+            <a:solidFill>
+              <a:prstClr val="black"/>
+            </a:solidFill>
+          </a:ln>
+        </p:spPr>
+        <p:txBody>
+          <a:bodyPr vert="horz" lIns="91440" tIns="45720" rIns="91440" bIns="45720" rtlCol="0" anchor="ctr"/>
+          <a:lstStyle/>
+          <a:p>
+            <a:endParaRPr lang="en-US"/>
+          </a:p>
+        </p:txBody>
+      </p:sp>
+      <p:sp>
+        <p:nvSpPr>
+          <p:cNvPr id="5" name="Notes Placeholder 4"/>
+          <p:cNvSpPr>
+            <a:spLocks noGrp="1"/>
+          </p:cNvSpPr>
+          <p:nvPr>
+            <p:ph type="body" sz="quarter" idx="3"/>
+          </p:nvPr>
+        </p:nvSpPr>
+        <p:spPr>
+          <a:xfrm>
+            <a:off x="685800" y="4400550"/>
+            <a:ext cx="5486400" cy="3600450"/>
+          </a:xfrm>
+          <a:prstGeom prst="rect">
+            <a:avLst/>
+          </a:prstGeom>
+        </p:spPr>
+        <p:txBody>
+          <a:bodyPr vert="horz" lIns="91440" tIns="45720" rIns="91440" bIns="45720" rtlCol="0"/>
+          <a:lstStyle/>
+          <a:p>
+            <a:pPr lvl="0"/>
+            <a:r>
+              <a:rPr lang="en-US" smtClean="0"/>
+              <a:t>Click to edit Master text styles</a:t>
+            </a:r>
+          </a:p>
+          <a:p>
+            <a:pPr lvl="1"/>
+            <a:r>
+              <a:rPr lang="en-US" smtClean="0"/>
+              <a:t>Second level</a:t>
+            </a:r>
+          </a:p>
+          <a:p>
+            <a:pPr lvl="2"/>
+            <a:r>
+              <a:rPr lang="en-US" smtClean="0"/>
+              <a:t>Third level</a:t>
+            </a:r>
+          </a:p>
+          <a:p>
+            <a:pPr lvl="3"/>
+            <a:r>
+              <a:rPr lang="en-US" smtClean="0"/>
+              <a:t>Fourth level</a:t>
+            </a:r>
+          </a:p>
+          <a:p>
+            <a:pPr lvl="4"/>
+            <a:r>
+              <a:rPr lang="en-US" smtClean="0"/>
+              <a:t>Fifth level</a:t>
+            </a:r>
+            <a:endParaRPr lang="en-US"/>
+          </a:p>
+        </p:txBody>
+      </p:sp>
+      <p:sp>
+        <p:nvSpPr>
+          <p:cNvPr id="6" name="Footer Placeholder 5"/>
+          <p:cNvSpPr>
+            <a:spLocks noGrp="1"/>
+          </p:cNvSpPr>
+          <p:nvPr>
+            <p:ph type="ftr" sz="quarter" idx="4"/>
+          </p:nvPr>
+        </p:nvSpPr>
+        <p:spPr>
+          <a:xfrm>
+            <a:off x="0" y="8685213"/>
+            <a:ext cx="2971800" cy="458787"/>
+          </a:xfrm>
+          <a:prstGeom prst="rect">
+            <a:avLst/>
+          </a:prstGeom>
+        </p:spPr>
+        <p:txBody>
+          <a:bodyPr vert="horz" lIns="91440" tIns="45720" rIns="91440" bIns="45720" rtlCol="0" anchor="b"/>
+          <a:lstStyle>
+            <a:lvl1pPr algn="l">
+              <a:defRPr sz="1200"/>
+            </a:lvl1pPr>
+          </a:lstStyle>
+          <a:p>
+            <a:endParaRPr lang="en-US"/>
+          </a:p>
+        </p:txBody>
+      </p:sp>
+      <p:sp>
+        <p:nvSpPr>
+          <p:cNvPr id="7" name="Slide Number Placeholder 6"/>
+          <p:cNvSpPr>
+            <a:spLocks noGrp="1"/>
+          </p:cNvSpPr>
+          <p:nvPr>
+            <p:ph type="sldNum" sz="quarter" idx="5"/>
+          </p:nvPr>
+        </p:nvSpPr>
+        <p:spPr>
+          <a:xfrm>
+            <a:off x="3884613" y="8685213"/>
+            <a:ext cx="2971800" cy="458787"/>
+          </a:xfrm>
+          <a:prstGeom prst="rect">
+            <a:avLst/>
+          </a:prstGeom>
+        </p:spPr>
+        <p:txBody>
+          <a:bodyPr vert="horz" lIns="91440" tIns="45720" rIns="91440" bIns="45720" rtlCol="0" anchor="b"/>
+          <a:lstStyle>
+            <a:lvl1pPr algn="r">
+              <a:defRPr sz="1200"/>
+            </a:lvl1pPr>
+          </a:lstStyle>
+          <a:p>
+            <a:fld id="{68730D83-1156-A042-8EF2-668C780FFFA2}" type="slidenum">
+              <a:rPr lang="en-US" smtClean="0"/>
+              <a:t>‹#›</a:t>
+            </a:fld>
+            <a:endParaRPr lang="en-US"/>
+          </a:p>
+        </p:txBody>
+      </p:sp>
+    </p:spTree>
+    <p:extLst>
+      <p:ext uri="{BB962C8B-B14F-4D97-AF65-F5344CB8AC3E}">
+        <p14:creationId xmlns:p14="http://schemas.microsoft.com/office/powerpoint/2010/main" val="1443905952"/>
+      </p:ext>
+    </p:extLst>
+  </p:cSld>
+  <p:clrMap bg1="lt1" tx1="dk1" bg2="lt2" tx2="dk2" accent1="accent1" accent2="accent2" accent3="accent3" accent4="accent4" accent5="accent5" accent6="accent6" hlink="hlink" folHlink="folHlink"/>
+  <p:notesStyle>
+    <a:lvl1pPr marL="0" algn="l" defTabSz="914400" rtl="0" eaLnBrk="1" latinLnBrk="0" hangingPunct="1">
+      <a:defRPr sz="1200" kern="1200">
+        <a:solidFill>
+          <a:schemeClr val="tx1"/>
+        </a:solidFill>
+        <a:latin typeface="+mn-lt"/>
+        <a:ea typeface="+mn-ea"/>
+        <a:cs typeface="+mn-cs"/>
+      </a:defRPr>
+    </a:lvl1pPr>
+    <a:lvl2pPr marL="457200" algn="l" defTabSz="914400" rtl="0" eaLnBrk="1" latinLnBrk="0" hangingPunct="1">
+      <a:defRPr sz="1200" kern="1200">
+        <a:solidFill>
+          <a:schemeClr val="tx1"/>
+        </a:solidFill>
+        <a:latin typeface="+mn-lt"/>
+        <a:ea typeface="+mn-ea"/>
+        <a:cs typeface="+mn-cs"/>
+      </a:defRPr>
+    </a:lvl2pPr>
+    <a:lvl3pPr marL="914400" algn="l" defTabSz="914400" rtl="0" eaLnBrk="1" latinLnBrk="0" hangingPunct="1">
+      <a:defRPr sz="1200" kern="1200">
+        <a:solidFill>
+          <a:schemeClr val="tx1"/>
+        </a:solidFill>
+        <a:latin typeface="+mn-lt"/>
+        <a:ea typeface="+mn-ea"/>
+        <a:cs typeface="+mn-cs"/>
+      </a:defRPr>
+    </a:lvl3pPr>
+    <a:lvl4pPr marL="1371600" algn="l" defTabSz="914400" rtl="0" eaLnBrk="1" latinLnBrk="0" hangingPunct="1">
+      <a:defRPr sz="1200" kern="1200">
+        <a:solidFill>
+          <a:schemeClr val="tx1"/>
+        </a:solidFill>
+        <a:latin typeface="+mn-lt"/>
+        <a:ea typeface="+mn-ea"/>
+        <a:cs typeface="+mn-cs"/>
+      </a:defRPr>
+    </a:lvl4pPr>
+    <a:lvl5pPr marL="1828800" algn="l" defTabSz="914400" rtl="0" eaLnBrk="1" latinLnBrk="0" hangingPunct="1">
+      <a:defRPr sz="1200" kern="1200">
+        <a:solidFill>
+          <a:schemeClr val="tx1"/>
+        </a:solidFill>
+        <a:latin typeface="+mn-lt"/>
+        <a:ea typeface="+mn-ea"/>
+        <a:cs typeface="+mn-cs"/>
+      </a:defRPr>
+    </a:lvl5pPr>
+    <a:lvl6pPr marL="2286000" algn="l" defTabSz="914400" rtl="0" eaLnBrk="1" latinLnBrk="0" hangingPunct="1">
+      <a:defRPr sz="1200" kern="1200">
+        <a:solidFill>
+          <a:schemeClr val="tx1"/>
+        </a:solidFill>
+        <a:latin typeface="+mn-lt"/>
+        <a:ea typeface="+mn-ea"/>
+        <a:cs typeface="+mn-cs"/>
+      </a:defRPr>
+    </a:lvl6pPr>
+    <a:lvl7pPr marL="2743200" algn="l" defTabSz="914400" rtl="0" eaLnBrk="1" latinLnBrk="0" hangingPunct="1">
+      <a:defRPr sz="1200" kern="1200">
+        <a:solidFill>
+          <a:schemeClr val="tx1"/>
+        </a:solidFill>
+        <a:latin typeface="+mn-lt"/>
+        <a:ea typeface="+mn-ea"/>
+        <a:cs typeface="+mn-cs"/>
+      </a:defRPr>
+    </a:lvl7pPr>
+    <a:lvl8pPr marL="3200400" algn="l" defTabSz="914400" rtl="0" eaLnBrk="1" latinLnBrk="0" hangingPunct="1">
+      <a:defRPr sz="1200" kern="1200">
+        <a:solidFill>
+          <a:schemeClr val="tx1"/>
+        </a:solidFill>
+        <a:latin typeface="+mn-lt"/>
+        <a:ea typeface="+mn-ea"/>
+        <a:cs typeface="+mn-cs"/>
+      </a:defRPr>
+    </a:lvl8pPr>
+    <a:lvl9pPr marL="3657600" algn="l" defTabSz="914400" rtl="0" eaLnBrk="1" latinLnBrk="0" hangingPunct="1">
+      <a:defRPr sz="1200" kern="1200">
+        <a:solidFill>
+          <a:schemeClr val="tx1"/>
+        </a:solidFill>
+        <a:latin typeface="+mn-lt"/>
+        <a:ea typeface="+mn-ea"/>
+        <a:cs typeface="+mn-cs"/>
+      </a:defRPr>
+    </a:lvl9pPr>
+  </p:notesStyle>
+</p:notesMaster>
 </file>
 
 <file path=ppt/slideLayouts/slideLayout1.xml><?xml version="1.0" encoding="utf-8"?>
@@ -350,7 +708,7 @@
           <a:p>
             <a:fld id="{4BDF68E2-58F2-4D09-BE8B-E3BD06533059}" type="datetimeFigureOut">
               <a:rPr lang="en-US" dirty="0"/>
-              <a:t>2/23/17</a:t>
+              <a:t>2/24/17</a:t>
             </a:fld>
             <a:endParaRPr lang="en-US" dirty="0"/>
           </a:p>
@@ -553,7 +911,7 @@
           <a:p>
             <a:fld id="{2E2D6473-DF6D-4702-B328-E0DD40540A4E}" type="datetimeFigureOut">
               <a:rPr lang="en-US" dirty="0"/>
-              <a:t>2/23/17</a:t>
+              <a:t>2/24/17</a:t>
             </a:fld>
             <a:endParaRPr lang="en-US" dirty="0"/>
           </a:p>
@@ -804,7 +1162,7 @@
           <a:p>
             <a:fld id="{E26F7E3A-B166-407D-9866-32884E7D5B37}" type="datetimeFigureOut">
               <a:rPr lang="en-US" dirty="0"/>
-              <a:t>2/23/17</a:t>
+              <a:t>2/24/17</a:t>
             </a:fld>
             <a:endParaRPr lang="en-US" dirty="0"/>
           </a:p>
@@ -973,7 +1331,7 @@
           <a:p>
             <a:fld id="{528FC5F6-F338-4AE4-BB23-26385BCFC423}" type="datetimeFigureOut">
               <a:rPr lang="en-US" dirty="0"/>
-              <a:t>2/23/17</a:t>
+              <a:t>2/24/17</a:t>
             </a:fld>
             <a:endParaRPr lang="en-US" dirty="0"/>
           </a:p>
@@ -1311,7 +1669,7 @@
           <a:p>
             <a:fld id="{20EBB0C4-6273-4C6E-B9BD-2EDC30F1CD52}" type="datetimeFigureOut">
               <a:rPr lang="en-US" dirty="0"/>
-              <a:t>2/23/17</a:t>
+              <a:t>2/24/17</a:t>
             </a:fld>
             <a:endParaRPr lang="en-US" dirty="0"/>
           </a:p>
@@ -1581,7 +1939,7 @@
           <a:p>
             <a:fld id="{19AB4D41-86C1-4908-B66A-0B50CEB3BF29}" type="datetimeFigureOut">
               <a:rPr lang="en-US" dirty="0"/>
-              <a:t>2/23/17</a:t>
+              <a:t>2/24/17</a:t>
             </a:fld>
             <a:endParaRPr lang="en-US" dirty="0"/>
           </a:p>
@@ -1955,7 +2313,7 @@
           <a:p>
             <a:fld id="{E6426E2C-56C1-4E0D-A793-0088A7FDD37E}" type="datetimeFigureOut">
               <a:rPr lang="en-US" dirty="0"/>
-              <a:t>2/23/17</a:t>
+              <a:t>2/24/17</a:t>
             </a:fld>
             <a:endParaRPr lang="en-US" dirty="0"/>
           </a:p>
@@ -2068,7 +2426,7 @@
           <a:p>
             <a:fld id="{C8C39B41-D8B5-4052-B551-9B5525EAA8B6}" type="datetimeFigureOut">
               <a:rPr lang="en-US" dirty="0"/>
-              <a:t>2/23/17</a:t>
+              <a:t>2/24/17</a:t>
             </a:fld>
             <a:endParaRPr lang="en-US" dirty="0"/>
           </a:p>
@@ -2234,7 +2592,7 @@
           <a:p>
             <a:fld id="{4D94136C-8742-45B2-AF27-D93DF72833A9}" type="datetimeFigureOut">
               <a:rPr lang="en-US" dirty="0"/>
-              <a:t>2/23/17</a:t>
+              <a:t>2/24/17</a:t>
             </a:fld>
             <a:endParaRPr lang="en-US" dirty="0"/>
           </a:p>
@@ -2584,7 +2942,7 @@
           <a:p>
             <a:fld id="{32ABBEA6-7C60-4B02-AE87-00D78D8422AF}" type="datetimeFigureOut">
               <a:rPr lang="en-US" dirty="0"/>
-              <a:t>2/23/17</a:t>
+              <a:t>2/24/17</a:t>
             </a:fld>
             <a:endParaRPr lang="en-US" dirty="0"/>
           </a:p>
@@ -2962,7 +3320,7 @@
           <a:p>
             <a:fld id="{C9CAD897-D46E-4AD2-BD9B-49DD3E640873}" type="datetimeFigureOut">
               <a:rPr lang="en-US" dirty="0"/>
-              <a:t>2/23/17</a:t>
+              <a:t>2/24/17</a:t>
             </a:fld>
             <a:endParaRPr lang="en-US" dirty="0"/>
           </a:p>
@@ -3244,7 +3602,7 @@
           <a:p>
             <a:fld id="{98624D31-43A5-475A-80CF-332C9F6DCF35}" type="datetimeFigureOut">
               <a:rPr lang="en-US" dirty="0"/>
-              <a:t>2/23/17</a:t>
+              <a:t>2/24/17</a:t>
             </a:fld>
             <a:endParaRPr lang="en-US" dirty="0"/>
           </a:p>
@@ -3885,9 +4243,10 @@
           <a:lstStyle/>
           <a:p>
             <a:r>
-              <a:rPr lang="en-US" dirty="0"/>
-              <a:t>What is inheritance?</a:t>
-            </a:r>
+              <a:rPr lang="en-US" dirty="0" smtClean="0"/>
+              <a:t>Practical: Abstraction and Encapsulation</a:t>
+            </a:r>
+            <a:endParaRPr lang="en-US" dirty="0"/>
           </a:p>
         </p:txBody>
       </p:sp>
@@ -3903,34 +4262,174 @@
         </p:nvSpPr>
         <p:spPr/>
         <p:txBody>
-          <a:bodyPr/>
-          <a:lstStyle/>
-          <a:p>
-            <a:r>
-              <a:rPr lang="en-US" dirty="0"/>
-              <a:t>Inheritance is the concept of allowing classes to be created that exist "on top" of other classes. </a:t>
+          <a:bodyPr>
+            <a:normAutofit/>
+          </a:bodyPr>
+          <a:lstStyle/>
+          <a:p>
+            <a:r>
+              <a:rPr lang="en-US" dirty="0" smtClean="0"/>
+              <a:t>You will make an interface, </a:t>
+            </a:r>
+            <a:r>
+              <a:rPr lang="en-US" i="1" dirty="0" err="1" smtClean="0"/>
+              <a:t>IPerson.cs</a:t>
+            </a:r>
+            <a:r>
+              <a:rPr lang="en-US" dirty="0" smtClean="0"/>
+              <a:t>, which implements </a:t>
+            </a:r>
+            <a:r>
+              <a:rPr lang="en-US" i="1" dirty="0" err="1" smtClean="0"/>
+              <a:t>IGenderable</a:t>
+            </a:r>
+            <a:r>
+              <a:rPr lang="en-US" i="1" dirty="0" smtClean="0"/>
+              <a:t>, </a:t>
+            </a:r>
+            <a:r>
+              <a:rPr lang="en-US" i="1" dirty="0" err="1" smtClean="0"/>
+              <a:t>IWalkable</a:t>
+            </a:r>
+            <a:r>
+              <a:rPr lang="en-US" i="1" dirty="0" smtClean="0"/>
+              <a:t>, </a:t>
+            </a:r>
+            <a:r>
+              <a:rPr lang="en-US" dirty="0" smtClean="0"/>
+              <a:t>and</a:t>
+            </a:r>
+            <a:r>
+              <a:rPr lang="en-US" i="1" dirty="0" smtClean="0"/>
+              <a:t> </a:t>
+            </a:r>
+            <a:r>
+              <a:rPr lang="en-US" i="1" dirty="0" err="1" smtClean="0"/>
+              <a:t>IEatable</a:t>
             </a:r>
             <a:endParaRPr lang="en-US" dirty="0" smtClean="0"/>
           </a:p>
           <a:p>
             <a:r>
-              <a:rPr lang="en-US" dirty="0"/>
-              <a:t>For example, we can make a class for mammals, and have dogs inherit from that class. Often, we will inherit from abstract or partial classes. </a:t>
+              <a:rPr lang="en-US" dirty="0" smtClean="0"/>
+              <a:t>Properties in </a:t>
+            </a:r>
+            <a:r>
+              <a:rPr lang="en-US" dirty="0" err="1" smtClean="0"/>
+              <a:t>IPerson</a:t>
+            </a:r>
+            <a:r>
+              <a:rPr lang="en-US" dirty="0" smtClean="0"/>
+              <a:t>:</a:t>
+            </a:r>
+          </a:p>
+          <a:p>
+            <a:pPr lvl="1"/>
+            <a:r>
+              <a:rPr lang="en-US" dirty="0" smtClean="0"/>
+              <a:t>Name: String</a:t>
+            </a:r>
+          </a:p>
+          <a:p>
+            <a:pPr lvl="1"/>
+            <a:r>
+              <a:rPr lang="en-US" dirty="0" smtClean="0"/>
+              <a:t>Age: </a:t>
+            </a:r>
+            <a:r>
+              <a:rPr lang="en-US" dirty="0" err="1" smtClean="0"/>
+              <a:t>int</a:t>
             </a:r>
             <a:endParaRPr lang="en-US" dirty="0" smtClean="0"/>
           </a:p>
           <a:p>
-            <a:r>
-              <a:rPr lang="en-US" dirty="0"/>
-              <a:t>Is is often useful to make an abstract class, which is a "partial class", or to use virtual methods when making a class. You can't make a new instance of an abstract class since it's incomplete, but you can inherit from them and build on top of them.</a:t>
-            </a:r>
+            <a:pPr lvl="1"/>
+            <a:r>
+              <a:rPr lang="en-US" dirty="0" smtClean="0"/>
+              <a:t>Hobbies: </a:t>
+            </a:r>
+            <a:r>
+              <a:rPr lang="en-US" dirty="0" err="1" smtClean="0"/>
+              <a:t>HashSet</a:t>
+            </a:r>
+            <a:r>
+              <a:rPr lang="en-US" dirty="0" smtClean="0"/>
+              <a:t>&lt;string&gt;()</a:t>
+            </a:r>
+          </a:p>
+          <a:p>
+            <a:r>
+              <a:rPr lang="en-US" dirty="0" smtClean="0"/>
+              <a:t>Methods in </a:t>
+            </a:r>
+            <a:r>
+              <a:rPr lang="en-US" dirty="0" err="1" smtClean="0"/>
+              <a:t>IPerson</a:t>
+            </a:r>
+            <a:r>
+              <a:rPr lang="en-US" dirty="0" smtClean="0"/>
+              <a:t>:</a:t>
+            </a:r>
+          </a:p>
+          <a:p>
+            <a:pPr lvl="1"/>
+            <a:r>
+              <a:rPr lang="en-US" dirty="0" smtClean="0"/>
+              <a:t>void Talk(): If the person does not have a hobby, it will print to the console: </a:t>
+            </a:r>
+            <a:r>
+              <a:rPr lang="en-US" i="1" dirty="0" smtClean="0"/>
+              <a:t>I don’t have anything to talk about</a:t>
+            </a:r>
+            <a:r>
+              <a:rPr lang="en-US" dirty="0" smtClean="0"/>
+              <a:t>; if the person has hobbies, it will talk about one of the hobbies</a:t>
+            </a:r>
+          </a:p>
+          <a:p>
+            <a:pPr lvl="1"/>
+            <a:r>
+              <a:rPr lang="en-US" dirty="0" smtClean="0"/>
+              <a:t>void </a:t>
+            </a:r>
+            <a:r>
+              <a:rPr lang="en-US" dirty="0" err="1" smtClean="0"/>
+              <a:t>AddHoby</a:t>
+            </a:r>
+            <a:r>
+              <a:rPr lang="en-US" dirty="0" smtClean="0"/>
+              <a:t>(string hobby): will add an entry to the set of hobbies</a:t>
+            </a:r>
+          </a:p>
+          <a:p>
+            <a:r>
+              <a:rPr lang="en-US" dirty="0" smtClean="0"/>
+              <a:t>You will then write </a:t>
+            </a:r>
+            <a:r>
+              <a:rPr lang="en-US" i="1" dirty="0" err="1" smtClean="0"/>
+              <a:t>Person.cs</a:t>
+            </a:r>
+            <a:r>
+              <a:rPr lang="en-US" dirty="0" smtClean="0"/>
+              <a:t>, which will implement </a:t>
+            </a:r>
+            <a:r>
+              <a:rPr lang="en-US" dirty="0" err="1" smtClean="0"/>
+              <a:t>IPerson</a:t>
+            </a:r>
+            <a:r>
+              <a:rPr lang="en-US" dirty="0" smtClean="0"/>
+              <a:t>!</a:t>
+            </a:r>
+            <a:endParaRPr lang="en-US" i="1" dirty="0"/>
           </a:p>
         </p:txBody>
       </p:sp>
     </p:spTree>
     <p:extLst>
       <p:ext uri="{BB962C8B-B14F-4D97-AF65-F5344CB8AC3E}">
-        <p14:creationId xmlns:p14="http://schemas.microsoft.com/office/powerpoint/2010/main" val="1028771617"/>
+        <p14:creationId xmlns:p14="http://schemas.microsoft.com/office/powerpoint/2010/main" val="1584339635"/>
       </p:ext>
     </p:extLst>
   </p:cSld>
@@ -3964,7 +4463,7 @@
             <a:spLocks noGrp="1"/>
           </p:cNvSpPr>
           <p:nvPr>
-            <p:ph type="title"/>
+            <p:ph type="ctrTitle"/>
           </p:nvPr>
         </p:nvSpPr>
         <p:spPr/>
@@ -3973,20 +4472,21 @@
           <a:lstStyle/>
           <a:p>
             <a:r>
-              <a:rPr lang="en-US" dirty="0"/>
-              <a:t>How do we inherit in C#?</a:t>
-            </a:r>
-          </a:p>
-        </p:txBody>
-      </p:sp>
-      <p:sp>
-        <p:nvSpPr>
-          <p:cNvPr id="3" name="Content Placeholder 2"/>
-          <p:cNvSpPr>
-            <a:spLocks noGrp="1"/>
-          </p:cNvSpPr>
-          <p:nvPr>
-            <p:ph idx="1"/>
+              <a:rPr lang="en-US" dirty="0" smtClean="0"/>
+              <a:t>Advanced OOP: Inheritance and Polymorphism</a:t>
+            </a:r>
+            <a:endParaRPr lang="en-US" dirty="0"/>
+          </a:p>
+        </p:txBody>
+      </p:sp>
+      <p:sp>
+        <p:nvSpPr>
+          <p:cNvPr id="3" name="Subtitle 2"/>
+          <p:cNvSpPr>
+            <a:spLocks noGrp="1"/>
+          </p:cNvSpPr>
+          <p:nvPr>
+            <p:ph type="subTitle" idx="1"/>
           </p:nvPr>
         </p:nvSpPr>
         <p:spPr/>
@@ -3994,46 +4494,14 @@
           <a:bodyPr/>
           <a:lstStyle/>
           <a:p>
-            <a:r>
-              <a:rPr lang="en-US" dirty="0"/>
-              <a:t>First, we make a class to inherit </a:t>
-            </a:r>
-            <a:r>
-              <a:rPr lang="en-US" dirty="0" smtClean="0"/>
-              <a:t>from</a:t>
-            </a:r>
-          </a:p>
-          <a:p>
-            <a:r>
-              <a:rPr lang="en-US" dirty="0" smtClean="0"/>
-              <a:t>Show </a:t>
-            </a:r>
-            <a:r>
-              <a:rPr lang="en-US" dirty="0"/>
-              <a:t>Dog inheriting from </a:t>
-            </a:r>
-            <a:r>
-              <a:rPr lang="en-US" dirty="0" smtClean="0"/>
-              <a:t>mammal</a:t>
-            </a:r>
-          </a:p>
-          <a:p>
-            <a:r>
-              <a:rPr lang="en-US" dirty="0"/>
-              <a:t>Show parrot inheriting from </a:t>
-            </a:r>
-            <a:r>
-              <a:rPr lang="en-US" dirty="0" smtClean="0"/>
-              <a:t>bird</a:t>
-            </a:r>
-            <a:endParaRPr lang="en-US" dirty="0"/>
+            <a:endParaRPr lang="en-US"/>
           </a:p>
         </p:txBody>
       </p:sp>
     </p:spTree>
     <p:extLst>
       <p:ext uri="{BB962C8B-B14F-4D97-AF65-F5344CB8AC3E}">
-        <p14:creationId xmlns:p14="http://schemas.microsoft.com/office/powerpoint/2010/main" val="681053446"/>
+        <p14:creationId xmlns:p14="http://schemas.microsoft.com/office/powerpoint/2010/main" val="711584714"/>
       </p:ext>
     </p:extLst>
   </p:cSld>
@@ -4060,6 +4528,179 @@
           <a:chExt cx="0" cy="0"/>
         </a:xfrm>
       </p:grpSpPr>
+      <p:sp useBgFill="1">
+        <p:nvSpPr>
+          <p:cNvPr id="8" name="Rectangle 7"/>
+          <p:cNvSpPr>
+            <a:spLocks noGrp="1" noRot="1" noChangeAspect="1" noMove="1" noResize="1" noEditPoints="1" noAdjustHandles="1" noChangeArrowheads="1" noChangeShapeType="1" noTextEdit="1"/>
+          </p:cNvSpPr>
+          <p:nvPr>
+            <p:extLst>
+              <p:ext uri="{386F3935-93C4-4BCD-93E2-E3B085C9AB24}">
+                <p16:designElem xmlns:p16="http://schemas.microsoft.com/office/powerpoint/2015/main" val="1"/>
+              </p:ext>
+            </p:extLst>
+          </p:nvPr>
+        </p:nvSpPr>
+        <p:spPr>
+          <a:xfrm>
+            <a:off x="0" y="0"/>
+            <a:ext cx="12186315" cy="6858000"/>
+          </a:xfrm>
+          <a:prstGeom prst="rect">
+            <a:avLst/>
+          </a:prstGeom>
+          <a:ln>
+            <a:noFill/>
+          </a:ln>
+        </p:spPr>
+        <p:style>
+          <a:lnRef idx="2">
+            <a:schemeClr val="accent6">
+              <a:shade val="50000"/>
+            </a:schemeClr>
+          </a:lnRef>
+          <a:fillRef idx="1001">
+            <a:schemeClr val="lt1"/>
+          </a:fillRef>
+          <a:effectRef idx="0">
+            <a:schemeClr val="accent6"/>
+          </a:effectRef>
+          <a:fontRef idx="minor">
+            <a:schemeClr val="lt1"/>
+          </a:fontRef>
+        </p:style>
+        <p:txBody>
+          <a:bodyPr rtlCol="0" anchor="ctr"/>
+          <a:lstStyle/>
+          <a:p>
+            <a:pPr algn="ctr"/>
+            <a:endParaRPr lang="en-US"/>
+          </a:p>
+        </p:txBody>
+      </p:sp>
+      <p:sp>
+        <p:nvSpPr>
+          <p:cNvPr id="10" name="Rectangle 9"/>
+          <p:cNvSpPr>
+            <a:spLocks noGrp="1" noRot="1" noChangeAspect="1" noMove="1" noResize="1" noEditPoints="1" noAdjustHandles="1" noChangeArrowheads="1" noChangeShapeType="1" noTextEdit="1"/>
+          </p:cNvSpPr>
+          <p:nvPr>
+            <p:extLst>
+              <p:ext uri="{386F3935-93C4-4BCD-93E2-E3B085C9AB24}">
+                <p16:designElem xmlns:p16="http://schemas.microsoft.com/office/powerpoint/2015/main" val="1"/>
+              </p:ext>
+            </p:extLst>
+          </p:nvPr>
+        </p:nvSpPr>
+        <p:spPr>
+          <a:xfrm>
+            <a:off x="16" y="0"/>
+            <a:ext cx="4050791" cy="6858000"/>
+          </a:xfrm>
+          <a:prstGeom prst="rect">
+            <a:avLst/>
+          </a:prstGeom>
+          <a:solidFill>
+            <a:schemeClr val="accent2"/>
+          </a:solidFill>
+          <a:ln>
+            <a:noFill/>
+          </a:ln>
+        </p:spPr>
+        <p:style>
+          <a:lnRef idx="2">
+            <a:schemeClr val="accent1">
+              <a:shade val="50000"/>
+            </a:schemeClr>
+          </a:lnRef>
+          <a:fillRef idx="1">
+            <a:schemeClr val="accent1"/>
+          </a:fillRef>
+          <a:effectRef idx="0">
+            <a:schemeClr val="accent1"/>
+          </a:effectRef>
+          <a:fontRef idx="minor">
+            <a:schemeClr val="lt1"/>
+          </a:fontRef>
+        </p:style>
+      </p:sp>
+      <p:sp>
+        <p:nvSpPr>
+          <p:cNvPr id="12" name="Rectangle 11"/>
+          <p:cNvSpPr>
+            <a:spLocks noGrp="1" noRot="1" noChangeAspect="1" noMove="1" noResize="1" noEditPoints="1" noAdjustHandles="1" noChangeArrowheads="1" noChangeShapeType="1" noTextEdit="1"/>
+          </p:cNvSpPr>
+          <p:nvPr>
+            <p:extLst>
+              <p:ext uri="{386F3935-93C4-4BCD-93E2-E3B085C9AB24}">
+                <p16:designElem xmlns:p16="http://schemas.microsoft.com/office/powerpoint/2015/main" val="1"/>
+              </p:ext>
+            </p:extLst>
+          </p:nvPr>
+        </p:nvSpPr>
+        <p:spPr>
+          <a:xfrm>
+            <a:off x="4040071" y="0"/>
+            <a:ext cx="64008" cy="6858000"/>
+          </a:xfrm>
+          <a:prstGeom prst="rect">
+            <a:avLst/>
+          </a:prstGeom>
+          <a:solidFill>
+            <a:schemeClr val="accent1"/>
+          </a:solidFill>
+          <a:ln>
+            <a:noFill/>
+          </a:ln>
+        </p:spPr>
+        <p:style>
+          <a:lnRef idx="2">
+            <a:schemeClr val="accent1">
+              <a:shade val="50000"/>
+            </a:schemeClr>
+          </a:lnRef>
+          <a:fillRef idx="1">
+            <a:schemeClr val="accent1"/>
+          </a:fillRef>
+          <a:effectRef idx="0">
+            <a:schemeClr val="accent1"/>
+          </a:effectRef>
+          <a:fontRef idx="minor">
+            <a:schemeClr val="lt1"/>
+          </a:fontRef>
+        </p:style>
+      </p:sp>
+      <p:pic>
+        <p:nvPicPr>
+          <p:cNvPr id="4" name="Picture 3"/>
+          <p:cNvPicPr>
+            <a:picLocks noChangeAspect="1"/>
+          </p:cNvPicPr>
+          <p:nvPr/>
+        </p:nvPicPr>
+        <p:blipFill>
+          <a:blip r:embed="rId2">
+            <a:extLst>
+              <a:ext uri="{28A0092B-C50C-407E-A947-70E740481C1C}">
+                <a14:useLocalDpi xmlns:a14="http://schemas.microsoft.com/office/drawing/2010/main" val="0"/>
+              </a:ext>
+            </a:extLst>
+          </a:blip>
+          <a:stretch>
+            <a:fillRect/>
+          </a:stretch>
+        </p:blipFill>
+        <p:spPr>
+          <a:xfrm>
+            <a:off x="4742017" y="1228121"/>
+            <a:ext cx="6798082" cy="4401758"/>
+          </a:xfrm>
+          <a:prstGeom prst="rect">
+            <a:avLst/>
+          </a:prstGeom>
+        </p:spPr>
+      </p:pic>
       <p:sp>
         <p:nvSpPr>
           <p:cNvPr id="2" name="Title 1"/>
@@ -4070,16 +4711,26 @@
             <p:ph type="title"/>
           </p:nvPr>
         </p:nvSpPr>
-        <p:spPr/>
-        <p:txBody>
-          <a:bodyPr/>
-          <a:lstStyle/>
-          <a:p>
-            <a:r>
-              <a:rPr lang="en-US" dirty="0" smtClean="0"/>
-              <a:t>Multiple Inheritance</a:t>
-            </a:r>
-            <a:endParaRPr lang="en-US" dirty="0"/>
+        <p:spPr>
+          <a:xfrm>
+            <a:off x="492370" y="516835"/>
+            <a:ext cx="3084844" cy="2103875"/>
+          </a:xfrm>
+        </p:spPr>
+        <p:txBody>
+          <a:bodyPr>
+            <a:normAutofit/>
+          </a:bodyPr>
+          <a:lstStyle/>
+          <a:p>
+            <a:r>
+              <a:rPr lang="en-US" sz="3600">
+                <a:solidFill>
+                  <a:srgbClr val="FFFFFF"/>
+                </a:solidFill>
+              </a:rPr>
+              <a:t>What is inheritance?</a:t>
+            </a:r>
           </a:p>
         </p:txBody>
       </p:sp>
@@ -4093,136 +4744,99 @@
             <p:ph idx="1"/>
           </p:nvPr>
         </p:nvSpPr>
-        <p:spPr/>
-        <p:txBody>
-          <a:bodyPr/>
-          <a:lstStyle/>
-          <a:p>
-            <a:r>
-              <a:rPr lang="en-US" dirty="0" smtClean="0"/>
-              <a:t>Interfaces and classes can both inherit from multiple interfaces at a time. This allows us to create small interfaces that describe a very reusable slice of functionality. </a:t>
-            </a:r>
-            <a:endParaRPr lang="en-US" dirty="0"/>
-          </a:p>
-          <a:p>
-            <a:r>
-              <a:rPr lang="en-US" dirty="0" smtClean="0"/>
-              <a:t>For example, our animals all can move! But they all move in different ways.</a:t>
-            </a:r>
-          </a:p>
-          <a:p>
-            <a:r>
-              <a:rPr lang="en-US" dirty="0" smtClean="0"/>
-              <a:t>Rather than declare that all our animals follow the interface rules of </a:t>
-            </a:r>
-            <a:r>
-              <a:rPr lang="en-US" dirty="0" err="1" smtClean="0"/>
-              <a:t>IWalkable</a:t>
-            </a:r>
-            <a:r>
-              <a:rPr lang="en-US" dirty="0" smtClean="0"/>
-              <a:t>, or </a:t>
-            </a:r>
-            <a:r>
-              <a:rPr lang="en-US" dirty="0" err="1" smtClean="0"/>
-              <a:t>IFlyable</a:t>
-            </a:r>
-            <a:r>
-              <a:rPr lang="en-US" dirty="0" smtClean="0"/>
-              <a:t>, we have each particular abstract class define inherit from </a:t>
-            </a:r>
-            <a:r>
-              <a:rPr lang="en-US" dirty="0" err="1" smtClean="0"/>
-              <a:t>IAnimal</a:t>
-            </a:r>
-            <a:r>
-              <a:rPr lang="en-US" dirty="0" smtClean="0"/>
-              <a:t> and whichever movement patterns describe them best.</a:t>
-            </a:r>
-          </a:p>
-          <a:p>
-            <a:pPr lvl="1"/>
-            <a:r>
-              <a:rPr lang="en-US" dirty="0" smtClean="0"/>
-              <a:t>Mammal inherits from </a:t>
-            </a:r>
-            <a:r>
-              <a:rPr lang="en-US" dirty="0" err="1" smtClean="0"/>
-              <a:t>IWalkable</a:t>
-            </a:r>
-            <a:r>
-              <a:rPr lang="en-US" dirty="0" smtClean="0"/>
-              <a:t> and </a:t>
-            </a:r>
-            <a:r>
-              <a:rPr lang="en-US" dirty="0" err="1" smtClean="0"/>
-              <a:t>IAnimal</a:t>
-            </a:r>
-            <a:endParaRPr lang="en-US" dirty="0" smtClean="0"/>
-          </a:p>
-          <a:p>
-            <a:pPr lvl="1"/>
-            <a:r>
-              <a:rPr lang="en-US" dirty="0" smtClean="0"/>
-              <a:t>Avian inherits from </a:t>
-            </a:r>
-            <a:r>
-              <a:rPr lang="en-US" dirty="0" err="1" smtClean="0"/>
-              <a:t>IWalkable</a:t>
-            </a:r>
-            <a:r>
-              <a:rPr lang="en-US" dirty="0" smtClean="0"/>
-              <a:t>, </a:t>
-            </a:r>
-            <a:r>
-              <a:rPr lang="en-US" dirty="0" err="1" smtClean="0"/>
-              <a:t>IFlyable</a:t>
-            </a:r>
-            <a:r>
-              <a:rPr lang="en-US" dirty="0" smtClean="0"/>
-              <a:t>, and </a:t>
-            </a:r>
-            <a:r>
-              <a:rPr lang="en-US" dirty="0" err="1" smtClean="0"/>
-              <a:t>IAnimal</a:t>
-            </a:r>
-            <a:endParaRPr lang="en-US" dirty="0"/>
-          </a:p>
-          <a:p>
-            <a:r>
-              <a:rPr lang="en-US" dirty="0" smtClean="0"/>
-              <a:t>This can be extended to a school of thought known as </a:t>
-            </a:r>
-            <a:r>
-              <a:rPr lang="en-US" i="1" dirty="0" smtClean="0"/>
-              <a:t>composition over inheritance</a:t>
-            </a:r>
-          </a:p>
-          <a:p>
-            <a:pPr lvl="1"/>
-            <a:r>
-              <a:rPr lang="en-US" dirty="0">
-                <a:hlinkClick r:id="rId2"/>
+        <p:spPr>
+          <a:xfrm>
+            <a:off x="492371" y="2653800"/>
+            <a:ext cx="3084844" cy="3335519"/>
+          </a:xfrm>
+        </p:spPr>
+        <p:txBody>
+          <a:bodyPr>
+            <a:normAutofit/>
+          </a:bodyPr>
+          <a:lstStyle/>
+          <a:p>
+            <a:pPr>
+              <a:lnSpc>
+                <a:spcPct val="70000"/>
+              </a:lnSpc>
+            </a:pPr>
+            <a:r>
+              <a:rPr lang="en-US" sz="1400" dirty="0">
+                <a:solidFill>
+                  <a:srgbClr val="FFFFFF"/>
+                </a:solidFill>
               </a:rPr>
-              <a:t>https://</a:t>
-            </a:r>
-            <a:r>
-              <a:rPr lang="en-US" dirty="0" smtClean="0">
-                <a:hlinkClick r:id="rId2"/>
+              <a:t>Inheritance is the concept of allowing classes to be created that exist "on top" of other classes. </a:t>
+            </a:r>
+          </a:p>
+          <a:p>
+            <a:pPr>
+              <a:lnSpc>
+                <a:spcPct val="70000"/>
+              </a:lnSpc>
+            </a:pPr>
+            <a:r>
+              <a:rPr lang="en-US" sz="1400" dirty="0">
+                <a:solidFill>
+                  <a:srgbClr val="FFFFFF"/>
+                </a:solidFill>
               </a:rPr>
-              <a:t>en.wikipedia.org/wiki/Composition_over_inheritance</a:t>
-            </a:r>
-            <a:endParaRPr lang="en-US" dirty="0" smtClean="0"/>
-          </a:p>
-          <a:p>
-            <a:endParaRPr lang="en-US" dirty="0"/>
+              <a:t>For example, we can make a class for mammals, and have dogs inherit from that class. Often, we will inherit from abstract or partial classes. </a:t>
+            </a:r>
+          </a:p>
+          <a:p>
+            <a:pPr>
+              <a:lnSpc>
+                <a:spcPct val="70000"/>
+              </a:lnSpc>
+            </a:pPr>
+            <a:r>
+              <a:rPr lang="en-US" sz="1400" dirty="0">
+                <a:solidFill>
+                  <a:srgbClr val="FFFFFF"/>
+                </a:solidFill>
+              </a:rPr>
+              <a:t>Is is often useful to make an abstract class, which is a "partial class", or to use virtual methods when making a class. You can't make a new instance of an abstract class since it's incomplete, but you can inherit from them and build on top of them.</a:t>
+            </a:r>
+          </a:p>
+          <a:p>
+            <a:pPr>
+              <a:lnSpc>
+                <a:spcPct val="70000"/>
+              </a:lnSpc>
+            </a:pPr>
+            <a:r>
+              <a:rPr lang="en-US" sz="1400" dirty="0">
+                <a:solidFill>
+                  <a:srgbClr val="FFFFFF"/>
+                </a:solidFill>
+              </a:rPr>
+              <a:t>Our Mammal class was an abstract class, and our </a:t>
+            </a:r>
+            <a:r>
+              <a:rPr lang="en-US" sz="1400" dirty="0" err="1">
+                <a:solidFill>
+                  <a:srgbClr val="FFFFFF"/>
+                </a:solidFill>
+              </a:rPr>
+              <a:t>HoneyBadger</a:t>
+            </a:r>
+            <a:r>
+              <a:rPr lang="en-US" sz="1400" dirty="0">
+                <a:solidFill>
+                  <a:srgbClr val="FFFFFF"/>
+                </a:solidFill>
+              </a:rPr>
+              <a:t> class inherits the Mammal class and finishes it up.</a:t>
+            </a:r>
           </a:p>
         </p:txBody>
       </p:sp>
     </p:spTree>
     <p:extLst>
       <p:ext uri="{BB962C8B-B14F-4D97-AF65-F5344CB8AC3E}">
-        <p14:creationId xmlns:p14="http://schemas.microsoft.com/office/powerpoint/2010/main" val="1948332637"/>
+        <p14:creationId xmlns:p14="http://schemas.microsoft.com/office/powerpoint/2010/main" val="716345250"/>
       </p:ext>
     </p:extLst>
   </p:cSld>
@@ -4256,7 +4870,7 @@
             <a:spLocks noGrp="1"/>
           </p:cNvSpPr>
           <p:nvPr>
-            <p:ph type="ctrTitle"/>
+            <p:ph type="title"/>
           </p:nvPr>
         </p:nvSpPr>
         <p:spPr/>
@@ -4266,7 +4880,7 @@
           <a:p>
             <a:r>
               <a:rPr lang="en-US" dirty="0" smtClean="0"/>
-              <a:t>Advanced OOP Concepts</a:t>
+              <a:t>Multiple Inheritance</a:t>
             </a:r>
             <a:endParaRPr lang="en-US" dirty="0"/>
           </a:p>
@@ -4274,12 +4888,12 @@
       </p:sp>
       <p:sp>
         <p:nvSpPr>
-          <p:cNvPr id="4" name="Subtitle 3"/>
-          <p:cNvSpPr>
-            <a:spLocks noGrp="1"/>
-          </p:cNvSpPr>
-          <p:nvPr>
-            <p:ph type="subTitle" idx="1"/>
+          <p:cNvPr id="3" name="Content Placeholder 2"/>
+          <p:cNvSpPr>
+            <a:spLocks noGrp="1"/>
+          </p:cNvSpPr>
+          <p:nvPr>
+            <p:ph idx="1"/>
           </p:nvPr>
         </p:nvSpPr>
         <p:spPr/>
@@ -4287,14 +4901,131 @@
           <a:bodyPr/>
           <a:lstStyle/>
           <a:p>
-            <a:endParaRPr lang="en-US"/>
+            <a:r>
+              <a:rPr lang="en-US" dirty="0" smtClean="0"/>
+              <a:t>Interfaces and classes can both inherit from multiple interfaces at a time. This allows us to create small interfaces that describe a very reusable slice of functionality. </a:t>
+            </a:r>
+            <a:endParaRPr lang="en-US" dirty="0"/>
+          </a:p>
+          <a:p>
+            <a:r>
+              <a:rPr lang="en-US" dirty="0" smtClean="0"/>
+              <a:t>For example, our animals all can move! But they all move in different ways.</a:t>
+            </a:r>
+          </a:p>
+          <a:p>
+            <a:r>
+              <a:rPr lang="en-US" dirty="0" smtClean="0"/>
+              <a:t>Rather than declare that all our animals follow the interface rules of </a:t>
+            </a:r>
+            <a:r>
+              <a:rPr lang="en-US" dirty="0" err="1" smtClean="0"/>
+              <a:t>IWalkable</a:t>
+            </a:r>
+            <a:r>
+              <a:rPr lang="en-US" dirty="0" smtClean="0"/>
+              <a:t>, or </a:t>
+            </a:r>
+            <a:r>
+              <a:rPr lang="en-US" dirty="0" err="1" smtClean="0"/>
+              <a:t>IFlyable</a:t>
+            </a:r>
+            <a:r>
+              <a:rPr lang="en-US" dirty="0" smtClean="0"/>
+              <a:t>, we have each particular abstract class define inherit from </a:t>
+            </a:r>
+            <a:r>
+              <a:rPr lang="en-US" dirty="0" err="1" smtClean="0"/>
+              <a:t>IAnimal</a:t>
+            </a:r>
+            <a:r>
+              <a:rPr lang="en-US" dirty="0" smtClean="0"/>
+              <a:t> and whichever movement patterns describe them best.</a:t>
+            </a:r>
+          </a:p>
+          <a:p>
+            <a:pPr lvl="1"/>
+            <a:r>
+              <a:rPr lang="en-US" dirty="0" smtClean="0"/>
+              <a:t>Mammal inherits from </a:t>
+            </a:r>
+            <a:r>
+              <a:rPr lang="en-US" dirty="0" err="1" smtClean="0"/>
+              <a:t>IWalkable</a:t>
+            </a:r>
+            <a:r>
+              <a:rPr lang="en-US" dirty="0" smtClean="0"/>
+              <a:t> and </a:t>
+            </a:r>
+            <a:r>
+              <a:rPr lang="en-US" dirty="0" err="1" smtClean="0"/>
+              <a:t>IAnimal</a:t>
+            </a:r>
+            <a:endParaRPr lang="en-US" dirty="0" smtClean="0"/>
+          </a:p>
+          <a:p>
+            <a:pPr lvl="1"/>
+            <a:r>
+              <a:rPr lang="en-US" dirty="0" smtClean="0"/>
+              <a:t>Avian inherits from </a:t>
+            </a:r>
+            <a:r>
+              <a:rPr lang="en-US" dirty="0" err="1" smtClean="0"/>
+              <a:t>IWalkable</a:t>
+            </a:r>
+            <a:r>
+              <a:rPr lang="en-US" dirty="0" smtClean="0"/>
+              <a:t>, </a:t>
+            </a:r>
+            <a:r>
+              <a:rPr lang="en-US" dirty="0" err="1" smtClean="0"/>
+              <a:t>IFlyable</a:t>
+            </a:r>
+            <a:r>
+              <a:rPr lang="en-US" dirty="0" smtClean="0"/>
+              <a:t>, and </a:t>
+            </a:r>
+            <a:r>
+              <a:rPr lang="en-US" dirty="0" err="1" smtClean="0"/>
+              <a:t>IAnimal</a:t>
+            </a:r>
+            <a:endParaRPr lang="en-US" dirty="0"/>
+          </a:p>
+          <a:p>
+            <a:r>
+              <a:rPr lang="en-US" dirty="0" smtClean="0"/>
+              <a:t>This can be extended to a school of thought known as </a:t>
+            </a:r>
+            <a:r>
+              <a:rPr lang="en-US" i="1" dirty="0" smtClean="0"/>
+              <a:t>composition over inheritance</a:t>
+            </a:r>
+          </a:p>
+          <a:p>
+            <a:pPr lvl="1"/>
+            <a:r>
+              <a:rPr lang="en-US" dirty="0">
+                <a:hlinkClick r:id="rId2"/>
+              </a:rPr>
+              <a:t>https://</a:t>
+            </a:r>
+            <a:r>
+              <a:rPr lang="en-US" dirty="0" smtClean="0">
+                <a:hlinkClick r:id="rId2"/>
+              </a:rPr>
+              <a:t>en.wikipedia.org/wiki/Composition_over_inheritance</a:t>
+            </a:r>
+            <a:endParaRPr lang="en-US" dirty="0" smtClean="0"/>
+          </a:p>
+          <a:p>
+            <a:endParaRPr lang="en-US" dirty="0"/>
           </a:p>
         </p:txBody>
       </p:sp>
     </p:spTree>
     <p:extLst>
       <p:ext uri="{BB962C8B-B14F-4D97-AF65-F5344CB8AC3E}">
-        <p14:creationId xmlns:p14="http://schemas.microsoft.com/office/powerpoint/2010/main" val="804445132"/>
+        <p14:creationId xmlns:p14="http://schemas.microsoft.com/office/powerpoint/2010/main" val="1948332637"/>
       </p:ext>
     </p:extLst>
   </p:cSld>
@@ -4402,6 +5133,179 @@
           <a:chExt cx="0" cy="0"/>
         </a:xfrm>
       </p:grpSpPr>
+      <p:sp useBgFill="1">
+        <p:nvSpPr>
+          <p:cNvPr id="8" name="Rectangle 7"/>
+          <p:cNvSpPr>
+            <a:spLocks noGrp="1" noRot="1" noChangeAspect="1" noMove="1" noResize="1" noEditPoints="1" noAdjustHandles="1" noChangeArrowheads="1" noChangeShapeType="1" noTextEdit="1"/>
+          </p:cNvSpPr>
+          <p:nvPr>
+            <p:extLst>
+              <p:ext uri="{386F3935-93C4-4BCD-93E2-E3B085C9AB24}">
+                <p16:designElem xmlns:p16="http://schemas.microsoft.com/office/powerpoint/2015/main" val="1"/>
+              </p:ext>
+            </p:extLst>
+          </p:nvPr>
+        </p:nvSpPr>
+        <p:spPr>
+          <a:xfrm>
+            <a:off x="0" y="0"/>
+            <a:ext cx="12186315" cy="6858000"/>
+          </a:xfrm>
+          <a:prstGeom prst="rect">
+            <a:avLst/>
+          </a:prstGeom>
+          <a:ln>
+            <a:noFill/>
+          </a:ln>
+        </p:spPr>
+        <p:style>
+          <a:lnRef idx="2">
+            <a:schemeClr val="accent6">
+              <a:shade val="50000"/>
+            </a:schemeClr>
+          </a:lnRef>
+          <a:fillRef idx="1001">
+            <a:schemeClr val="lt1"/>
+          </a:fillRef>
+          <a:effectRef idx="0">
+            <a:schemeClr val="accent6"/>
+          </a:effectRef>
+          <a:fontRef idx="minor">
+            <a:schemeClr val="lt1"/>
+          </a:fontRef>
+        </p:style>
+        <p:txBody>
+          <a:bodyPr rtlCol="0" anchor="ctr"/>
+          <a:lstStyle/>
+          <a:p>
+            <a:pPr algn="ctr"/>
+            <a:endParaRPr lang="en-US"/>
+          </a:p>
+        </p:txBody>
+      </p:sp>
+      <p:sp>
+        <p:nvSpPr>
+          <p:cNvPr id="10" name="Rectangle 9"/>
+          <p:cNvSpPr>
+            <a:spLocks noGrp="1" noRot="1" noChangeAspect="1" noMove="1" noResize="1" noEditPoints="1" noAdjustHandles="1" noChangeArrowheads="1" noChangeShapeType="1" noTextEdit="1"/>
+          </p:cNvSpPr>
+          <p:nvPr>
+            <p:extLst>
+              <p:ext uri="{386F3935-93C4-4BCD-93E2-E3B085C9AB24}">
+                <p16:designElem xmlns:p16="http://schemas.microsoft.com/office/powerpoint/2015/main" val="1"/>
+              </p:ext>
+            </p:extLst>
+          </p:nvPr>
+        </p:nvSpPr>
+        <p:spPr>
+          <a:xfrm>
+            <a:off x="16" y="0"/>
+            <a:ext cx="4050791" cy="6858000"/>
+          </a:xfrm>
+          <a:prstGeom prst="rect">
+            <a:avLst/>
+          </a:prstGeom>
+          <a:solidFill>
+            <a:schemeClr val="accent2"/>
+          </a:solidFill>
+          <a:ln>
+            <a:noFill/>
+          </a:ln>
+        </p:spPr>
+        <p:style>
+          <a:lnRef idx="2">
+            <a:schemeClr val="accent1">
+              <a:shade val="50000"/>
+            </a:schemeClr>
+          </a:lnRef>
+          <a:fillRef idx="1">
+            <a:schemeClr val="accent1"/>
+          </a:fillRef>
+          <a:effectRef idx="0">
+            <a:schemeClr val="accent1"/>
+          </a:effectRef>
+          <a:fontRef idx="minor">
+            <a:schemeClr val="lt1"/>
+          </a:fontRef>
+        </p:style>
+      </p:sp>
+      <p:sp>
+        <p:nvSpPr>
+          <p:cNvPr id="12" name="Rectangle 11"/>
+          <p:cNvSpPr>
+            <a:spLocks noGrp="1" noRot="1" noChangeAspect="1" noMove="1" noResize="1" noEditPoints="1" noAdjustHandles="1" noChangeArrowheads="1" noChangeShapeType="1" noTextEdit="1"/>
+          </p:cNvSpPr>
+          <p:nvPr>
+            <p:extLst>
+              <p:ext uri="{386F3935-93C4-4BCD-93E2-E3B085C9AB24}">
+                <p16:designElem xmlns:p16="http://schemas.microsoft.com/office/powerpoint/2015/main" val="1"/>
+              </p:ext>
+            </p:extLst>
+          </p:nvPr>
+        </p:nvSpPr>
+        <p:spPr>
+          <a:xfrm>
+            <a:off x="4040071" y="0"/>
+            <a:ext cx="64008" cy="6858000"/>
+          </a:xfrm>
+          <a:prstGeom prst="rect">
+            <a:avLst/>
+          </a:prstGeom>
+          <a:solidFill>
+            <a:schemeClr val="accent1"/>
+          </a:solidFill>
+          <a:ln>
+            <a:noFill/>
+          </a:ln>
+        </p:spPr>
+        <p:style>
+          <a:lnRef idx="2">
+            <a:schemeClr val="accent1">
+              <a:shade val="50000"/>
+            </a:schemeClr>
+          </a:lnRef>
+          <a:fillRef idx="1">
+            <a:schemeClr val="accent1"/>
+          </a:fillRef>
+          <a:effectRef idx="0">
+            <a:schemeClr val="accent1"/>
+          </a:effectRef>
+          <a:fontRef idx="minor">
+            <a:schemeClr val="lt1"/>
+          </a:fontRef>
+        </p:style>
+      </p:sp>
+      <p:pic>
+        <p:nvPicPr>
+          <p:cNvPr id="4" name="Picture 3"/>
+          <p:cNvPicPr>
+            <a:picLocks noChangeAspect="1"/>
+          </p:cNvPicPr>
+          <p:nvPr/>
+        </p:nvPicPr>
+        <p:blipFill>
+          <a:blip r:embed="rId2">
+            <a:extLst>
+              <a:ext uri="{28A0092B-C50C-407E-A947-70E740481C1C}">
+                <a14:useLocalDpi xmlns:a14="http://schemas.microsoft.com/office/drawing/2010/main" val="0"/>
+              </a:ext>
+            </a:extLst>
+          </a:blip>
+          <a:stretch>
+            <a:fillRect/>
+          </a:stretch>
+        </p:blipFill>
+        <p:spPr>
+          <a:xfrm>
+            <a:off x="5791393" y="640080"/>
+            <a:ext cx="4699329" cy="5577840"/>
+          </a:xfrm>
+          <a:prstGeom prst="rect">
+            <a:avLst/>
+          </a:prstGeom>
+        </p:spPr>
+      </p:pic>
       <p:sp>
         <p:nvSpPr>
           <p:cNvPr id="2" name="Title 1"/>
@@ -4412,13 +5316,24 @@
             <p:ph type="title"/>
           </p:nvPr>
         </p:nvSpPr>
-        <p:spPr/>
-        <p:txBody>
-          <a:bodyPr/>
-          <a:lstStyle/>
-          <a:p>
-            <a:r>
-              <a:rPr lang="en-US" dirty="0"/>
+        <p:spPr>
+          <a:xfrm>
+            <a:off x="492370" y="516835"/>
+            <a:ext cx="3084844" cy="2103875"/>
+          </a:xfrm>
+        </p:spPr>
+        <p:txBody>
+          <a:bodyPr>
+            <a:normAutofit/>
+          </a:bodyPr>
+          <a:lstStyle/>
+          <a:p>
+            <a:r>
+              <a:rPr lang="en-US" sz="3600">
+                <a:solidFill>
+                  <a:srgbClr val="FFFFFF"/>
+                </a:solidFill>
+              </a:rPr>
               <a:t>Overloading</a:t>
             </a:r>
           </a:p>
@@ -4434,72 +5349,67 @@
             <p:ph idx="1"/>
           </p:nvPr>
         </p:nvSpPr>
-        <p:spPr/>
-        <p:txBody>
-          <a:bodyPr/>
-          <a:lstStyle/>
-          <a:p>
-            <a:r>
-              <a:rPr lang="en-US" dirty="0"/>
-              <a:t>overload is when a class has a method with the same name + return type, but different </a:t>
-            </a:r>
-            <a:r>
-              <a:rPr lang="en-US" dirty="0" smtClean="0"/>
-              <a:t>parameters</a:t>
-            </a:r>
-          </a:p>
-          <a:p>
-            <a:r>
-              <a:rPr lang="en-US" dirty="0"/>
-              <a:t>		example: 			Dogs can </a:t>
-            </a:r>
-            <a:r>
-              <a:rPr lang="en-US" dirty="0" err="1"/>
-              <a:t>doTrick</a:t>
-            </a:r>
-            <a:r>
-              <a:rPr lang="en-US" dirty="0"/>
-              <a:t>(), or </a:t>
-            </a:r>
-            <a:r>
-              <a:rPr lang="en-US" dirty="0" err="1"/>
-              <a:t>doTrick</a:t>
-            </a:r>
-            <a:r>
-              <a:rPr lang="en-US" dirty="0"/>
-              <a:t>(</a:t>
-            </a:r>
-            <a:r>
-              <a:rPr lang="en-US" dirty="0" err="1"/>
-              <a:t>trickType</a:t>
-            </a:r>
-            <a:r>
-              <a:rPr lang="en-US" dirty="0"/>
-              <a:t>), or </a:t>
-            </a:r>
-            <a:r>
-              <a:rPr lang="en-US" dirty="0" err="1"/>
-              <a:t>doTrick</a:t>
-            </a:r>
-            <a:r>
-              <a:rPr lang="en-US" dirty="0"/>
-              <a:t>(</a:t>
-            </a:r>
-            <a:r>
-              <a:rPr lang="en-US" dirty="0" err="1"/>
-              <a:t>trickType</a:t>
-            </a:r>
-            <a:r>
-              <a:rPr lang="en-US" dirty="0"/>
-              <a:t>, </a:t>
-            </a:r>
-            <a:r>
-              <a:rPr lang="en-US" dirty="0" err="1"/>
-              <a:t>numberOfTimes</a:t>
-            </a:r>
-            <a:r>
-              <a:rPr lang="en-US" dirty="0"/>
-              <a:t>)</a:t>
+        <p:spPr>
+          <a:xfrm>
+            <a:off x="492371" y="2653800"/>
+            <a:ext cx="3084844" cy="3335519"/>
+          </a:xfrm>
+        </p:spPr>
+        <p:txBody>
+          <a:bodyPr>
+            <a:normAutofit/>
+          </a:bodyPr>
+          <a:lstStyle/>
+          <a:p>
+            <a:r>
+              <a:rPr lang="en-US" sz="1500" dirty="0" smtClean="0">
+                <a:solidFill>
+                  <a:srgbClr val="FFFFFF"/>
+                </a:solidFill>
+              </a:rPr>
+              <a:t>Overloading is </a:t>
+            </a:r>
+            <a:r>
+              <a:rPr lang="en-US" sz="1500" dirty="0">
+                <a:solidFill>
+                  <a:srgbClr val="FFFFFF"/>
+                </a:solidFill>
+              </a:rPr>
+              <a:t>when a class has a method with the same </a:t>
+            </a:r>
+            <a:r>
+              <a:rPr lang="en-US" sz="1500" dirty="0" smtClean="0">
+                <a:solidFill>
+                  <a:srgbClr val="FFFFFF"/>
+                </a:solidFill>
+              </a:rPr>
+              <a:t>signature and return type, but different parameters. It is common to see overloads calling other overloads with different parameters. </a:t>
+            </a:r>
+          </a:p>
+          <a:p>
+            <a:r>
+              <a:rPr lang="en-US" sz="1500" dirty="0" smtClean="0">
+                <a:solidFill>
+                  <a:srgbClr val="FFFFFF"/>
+                </a:solidFill>
+              </a:rPr>
+              <a:t>Here, we see how a Dog has two </a:t>
+            </a:r>
+            <a:r>
+              <a:rPr lang="en-US" sz="1500" i="1" dirty="0" err="1" smtClean="0">
+                <a:solidFill>
+                  <a:srgbClr val="FFFFFF"/>
+                </a:solidFill>
+              </a:rPr>
+              <a:t>DoTrick</a:t>
+            </a:r>
+            <a:r>
+              <a:rPr lang="en-US" sz="1500" dirty="0" smtClean="0">
+                <a:solidFill>
+                  <a:srgbClr val="FFFFFF"/>
+                </a:solidFill>
+              </a:rPr>
+              <a:t> overloads: one of them has no particular trick specified, while one of them allows you to specify which trick to have the dog perform.</a:t>
             </a:r>
           </a:p>
         </p:txBody>
@@ -4507,7 +5417,7 @@
     </p:spTree>
     <p:extLst>
       <p:ext uri="{BB962C8B-B14F-4D97-AF65-F5344CB8AC3E}">
-        <p14:creationId xmlns:p14="http://schemas.microsoft.com/office/powerpoint/2010/main" val="1394333720"/>
+        <p14:creationId xmlns:p14="http://schemas.microsoft.com/office/powerpoint/2010/main" val="4055466655"/>
       </p:ext>
     </p:extLst>
   </p:cSld>
@@ -4534,6 +5444,179 @@
           <a:chExt cx="0" cy="0"/>
         </a:xfrm>
       </p:grpSpPr>
+      <p:sp useBgFill="1">
+        <p:nvSpPr>
+          <p:cNvPr id="8" name="Rectangle 7"/>
+          <p:cNvSpPr>
+            <a:spLocks noGrp="1" noRot="1" noChangeAspect="1" noMove="1" noResize="1" noEditPoints="1" noAdjustHandles="1" noChangeArrowheads="1" noChangeShapeType="1" noTextEdit="1"/>
+          </p:cNvSpPr>
+          <p:nvPr>
+            <p:extLst>
+              <p:ext uri="{386F3935-93C4-4BCD-93E2-E3B085C9AB24}">
+                <p16:designElem xmlns:p16="http://schemas.microsoft.com/office/powerpoint/2015/main" val="1"/>
+              </p:ext>
+            </p:extLst>
+          </p:nvPr>
+        </p:nvSpPr>
+        <p:spPr>
+          <a:xfrm>
+            <a:off x="0" y="0"/>
+            <a:ext cx="12186315" cy="6858000"/>
+          </a:xfrm>
+          <a:prstGeom prst="rect">
+            <a:avLst/>
+          </a:prstGeom>
+          <a:ln>
+            <a:noFill/>
+          </a:ln>
+        </p:spPr>
+        <p:style>
+          <a:lnRef idx="2">
+            <a:schemeClr val="accent6">
+              <a:shade val="50000"/>
+            </a:schemeClr>
+          </a:lnRef>
+          <a:fillRef idx="1001">
+            <a:schemeClr val="lt1"/>
+          </a:fillRef>
+          <a:effectRef idx="0">
+            <a:schemeClr val="accent6"/>
+          </a:effectRef>
+          <a:fontRef idx="minor">
+            <a:schemeClr val="lt1"/>
+          </a:fontRef>
+        </p:style>
+        <p:txBody>
+          <a:bodyPr rtlCol="0" anchor="ctr"/>
+          <a:lstStyle/>
+          <a:p>
+            <a:pPr algn="ctr"/>
+            <a:endParaRPr lang="en-US"/>
+          </a:p>
+        </p:txBody>
+      </p:sp>
+      <p:sp>
+        <p:nvSpPr>
+          <p:cNvPr id="10" name="Rectangle 9"/>
+          <p:cNvSpPr>
+            <a:spLocks noGrp="1" noRot="1" noChangeAspect="1" noMove="1" noResize="1" noEditPoints="1" noAdjustHandles="1" noChangeArrowheads="1" noChangeShapeType="1" noTextEdit="1"/>
+          </p:cNvSpPr>
+          <p:nvPr>
+            <p:extLst>
+              <p:ext uri="{386F3935-93C4-4BCD-93E2-E3B085C9AB24}">
+                <p16:designElem xmlns:p16="http://schemas.microsoft.com/office/powerpoint/2015/main" val="1"/>
+              </p:ext>
+            </p:extLst>
+          </p:nvPr>
+        </p:nvSpPr>
+        <p:spPr>
+          <a:xfrm>
+            <a:off x="16" y="0"/>
+            <a:ext cx="4050791" cy="6858000"/>
+          </a:xfrm>
+          <a:prstGeom prst="rect">
+            <a:avLst/>
+          </a:prstGeom>
+          <a:solidFill>
+            <a:schemeClr val="accent2"/>
+          </a:solidFill>
+          <a:ln>
+            <a:noFill/>
+          </a:ln>
+        </p:spPr>
+        <p:style>
+          <a:lnRef idx="2">
+            <a:schemeClr val="accent1">
+              <a:shade val="50000"/>
+            </a:schemeClr>
+          </a:lnRef>
+          <a:fillRef idx="1">
+            <a:schemeClr val="accent1"/>
+          </a:fillRef>
+          <a:effectRef idx="0">
+            <a:schemeClr val="accent1"/>
+          </a:effectRef>
+          <a:fontRef idx="minor">
+            <a:schemeClr val="lt1"/>
+          </a:fontRef>
+        </p:style>
+      </p:sp>
+      <p:sp>
+        <p:nvSpPr>
+          <p:cNvPr id="12" name="Rectangle 11"/>
+          <p:cNvSpPr>
+            <a:spLocks noGrp="1" noRot="1" noChangeAspect="1" noMove="1" noResize="1" noEditPoints="1" noAdjustHandles="1" noChangeArrowheads="1" noChangeShapeType="1" noTextEdit="1"/>
+          </p:cNvSpPr>
+          <p:nvPr>
+            <p:extLst>
+              <p:ext uri="{386F3935-93C4-4BCD-93E2-E3B085C9AB24}">
+                <p16:designElem xmlns:p16="http://schemas.microsoft.com/office/powerpoint/2015/main" val="1"/>
+              </p:ext>
+            </p:extLst>
+          </p:nvPr>
+        </p:nvSpPr>
+        <p:spPr>
+          <a:xfrm>
+            <a:off x="4040071" y="0"/>
+            <a:ext cx="64008" cy="6858000"/>
+          </a:xfrm>
+          <a:prstGeom prst="rect">
+            <a:avLst/>
+          </a:prstGeom>
+          <a:solidFill>
+            <a:schemeClr val="accent1"/>
+          </a:solidFill>
+          <a:ln>
+            <a:noFill/>
+          </a:ln>
+        </p:spPr>
+        <p:style>
+          <a:lnRef idx="2">
+            <a:schemeClr val="accent1">
+              <a:shade val="50000"/>
+            </a:schemeClr>
+          </a:lnRef>
+          <a:fillRef idx="1">
+            <a:schemeClr val="accent1"/>
+          </a:fillRef>
+          <a:effectRef idx="0">
+            <a:schemeClr val="accent1"/>
+          </a:effectRef>
+          <a:fontRef idx="minor">
+            <a:schemeClr val="lt1"/>
+          </a:fontRef>
+        </p:style>
+      </p:sp>
+      <p:pic>
+        <p:nvPicPr>
+          <p:cNvPr id="4" name="Picture 3"/>
+          <p:cNvPicPr>
+            <a:picLocks noChangeAspect="1"/>
+          </p:cNvPicPr>
+          <p:nvPr/>
+        </p:nvPicPr>
+        <p:blipFill>
+          <a:blip r:embed="rId2">
+            <a:extLst>
+              <a:ext uri="{28A0092B-C50C-407E-A947-70E740481C1C}">
+                <a14:useLocalDpi xmlns:a14="http://schemas.microsoft.com/office/drawing/2010/main" val="0"/>
+              </a:ext>
+            </a:extLst>
+          </a:blip>
+          <a:stretch>
+            <a:fillRect/>
+          </a:stretch>
+        </p:blipFill>
+        <p:spPr>
+          <a:xfrm>
+            <a:off x="4742017" y="1746474"/>
+            <a:ext cx="6798082" cy="3365051"/>
+          </a:xfrm>
+          <a:prstGeom prst="rect">
+            <a:avLst/>
+          </a:prstGeom>
+        </p:spPr>
+      </p:pic>
       <p:sp>
         <p:nvSpPr>
           <p:cNvPr id="2" name="Title 1"/>
@@ -4544,13 +5627,24 @@
             <p:ph type="title"/>
           </p:nvPr>
         </p:nvSpPr>
-        <p:spPr/>
-        <p:txBody>
-          <a:bodyPr/>
-          <a:lstStyle/>
-          <a:p>
-            <a:r>
-              <a:rPr lang="en-US" dirty="0"/>
+        <p:spPr>
+          <a:xfrm>
+            <a:off x="492370" y="516835"/>
+            <a:ext cx="3084844" cy="2103875"/>
+          </a:xfrm>
+        </p:spPr>
+        <p:txBody>
+          <a:bodyPr>
+            <a:normAutofit/>
+          </a:bodyPr>
+          <a:lstStyle/>
+          <a:p>
+            <a:r>
+              <a:rPr lang="en-US" sz="3600">
+                <a:solidFill>
+                  <a:srgbClr val="FFFFFF"/>
+                </a:solidFill>
+              </a:rPr>
               <a:t>Overriding</a:t>
             </a:r>
           </a:p>
@@ -4566,69 +5660,124 @@
             <p:ph idx="1"/>
           </p:nvPr>
         </p:nvSpPr>
-        <p:spPr/>
-        <p:txBody>
-          <a:bodyPr/>
-          <a:lstStyle/>
-          <a:p>
-            <a:r>
-              <a:rPr lang="en-US" dirty="0" smtClean="0"/>
-              <a:t>overriding </a:t>
-            </a:r>
-            <a:r>
-              <a:rPr lang="en-US" dirty="0"/>
+        <p:spPr>
+          <a:xfrm>
+            <a:off x="492371" y="2653800"/>
+            <a:ext cx="3084844" cy="3335519"/>
+          </a:xfrm>
+        </p:spPr>
+        <p:txBody>
+          <a:bodyPr>
+            <a:normAutofit/>
+          </a:bodyPr>
+          <a:lstStyle/>
+          <a:p>
+            <a:pPr>
+              <a:lnSpc>
+                <a:spcPct val="70000"/>
+              </a:lnSpc>
+            </a:pPr>
+            <a:r>
+              <a:rPr lang="en-US" sz="1300" dirty="0" smtClean="0">
+                <a:solidFill>
+                  <a:srgbClr val="FFFFFF"/>
+                </a:solidFill>
+              </a:rPr>
+              <a:t>Overriding </a:t>
+            </a:r>
+            <a:r>
+              <a:rPr lang="en-US" sz="1300" dirty="0">
+                <a:solidFill>
+                  <a:srgbClr val="FFFFFF"/>
+                </a:solidFill>
+              </a:rPr>
               <a:t>is when a child class makes a method that overrides a parent class's version of the same </a:t>
             </a:r>
             <a:r>
-              <a:rPr lang="en-US" dirty="0" smtClean="0"/>
-              <a:t>method</a:t>
-            </a:r>
-          </a:p>
-          <a:p>
-            <a:r>
-              <a:rPr lang="en-US" dirty="0"/>
-              <a:t>		the concept of your </a:t>
-            </a:r>
-            <a:r>
-              <a:rPr lang="en-US" dirty="0" smtClean="0"/>
-              <a:t>classes </a:t>
-            </a:r>
-            <a:r>
-              <a:rPr lang="en-US" dirty="0"/>
-              <a:t>being able to call code from parent classes. </a:t>
-            </a:r>
-            <a:endParaRPr lang="en-US" dirty="0" smtClean="0"/>
-          </a:p>
-          <a:p>
-            <a:r>
-              <a:rPr lang="en-US" dirty="0"/>
-              <a:t>		The actual code that uses your object instance will be able to call a method, but the actual class may be using a parent method</a:t>
-            </a:r>
-            <a:r>
-              <a:rPr lang="en-US" dirty="0" smtClean="0"/>
-              <a:t>.</a:t>
-            </a:r>
-          </a:p>
-          <a:p>
-            <a:r>
-              <a:rPr lang="en-US" dirty="0"/>
-              <a:t>			IE: Dog will use animal's move()			IE: Honey </a:t>
-            </a:r>
-            <a:r>
-              <a:rPr lang="en-US" dirty="0" err="1"/>
-              <a:t>Badget</a:t>
-            </a:r>
-            <a:r>
-              <a:rPr lang="en-US" dirty="0"/>
-              <a:t> will override move and actually call a private method called jog()			IE: parrots will override move and run "</a:t>
-            </a:r>
-            <a:r>
-              <a:rPr lang="en-US" dirty="0" err="1"/>
-              <a:t>SaySomethingSnarky</a:t>
-            </a:r>
-            <a:r>
-              <a:rPr lang="en-US" dirty="0"/>
-              <a:t>", then use the parent method move()</a:t>
+              <a:rPr lang="en-US" sz="1300" dirty="0" smtClean="0">
+                <a:solidFill>
+                  <a:srgbClr val="FFFFFF"/>
+                </a:solidFill>
+              </a:rPr>
+              <a:t>method. </a:t>
+            </a:r>
+          </a:p>
+          <a:p>
+            <a:pPr>
+              <a:lnSpc>
+                <a:spcPct val="70000"/>
+              </a:lnSpc>
+            </a:pPr>
+            <a:r>
+              <a:rPr lang="en-US" sz="1300" dirty="0" smtClean="0">
+                <a:solidFill>
+                  <a:srgbClr val="FFFFFF"/>
+                </a:solidFill>
+              </a:rPr>
+              <a:t>Even if we override a method on our child class, inside of our class we can actually still call our parent methods by using the </a:t>
+            </a:r>
+            <a:r>
+              <a:rPr lang="en-US" sz="1300" i="1" dirty="0" smtClean="0">
+                <a:solidFill>
+                  <a:srgbClr val="FFFFFF"/>
+                </a:solidFill>
+              </a:rPr>
+              <a:t>base</a:t>
+            </a:r>
+            <a:r>
+              <a:rPr lang="en-US" sz="1300" dirty="0" smtClean="0">
+                <a:solidFill>
+                  <a:srgbClr val="FFFFFF"/>
+                </a:solidFill>
+              </a:rPr>
+              <a:t> reference. </a:t>
+            </a:r>
+          </a:p>
+          <a:p>
+            <a:pPr>
+              <a:lnSpc>
+                <a:spcPct val="70000"/>
+              </a:lnSpc>
+            </a:pPr>
+            <a:r>
+              <a:rPr lang="en-US" sz="1300" dirty="0" smtClean="0">
+                <a:solidFill>
+                  <a:srgbClr val="FFFFFF"/>
+                </a:solidFill>
+              </a:rPr>
+              <a:t>We see this in most of our animals. This demonstration can be found in </a:t>
+            </a:r>
+            <a:r>
+              <a:rPr lang="en-US" sz="1300" i="1" dirty="0" err="1" smtClean="0">
+                <a:solidFill>
+                  <a:srgbClr val="FFFFFF"/>
+                </a:solidFill>
+              </a:rPr>
+              <a:t>Parrot.cs</a:t>
+            </a:r>
+            <a:r>
+              <a:rPr lang="en-US" sz="1300" dirty="0" smtClean="0">
+                <a:solidFill>
+                  <a:srgbClr val="FFFFFF"/>
+                </a:solidFill>
+              </a:rPr>
+              <a:t>, where the Parrot will only eat if it’s their </a:t>
+            </a:r>
+            <a:r>
+              <a:rPr lang="en-US" sz="1300" dirty="0" err="1" smtClean="0">
+                <a:solidFill>
+                  <a:srgbClr val="FFFFFF"/>
+                </a:solidFill>
+              </a:rPr>
+              <a:t>prefered</a:t>
+            </a:r>
+            <a:r>
+              <a:rPr lang="en-US" sz="1300" dirty="0" smtClean="0">
+                <a:solidFill>
+                  <a:srgbClr val="FFFFFF"/>
+                </a:solidFill>
+              </a:rPr>
+              <a:t> food.</a:t>
             </a:r>
           </a:p>
         </p:txBody>
@@ -4636,7 +5785,7 @@
     </p:spTree>
     <p:extLst>
       <p:ext uri="{BB962C8B-B14F-4D97-AF65-F5344CB8AC3E}">
-        <p14:creationId xmlns:p14="http://schemas.microsoft.com/office/powerpoint/2010/main" val="1606316147"/>
+        <p14:creationId xmlns:p14="http://schemas.microsoft.com/office/powerpoint/2010/main" val="3989909902"/>
       </p:ext>
     </p:extLst>
   </p:cSld>
@@ -4761,7 +5910,7 @@
           <a:p>
             <a:r>
               <a:rPr lang="en-US" dirty="0" smtClean="0"/>
-              <a:t>Practical</a:t>
+              <a:t>Practical: Putting it all together</a:t>
             </a:r>
             <a:endParaRPr lang="en-US" dirty="0"/>
           </a:p>
@@ -4784,7 +5933,15 @@
           <a:p>
             <a:r>
               <a:rPr lang="en-US" dirty="0"/>
-              <a:t>Make a new animal, Cat, that expands on Mammal. </a:t>
+              <a:t>Make a new animal, Cat, that </a:t>
+            </a:r>
+            <a:r>
+              <a:rPr lang="en-US" dirty="0" smtClean="0"/>
+              <a:t>inherits from Mammal</a:t>
+            </a:r>
+            <a:r>
+              <a:rPr lang="en-US" dirty="0"/>
+              <a:t>. </a:t>
             </a:r>
             <a:endParaRPr lang="en-US" dirty="0" smtClean="0"/>
           </a:p>
@@ -4933,7 +6090,15 @@
           <a:p>
             <a:r>
               <a:rPr lang="en-US" dirty="0" smtClean="0"/>
-              <a:t>Practical Skills</a:t>
+              <a:t>Basic OOP</a:t>
+            </a:r>
+            <a:r>
+              <a:rPr lang="en-US" dirty="0"/>
+              <a:t>: Abstraction </a:t>
+            </a:r>
+            <a:r>
+              <a:rPr lang="en-US" dirty="0" smtClean="0"/>
+              <a:t> and Encapsulation</a:t>
             </a:r>
             <a:endParaRPr lang="en-US" dirty="0"/>
           </a:p>
@@ -5027,8 +6192,98 @@
           <a:p>
             <a:r>
               <a:rPr lang="en-US" dirty="0"/>
-              <a:t>OOP is the practice of developing code in a manner where the focus is on the data, and the methods that it can perform. Generally, each object only cares about itself. Objects are generally noun-like; for example, _Pigeon_ or _Dog_</a:t>
-            </a:r>
+              <a:t>OOP is the practice of developing code in a manner where the focus is on the data, and the methods that it can perform. </a:t>
+            </a:r>
+            <a:endParaRPr lang="en-US" dirty="0" smtClean="0"/>
+          </a:p>
+          <a:p>
+            <a:r>
+              <a:rPr lang="en-US" dirty="0" smtClean="0"/>
+              <a:t>Each </a:t>
+            </a:r>
+            <a:r>
+              <a:rPr lang="en-US" dirty="0"/>
+              <a:t>object only cares about </a:t>
+            </a:r>
+            <a:r>
+              <a:rPr lang="en-US" dirty="0" smtClean="0"/>
+              <a:t>itself</a:t>
+            </a:r>
+            <a:r>
+              <a:rPr lang="en-US" dirty="0"/>
+              <a:t> </a:t>
+            </a:r>
+            <a:r>
+              <a:rPr lang="en-US" dirty="0" smtClean="0"/>
+              <a:t>and how it interacts with itself, and other objects.</a:t>
+            </a:r>
+            <a:endParaRPr lang="en-US" dirty="0" smtClean="0"/>
+          </a:p>
+          <a:p>
+            <a:r>
+              <a:rPr lang="en-US" dirty="0" smtClean="0"/>
+              <a:t>Objects </a:t>
+            </a:r>
+            <a:r>
+              <a:rPr lang="en-US" dirty="0"/>
+              <a:t>are generally noun-like; for example, </a:t>
+            </a:r>
+            <a:r>
+              <a:rPr lang="en-US" i="1" dirty="0" smtClean="0"/>
+              <a:t>Pidgeon</a:t>
+            </a:r>
+            <a:r>
+              <a:rPr lang="en-US" dirty="0" smtClean="0"/>
+              <a:t> or </a:t>
+            </a:r>
+            <a:r>
+              <a:rPr lang="en-US" i="1" dirty="0" smtClean="0"/>
+              <a:t>Dog</a:t>
+            </a:r>
+            <a:r>
+              <a:rPr lang="en-US" dirty="0" smtClean="0"/>
+              <a:t>.</a:t>
+            </a:r>
+          </a:p>
+          <a:p>
+            <a:r>
+              <a:rPr lang="en-US" dirty="0" smtClean="0"/>
+              <a:t>Even non-physical things and concepts can be represented in an OOP manner:</a:t>
+            </a:r>
+          </a:p>
+          <a:p>
+            <a:pPr lvl="1"/>
+            <a:r>
+              <a:rPr lang="en-US" dirty="0" smtClean="0"/>
+              <a:t>Lists are a representation of any ordered set of </a:t>
+            </a:r>
+            <a:r>
+              <a:rPr lang="en-US" i="1" dirty="0" smtClean="0"/>
+              <a:t>things</a:t>
+            </a:r>
+            <a:endParaRPr lang="en-US" dirty="0" smtClean="0"/>
+          </a:p>
+          <a:p>
+            <a:pPr lvl="1"/>
+            <a:r>
+              <a:rPr lang="en-US" dirty="0" smtClean="0"/>
+              <a:t>Sets are a representation of any unique set of </a:t>
+            </a:r>
+            <a:r>
+              <a:rPr lang="en-US" i="1" dirty="0" smtClean="0"/>
+              <a:t>things</a:t>
+            </a:r>
+            <a:endParaRPr lang="en-US" dirty="0" smtClean="0"/>
+          </a:p>
+          <a:p>
+            <a:pPr lvl="1"/>
+            <a:r>
+              <a:rPr lang="en-US" dirty="0" smtClean="0"/>
+              <a:t>Tweets are a representation of not-funny quips people say and images they post of their food.</a:t>
+            </a:r>
+          </a:p>
+          <a:p>
+            <a:endParaRPr lang="en-US" dirty="0"/>
           </a:p>
         </p:txBody>
       </p:sp>
@@ -5105,26 +6360,44 @@
           <a:lstStyle/>
           <a:p>
             <a:r>
-              <a:rPr lang="en-US" dirty="0" smtClean="0"/>
+              <a:rPr lang="en-US" u="sng" dirty="0" smtClean="0"/>
               <a:t>Abstraction</a:t>
             </a:r>
-          </a:p>
-          <a:p>
-            <a:r>
-              <a:rPr lang="en-US" dirty="0" smtClean="0"/>
+            <a:r>
+              <a:rPr lang="en-US" dirty="0" smtClean="0"/>
+              <a:t>: grouping and representing meaningful data together</a:t>
+            </a:r>
+          </a:p>
+          <a:p>
+            <a:r>
+              <a:rPr lang="en-US" u="sng" dirty="0" smtClean="0"/>
               <a:t>Encapsulation</a:t>
             </a:r>
-          </a:p>
-          <a:p>
-            <a:r>
-              <a:rPr lang="en-US" dirty="0" smtClean="0"/>
+            <a:r>
+              <a:rPr lang="en-US" dirty="0" smtClean="0"/>
+              <a:t>: hiding internal logic that the outside world does not care about</a:t>
+            </a:r>
+            <a:endParaRPr lang="en-US" dirty="0" smtClean="0"/>
+          </a:p>
+          <a:p>
+            <a:r>
+              <a:rPr lang="en-US" u="sng" dirty="0" smtClean="0"/>
               <a:t>Inheritance</a:t>
             </a:r>
-          </a:p>
-          <a:p>
-            <a:r>
-              <a:rPr lang="en-US" dirty="0" smtClean="0"/>
+            <a:r>
+              <a:rPr lang="en-US" dirty="0" smtClean="0"/>
+              <a:t>: objects can be based off other objects</a:t>
+            </a:r>
+            <a:endParaRPr lang="en-US" dirty="0" smtClean="0"/>
+          </a:p>
+          <a:p>
+            <a:r>
+              <a:rPr lang="en-US" u="sng" dirty="0" smtClean="0"/>
               <a:t>Polymorphism</a:t>
+            </a:r>
+            <a:r>
+              <a:rPr lang="en-US" dirty="0" smtClean="0"/>
+              <a:t>: we can have many ways of doing the same method on a class.</a:t>
             </a:r>
             <a:endParaRPr lang="en-US" dirty="0"/>
           </a:p>
@@ -5160,6 +6433,263 @@
           <a:chExt cx="0" cy="0"/>
         </a:xfrm>
       </p:grpSpPr>
+      <p:sp useBgFill="1">
+        <p:nvSpPr>
+          <p:cNvPr id="11" name="Rectangle 10"/>
+          <p:cNvSpPr>
+            <a:spLocks noGrp="1" noRot="1" noChangeAspect="1" noMove="1" noResize="1" noEditPoints="1" noAdjustHandles="1" noChangeArrowheads="1" noChangeShapeType="1" noTextEdit="1"/>
+          </p:cNvSpPr>
+          <p:nvPr>
+            <p:extLst>
+              <p:ext uri="{386F3935-93C4-4BCD-93E2-E3B085C9AB24}">
+                <p16:designElem xmlns:p16="http://schemas.microsoft.com/office/powerpoint/2015/main" val="1"/>
+              </p:ext>
+            </p:extLst>
+          </p:nvPr>
+        </p:nvSpPr>
+        <p:spPr>
+          <a:xfrm>
+            <a:off x="0" y="0"/>
+            <a:ext cx="12190459" cy="6858000"/>
+          </a:xfrm>
+          <a:prstGeom prst="rect">
+            <a:avLst/>
+          </a:prstGeom>
+          <a:ln>
+            <a:noFill/>
+          </a:ln>
+        </p:spPr>
+        <p:style>
+          <a:lnRef idx="2">
+            <a:schemeClr val="accent1">
+              <a:shade val="50000"/>
+            </a:schemeClr>
+          </a:lnRef>
+          <a:fillRef idx="1">
+            <a:schemeClr val="accent1"/>
+          </a:fillRef>
+          <a:effectRef idx="0">
+            <a:schemeClr val="accent1"/>
+          </a:effectRef>
+          <a:fontRef idx="minor">
+            <a:schemeClr val="lt1"/>
+          </a:fontRef>
+        </p:style>
+        <p:txBody>
+          <a:bodyPr rtlCol="0" anchor="ctr"/>
+          <a:lstStyle/>
+          <a:p>
+            <a:pPr algn="ctr"/>
+            <a:endParaRPr lang="en-US"/>
+          </a:p>
+        </p:txBody>
+      </p:sp>
+      <p:pic>
+        <p:nvPicPr>
+          <p:cNvPr id="6" name="Picture 5"/>
+          <p:cNvPicPr>
+            <a:picLocks noChangeAspect="1"/>
+          </p:cNvPicPr>
+          <p:nvPr/>
+        </p:nvPicPr>
+        <p:blipFill>
+          <a:blip r:embed="rId2">
+            <a:extLst>
+              <a:ext uri="{28A0092B-C50C-407E-A947-70E740481C1C}">
+                <a14:useLocalDpi xmlns:a14="http://schemas.microsoft.com/office/drawing/2010/main" val="0"/>
+              </a:ext>
+            </a:extLst>
+          </a:blip>
+          <a:stretch>
+            <a:fillRect/>
+          </a:stretch>
+        </p:blipFill>
+        <p:spPr>
+          <a:xfrm>
+            <a:off x="8096533" y="516835"/>
+            <a:ext cx="3609294" cy="2168269"/>
+          </a:xfrm>
+          <a:prstGeom prst="rect">
+            <a:avLst/>
+          </a:prstGeom>
+        </p:spPr>
+      </p:pic>
+      <p:sp>
+        <p:nvSpPr>
+          <p:cNvPr id="13" name="Rectangle 12"/>
+          <p:cNvSpPr>
+            <a:spLocks noGrp="1" noRot="1" noChangeAspect="1" noMove="1" noResize="1" noEditPoints="1" noAdjustHandles="1" noChangeArrowheads="1" noChangeShapeType="1" noTextEdit="1"/>
+          </p:cNvSpPr>
+          <p:nvPr>
+            <p:extLst>
+              <p:ext uri="{386F3935-93C4-4BCD-93E2-E3B085C9AB24}">
+                <p16:designElem xmlns:p16="http://schemas.microsoft.com/office/powerpoint/2015/main" val="1"/>
+              </p:ext>
+            </p:extLst>
+          </p:nvPr>
+        </p:nvSpPr>
+        <p:spPr bwMode="white">
+          <a:xfrm>
+            <a:off x="15" y="0"/>
+            <a:ext cx="7547879" cy="6858000"/>
+          </a:xfrm>
+          <a:prstGeom prst="rect">
+            <a:avLst/>
+          </a:prstGeom>
+          <a:solidFill>
+            <a:schemeClr val="accent2"/>
+          </a:solidFill>
+          <a:ln>
+            <a:noFill/>
+          </a:ln>
+        </p:spPr>
+        <p:style>
+          <a:lnRef idx="2">
+            <a:schemeClr val="accent1">
+              <a:shade val="50000"/>
+            </a:schemeClr>
+          </a:lnRef>
+          <a:fillRef idx="1">
+            <a:schemeClr val="accent1"/>
+          </a:fillRef>
+          <a:effectRef idx="0">
+            <a:schemeClr val="accent1"/>
+          </a:effectRef>
+          <a:fontRef idx="minor">
+            <a:schemeClr val="lt1"/>
+          </a:fontRef>
+        </p:style>
+      </p:sp>
+      <p:sp>
+        <p:nvSpPr>
+          <p:cNvPr id="15" name="Rectangle 14"/>
+          <p:cNvSpPr>
+            <a:spLocks noGrp="1" noRot="1" noChangeAspect="1" noMove="1" noResize="1" noEditPoints="1" noAdjustHandles="1" noChangeArrowheads="1" noChangeShapeType="1" noTextEdit="1"/>
+          </p:cNvSpPr>
+          <p:nvPr>
+            <p:extLst>
+              <p:ext uri="{386F3935-93C4-4BCD-93E2-E3B085C9AB24}">
+                <p16:designElem xmlns:p16="http://schemas.microsoft.com/office/powerpoint/2015/main" val="1"/>
+              </p:ext>
+            </p:extLst>
+          </p:nvPr>
+        </p:nvSpPr>
+        <p:spPr>
+          <a:xfrm>
+            <a:off x="7547894" y="0"/>
+            <a:ext cx="64008" cy="6858000"/>
+          </a:xfrm>
+          <a:prstGeom prst="rect">
+            <a:avLst/>
+          </a:prstGeom>
+          <a:solidFill>
+            <a:schemeClr val="accent1"/>
+          </a:solidFill>
+          <a:ln>
+            <a:noFill/>
+          </a:ln>
+        </p:spPr>
+        <p:style>
+          <a:lnRef idx="2">
+            <a:schemeClr val="accent1">
+              <a:shade val="50000"/>
+            </a:schemeClr>
+          </a:lnRef>
+          <a:fillRef idx="1">
+            <a:schemeClr val="accent1"/>
+          </a:fillRef>
+          <a:effectRef idx="0">
+            <a:schemeClr val="accent1"/>
+          </a:effectRef>
+          <a:fontRef idx="minor">
+            <a:schemeClr val="lt1"/>
+          </a:fontRef>
+        </p:style>
+      </p:sp>
+      <p:pic>
+        <p:nvPicPr>
+          <p:cNvPr id="7" name="Picture 6"/>
+          <p:cNvPicPr>
+            <a:picLocks noChangeAspect="1"/>
+          </p:cNvPicPr>
+          <p:nvPr/>
+        </p:nvPicPr>
+        <p:blipFill>
+          <a:blip r:embed="rId3">
+            <a:extLst>
+              <a:ext uri="{28A0092B-C50C-407E-A947-70E740481C1C}">
+                <a14:useLocalDpi xmlns:a14="http://schemas.microsoft.com/office/drawing/2010/main" val="0"/>
+              </a:ext>
+            </a:extLst>
+          </a:blip>
+          <a:stretch>
+            <a:fillRect/>
+          </a:stretch>
+        </p:blipFill>
+        <p:spPr>
+          <a:xfrm>
+            <a:off x="7611902" y="4172896"/>
+            <a:ext cx="4504363" cy="1463916"/>
+          </a:xfrm>
+          <a:prstGeom prst="rect">
+            <a:avLst/>
+          </a:prstGeom>
+        </p:spPr>
+      </p:pic>
+      <p:sp>
+        <p:nvSpPr>
+          <p:cNvPr id="17" name="Rectangle 16"/>
+          <p:cNvSpPr>
+            <a:spLocks noGrp="1" noRot="1" noChangeAspect="1" noMove="1" noResize="1" noEditPoints="1" noAdjustHandles="1" noChangeArrowheads="1" noChangeShapeType="1" noTextEdit="1"/>
+          </p:cNvSpPr>
+          <p:nvPr>
+            <p:extLst>
+              <p:ext uri="{386F3935-93C4-4BCD-93E2-E3B085C9AB24}">
+                <p16:designElem xmlns:p16="http://schemas.microsoft.com/office/powerpoint/2015/main" val="1"/>
+              </p:ext>
+            </p:extLst>
+          </p:nvPr>
+        </p:nvSpPr>
+        <p:spPr>
+          <a:xfrm>
+            <a:off x="7547894" y="3396996"/>
+            <a:ext cx="4642565" cy="64008"/>
+          </a:xfrm>
+          <a:prstGeom prst="rect">
+            <a:avLst/>
+          </a:prstGeom>
+          <a:solidFill>
+            <a:schemeClr val="accent1"/>
+          </a:solidFill>
+          <a:ln>
+            <a:noFill/>
+          </a:ln>
+        </p:spPr>
+        <p:style>
+          <a:lnRef idx="2">
+            <a:schemeClr val="accent1">
+              <a:shade val="50000"/>
+            </a:schemeClr>
+          </a:lnRef>
+          <a:fillRef idx="1">
+            <a:schemeClr val="accent1"/>
+          </a:fillRef>
+          <a:effectRef idx="0">
+            <a:schemeClr val="accent1"/>
+          </a:effectRef>
+          <a:fontRef idx="minor">
+            <a:schemeClr val="lt1"/>
+          </a:fontRef>
+        </p:style>
+        <p:txBody>
+          <a:bodyPr rtlCol="0" anchor="ctr"/>
+          <a:lstStyle/>
+          <a:p>
+            <a:pPr algn="ctr"/>
+            <a:endParaRPr lang="en-US"/>
+          </a:p>
+        </p:txBody>
+      </p:sp>
       <p:sp>
         <p:nvSpPr>
           <p:cNvPr id="2" name="Title 1"/>
@@ -5170,30 +6700,12 @@
             <p:ph type="title"/>
           </p:nvPr>
         </p:nvSpPr>
-        <p:spPr/>
-        <p:txBody>
-          <a:bodyPr/>
-          <a:lstStyle/>
-          <a:p>
-            <a:r>
-              <a:rPr lang="en-US" dirty="0" smtClean="0"/>
-              <a:t>What is abstraction?</a:t>
-            </a:r>
-            <a:endParaRPr lang="en-US" dirty="0"/>
-          </a:p>
-        </p:txBody>
-      </p:sp>
-      <p:sp>
-        <p:nvSpPr>
-          <p:cNvPr id="3" name="Content Placeholder 2"/>
-          <p:cNvSpPr>
-            <a:spLocks noGrp="1"/>
-          </p:cNvSpPr>
-          <p:nvPr>
-            <p:ph idx="1"/>
-          </p:nvPr>
-        </p:nvSpPr>
-        <p:spPr/>
+        <p:spPr>
+          <a:xfrm>
+            <a:off x="1097280" y="516835"/>
+            <a:ext cx="5977937" cy="1666501"/>
+          </a:xfrm>
+        </p:spPr>
         <p:txBody>
           <a:bodyPr>
             <a:normAutofit/>
@@ -5201,23 +6713,135 @@
           <a:lstStyle/>
           <a:p>
             <a:r>
-              <a:rPr lang="en-US" dirty="0"/>
+              <a:rPr lang="en-US" sz="4000">
+                <a:solidFill>
+                  <a:srgbClr val="FFFFFF"/>
+                </a:solidFill>
+              </a:rPr>
+              <a:t>What is abstraction?</a:t>
+            </a:r>
+          </a:p>
+        </p:txBody>
+      </p:sp>
+      <p:sp>
+        <p:nvSpPr>
+          <p:cNvPr id="3" name="Content Placeholder 2"/>
+          <p:cNvSpPr>
+            <a:spLocks noGrp="1"/>
+          </p:cNvSpPr>
+          <p:nvPr>
+            <p:ph idx="1"/>
+          </p:nvPr>
+        </p:nvSpPr>
+        <p:spPr>
+          <a:xfrm>
+            <a:off x="1097279" y="2236304"/>
+            <a:ext cx="5977938" cy="3652667"/>
+          </a:xfrm>
+        </p:spPr>
+        <p:txBody>
+          <a:bodyPr>
+            <a:normAutofit/>
+          </a:bodyPr>
+          <a:lstStyle/>
+          <a:p>
+            <a:r>
+              <a:rPr lang="en-US" sz="1800" dirty="0">
+                <a:solidFill>
+                  <a:srgbClr val="FFFFFF"/>
+                </a:solidFill>
+              </a:rPr>
               <a:t>Abstraction is the concept of taking your procedures and grouping them together in a reasonable fashion</a:t>
             </a:r>
             <a:r>
-              <a:rPr lang="en-US" dirty="0" smtClean="0"/>
+              <a:rPr lang="en-US" sz="1800" dirty="0" smtClean="0">
+                <a:solidFill>
+                  <a:srgbClr val="FFFFFF"/>
+                </a:solidFill>
+              </a:rPr>
               <a:t>.</a:t>
             </a:r>
           </a:p>
           <a:p>
-            <a:endParaRPr lang="en-US" dirty="0"/>
+            <a:r>
+              <a:rPr lang="en-US" sz="1800" dirty="0" smtClean="0">
+                <a:solidFill>
+                  <a:srgbClr val="FFFFFF"/>
+                </a:solidFill>
+              </a:rPr>
+              <a:t>On top, we see a procedural way of writing code without classes or objects. We just see a line by line description of what our program is supposed to do </a:t>
+            </a:r>
+            <a:r>
+              <a:rPr lang="mr-IN" sz="1800" dirty="0" smtClean="0">
+                <a:solidFill>
+                  <a:srgbClr val="FFFFFF"/>
+                </a:solidFill>
+              </a:rPr>
+              <a:t>–</a:t>
+            </a:r>
+            <a:r>
+              <a:rPr lang="en-US" sz="1800" dirty="0" smtClean="0">
+                <a:solidFill>
+                  <a:srgbClr val="FFFFFF"/>
+                </a:solidFill>
+              </a:rPr>
+              <a:t> it is very limited to the current intent of the program, and not very expandable.</a:t>
+            </a:r>
+          </a:p>
+          <a:p>
+            <a:r>
+              <a:rPr lang="en-US" sz="1800" dirty="0" smtClean="0">
+                <a:solidFill>
+                  <a:srgbClr val="FFFFFF"/>
+                </a:solidFill>
+              </a:rPr>
+              <a:t>Below, we see a grouping based on commonality. We make animals, of different types, by constructing new classes. </a:t>
+            </a:r>
+          </a:p>
+          <a:p>
+            <a:r>
+              <a:rPr lang="en-US" sz="1800" dirty="0" smtClean="0">
+                <a:solidFill>
+                  <a:srgbClr val="FFFFFF"/>
+                </a:solidFill>
+              </a:rPr>
+              <a:t>Let’s take a look at </a:t>
+            </a:r>
+            <a:r>
+              <a:rPr lang="en-US" sz="1800" dirty="0" err="1" smtClean="0">
+                <a:solidFill>
+                  <a:srgbClr val="FFFFFF"/>
+                </a:solidFill>
+              </a:rPr>
+              <a:t>IAnimal.cs</a:t>
+            </a:r>
+            <a:r>
+              <a:rPr lang="en-US" sz="1800" dirty="0" smtClean="0">
+                <a:solidFill>
+                  <a:srgbClr val="FFFFFF"/>
+                </a:solidFill>
+              </a:rPr>
+              <a:t> in order to see how we’d define an interface for our animal.</a:t>
+            </a:r>
+            <a:endParaRPr lang="en-US" sz="1800" dirty="0" smtClean="0">
+              <a:solidFill>
+                <a:srgbClr val="FFFFFF"/>
+              </a:solidFill>
+            </a:endParaRPr>
+          </a:p>
+          <a:p>
+            <a:endParaRPr lang="en-US" sz="1800" dirty="0">
+              <a:solidFill>
+                <a:srgbClr val="FFFFFF"/>
+              </a:solidFill>
+            </a:endParaRPr>
           </a:p>
         </p:txBody>
       </p:sp>
     </p:spTree>
     <p:extLst>
       <p:ext uri="{BB962C8B-B14F-4D97-AF65-F5344CB8AC3E}">
-        <p14:creationId xmlns:p14="http://schemas.microsoft.com/office/powerpoint/2010/main" val="1171804901"/>
+        <p14:creationId xmlns:p14="http://schemas.microsoft.com/office/powerpoint/2010/main" val="2878518170"/>
       </p:ext>
     </p:extLst>
   </p:cSld>
@@ -5444,13 +7068,42 @@
             </a:r>
             <a:r>
               <a:rPr lang="en-US" dirty="0" smtClean="0"/>
-              <a:t>.</a:t>
-            </a:r>
+              <a:t>. (See </a:t>
+            </a:r>
+            <a:r>
+              <a:rPr lang="en-US" dirty="0" err="1" smtClean="0"/>
+              <a:t>dog.js</a:t>
+            </a:r>
+            <a:r>
+              <a:rPr lang="en-US" dirty="0" smtClean="0"/>
+              <a:t> </a:t>
+            </a:r>
+            <a:r>
+              <a:rPr lang="en-US" i="1" dirty="0" smtClean="0"/>
+              <a:t>Eat </a:t>
+            </a:r>
+            <a:r>
+              <a:rPr lang="en-US" dirty="0" smtClean="0"/>
+              <a:t>method for an abstraction of that!</a:t>
+            </a:r>
+            <a:r>
+              <a:rPr lang="en-US" dirty="0" smtClean="0"/>
+              <a:t>)</a:t>
+            </a:r>
+            <a:endParaRPr lang="en-US" dirty="0" smtClean="0"/>
           </a:p>
           <a:p>
             <a:r>
               <a:rPr lang="en-US" dirty="0"/>
-              <a:t>Real world example: You don't know how the parrot will decide to speak, but it will emulate something spoken to. You just want to get the result of it speaking</a:t>
+              <a:t>Real world example: You </a:t>
+            </a:r>
+            <a:r>
+              <a:rPr lang="en-US" dirty="0" smtClean="0"/>
+              <a:t>also don't </a:t>
+            </a:r>
+            <a:r>
+              <a:rPr lang="en-US" dirty="0"/>
+              <a:t>know how the parrot will decide to speak, but it will emulate something spoken to. You just want to get the result of it speaking</a:t>
             </a:r>
             <a:r>
               <a:rPr lang="en-US" dirty="0" smtClean="0"/>
@@ -5495,6 +7148,179 @@
           <a:chExt cx="0" cy="0"/>
         </a:xfrm>
       </p:grpSpPr>
+      <p:sp useBgFill="1">
+        <p:nvSpPr>
+          <p:cNvPr id="8" name="Rectangle 7"/>
+          <p:cNvSpPr>
+            <a:spLocks noGrp="1" noRot="1" noChangeAspect="1" noMove="1" noResize="1" noEditPoints="1" noAdjustHandles="1" noChangeArrowheads="1" noChangeShapeType="1" noTextEdit="1"/>
+          </p:cNvSpPr>
+          <p:nvPr>
+            <p:extLst>
+              <p:ext uri="{386F3935-93C4-4BCD-93E2-E3B085C9AB24}">
+                <p16:designElem xmlns:p16="http://schemas.microsoft.com/office/powerpoint/2015/main" val="1"/>
+              </p:ext>
+            </p:extLst>
+          </p:nvPr>
+        </p:nvSpPr>
+        <p:spPr>
+          <a:xfrm>
+            <a:off x="0" y="0"/>
+            <a:ext cx="12186315" cy="6858000"/>
+          </a:xfrm>
+          <a:prstGeom prst="rect">
+            <a:avLst/>
+          </a:prstGeom>
+          <a:ln>
+            <a:noFill/>
+          </a:ln>
+        </p:spPr>
+        <p:style>
+          <a:lnRef idx="2">
+            <a:schemeClr val="accent6">
+              <a:shade val="50000"/>
+            </a:schemeClr>
+          </a:lnRef>
+          <a:fillRef idx="1001">
+            <a:schemeClr val="lt1"/>
+          </a:fillRef>
+          <a:effectRef idx="0">
+            <a:schemeClr val="accent6"/>
+          </a:effectRef>
+          <a:fontRef idx="minor">
+            <a:schemeClr val="lt1"/>
+          </a:fontRef>
+        </p:style>
+        <p:txBody>
+          <a:bodyPr rtlCol="0" anchor="ctr"/>
+          <a:lstStyle/>
+          <a:p>
+            <a:pPr algn="ctr"/>
+            <a:endParaRPr lang="en-US"/>
+          </a:p>
+        </p:txBody>
+      </p:sp>
+      <p:sp>
+        <p:nvSpPr>
+          <p:cNvPr id="10" name="Rectangle 9"/>
+          <p:cNvSpPr>
+            <a:spLocks noGrp="1" noRot="1" noChangeAspect="1" noMove="1" noResize="1" noEditPoints="1" noAdjustHandles="1" noChangeArrowheads="1" noChangeShapeType="1" noTextEdit="1"/>
+          </p:cNvSpPr>
+          <p:nvPr>
+            <p:extLst>
+              <p:ext uri="{386F3935-93C4-4BCD-93E2-E3B085C9AB24}">
+                <p16:designElem xmlns:p16="http://schemas.microsoft.com/office/powerpoint/2015/main" val="1"/>
+              </p:ext>
+            </p:extLst>
+          </p:nvPr>
+        </p:nvSpPr>
+        <p:spPr>
+          <a:xfrm>
+            <a:off x="16" y="0"/>
+            <a:ext cx="4050791" cy="6858000"/>
+          </a:xfrm>
+          <a:prstGeom prst="rect">
+            <a:avLst/>
+          </a:prstGeom>
+          <a:solidFill>
+            <a:schemeClr val="accent2"/>
+          </a:solidFill>
+          <a:ln>
+            <a:noFill/>
+          </a:ln>
+        </p:spPr>
+        <p:style>
+          <a:lnRef idx="2">
+            <a:schemeClr val="accent1">
+              <a:shade val="50000"/>
+            </a:schemeClr>
+          </a:lnRef>
+          <a:fillRef idx="1">
+            <a:schemeClr val="accent1"/>
+          </a:fillRef>
+          <a:effectRef idx="0">
+            <a:schemeClr val="accent1"/>
+          </a:effectRef>
+          <a:fontRef idx="minor">
+            <a:schemeClr val="lt1"/>
+          </a:fontRef>
+        </p:style>
+      </p:sp>
+      <p:sp>
+        <p:nvSpPr>
+          <p:cNvPr id="12" name="Rectangle 11"/>
+          <p:cNvSpPr>
+            <a:spLocks noGrp="1" noRot="1" noChangeAspect="1" noMove="1" noResize="1" noEditPoints="1" noAdjustHandles="1" noChangeArrowheads="1" noChangeShapeType="1" noTextEdit="1"/>
+          </p:cNvSpPr>
+          <p:nvPr>
+            <p:extLst>
+              <p:ext uri="{386F3935-93C4-4BCD-93E2-E3B085C9AB24}">
+                <p16:designElem xmlns:p16="http://schemas.microsoft.com/office/powerpoint/2015/main" val="1"/>
+              </p:ext>
+            </p:extLst>
+          </p:nvPr>
+        </p:nvSpPr>
+        <p:spPr>
+          <a:xfrm>
+            <a:off x="4040071" y="0"/>
+            <a:ext cx="64008" cy="6858000"/>
+          </a:xfrm>
+          <a:prstGeom prst="rect">
+            <a:avLst/>
+          </a:prstGeom>
+          <a:solidFill>
+            <a:schemeClr val="accent1"/>
+          </a:solidFill>
+          <a:ln>
+            <a:noFill/>
+          </a:ln>
+        </p:spPr>
+        <p:style>
+          <a:lnRef idx="2">
+            <a:schemeClr val="accent1">
+              <a:shade val="50000"/>
+            </a:schemeClr>
+          </a:lnRef>
+          <a:fillRef idx="1">
+            <a:schemeClr val="accent1"/>
+          </a:fillRef>
+          <a:effectRef idx="0">
+            <a:schemeClr val="accent1"/>
+          </a:effectRef>
+          <a:fontRef idx="minor">
+            <a:schemeClr val="lt1"/>
+          </a:fontRef>
+        </p:style>
+      </p:sp>
+      <p:pic>
+        <p:nvPicPr>
+          <p:cNvPr id="4" name="Picture 3"/>
+          <p:cNvPicPr>
+            <a:picLocks noChangeAspect="1"/>
+          </p:cNvPicPr>
+          <p:nvPr/>
+        </p:nvPicPr>
+        <p:blipFill>
+          <a:blip r:embed="rId2">
+            <a:extLst>
+              <a:ext uri="{28A0092B-C50C-407E-A947-70E740481C1C}">
+                <a14:useLocalDpi xmlns:a14="http://schemas.microsoft.com/office/drawing/2010/main" val="0"/>
+              </a:ext>
+            </a:extLst>
+          </a:blip>
+          <a:stretch>
+            <a:fillRect/>
+          </a:stretch>
+        </p:blipFill>
+        <p:spPr>
+          <a:xfrm>
+            <a:off x="4935403" y="640080"/>
+            <a:ext cx="6411310" cy="5577840"/>
+          </a:xfrm>
+          <a:prstGeom prst="rect">
+            <a:avLst/>
+          </a:prstGeom>
+        </p:spPr>
+      </p:pic>
       <p:sp>
         <p:nvSpPr>
           <p:cNvPr id="2" name="Title 1"/>
@@ -5505,20 +7331,26 @@
             <p:ph type="title"/>
           </p:nvPr>
         </p:nvSpPr>
-        <p:spPr/>
-        <p:txBody>
-          <a:bodyPr/>
-          <a:lstStyle/>
-          <a:p>
-            <a:r>
-              <a:rPr lang="en-US" dirty="0"/>
-              <a:t>What is an </a:t>
-            </a:r>
-            <a:r>
-              <a:rPr lang="en-US" dirty="0" smtClean="0"/>
-              <a:t>interface?</a:t>
-            </a:r>
-            <a:endParaRPr lang="en-US" dirty="0"/>
+        <p:spPr>
+          <a:xfrm>
+            <a:off x="492370" y="516835"/>
+            <a:ext cx="3084844" cy="2103875"/>
+          </a:xfrm>
+        </p:spPr>
+        <p:txBody>
+          <a:bodyPr>
+            <a:normAutofit/>
+          </a:bodyPr>
+          <a:lstStyle/>
+          <a:p>
+            <a:r>
+              <a:rPr lang="en-US" sz="3600">
+                <a:solidFill>
+                  <a:srgbClr val="FFFFFF"/>
+                </a:solidFill>
+              </a:rPr>
+              <a:t>What is an interface?</a:t>
+            </a:r>
           </a:p>
         </p:txBody>
       </p:sp>
@@ -5532,128 +7364,114 @@
             <p:ph idx="1"/>
           </p:nvPr>
         </p:nvSpPr>
-        <p:spPr/>
-        <p:txBody>
-          <a:bodyPr/>
-          <a:lstStyle/>
-          <a:p>
-            <a:r>
-              <a:rPr lang="en-US" dirty="0"/>
-              <a:t>An interface is a contract that describes </a:t>
-            </a:r>
-            <a:r>
-              <a:rPr lang="en-US" dirty="0" smtClean="0"/>
-              <a:t>what </a:t>
-            </a:r>
-            <a:r>
-              <a:rPr lang="en-US" dirty="0"/>
-              <a:t>a class has and how it is expected to behave</a:t>
-            </a:r>
-            <a:r>
-              <a:rPr lang="en-US" dirty="0" smtClean="0"/>
+        <p:spPr>
+          <a:xfrm>
+            <a:off x="492371" y="2653800"/>
+            <a:ext cx="3084844" cy="3335519"/>
+          </a:xfrm>
+        </p:spPr>
+        <p:txBody>
+          <a:bodyPr>
+            <a:normAutofit/>
+          </a:bodyPr>
+          <a:lstStyle/>
+          <a:p>
+            <a:r>
+              <a:rPr lang="en-US" sz="1500" dirty="0">
+                <a:solidFill>
+                  <a:srgbClr val="FFFFFF"/>
+                </a:solidFill>
+              </a:rPr>
+              <a:t>An interface is a contract that describes what a class has and how it is expected to behave.</a:t>
+            </a:r>
+          </a:p>
+          <a:p>
+            <a:r>
+              <a:rPr lang="en-US" sz="1500" dirty="0" smtClean="0">
+                <a:solidFill>
+                  <a:srgbClr val="FFFFFF"/>
+                </a:solidFill>
+              </a:rPr>
+              <a:t>When </a:t>
+            </a:r>
+            <a:r>
+              <a:rPr lang="en-US" sz="1500" dirty="0">
+                <a:solidFill>
+                  <a:srgbClr val="FFFFFF"/>
+                </a:solidFill>
+              </a:rPr>
+              <a:t>we make animals, they would </a:t>
+            </a:r>
+            <a:r>
+              <a:rPr lang="en-US" sz="1500" dirty="0" smtClean="0">
+                <a:solidFill>
+                  <a:srgbClr val="FFFFFF"/>
+                </a:solidFill>
+              </a:rPr>
+              <a:t>implement </a:t>
+            </a:r>
+            <a:r>
+              <a:rPr lang="en-US" sz="1500" dirty="0" err="1" smtClean="0">
+                <a:solidFill>
+                  <a:srgbClr val="FFFFFF"/>
+                </a:solidFill>
+              </a:rPr>
+              <a:t>IAnimal</a:t>
+            </a:r>
+            <a:r>
+              <a:rPr lang="en-US" sz="1500" dirty="0">
+                <a:solidFill>
+                  <a:srgbClr val="FFFFFF"/>
+                </a:solidFill>
+              </a:rPr>
+              <a:t>, </a:t>
+            </a:r>
+            <a:r>
+              <a:rPr lang="en-US" sz="1500" dirty="0" smtClean="0">
+                <a:solidFill>
+                  <a:srgbClr val="FFFFFF"/>
+                </a:solidFill>
+              </a:rPr>
+              <a:t>which means they would have all the properties and methods defined in </a:t>
+            </a:r>
+            <a:r>
+              <a:rPr lang="en-US" sz="1500" dirty="0" err="1" smtClean="0">
+                <a:solidFill>
+                  <a:srgbClr val="FFFFFF"/>
+                </a:solidFill>
+              </a:rPr>
+              <a:t>Ianimal</a:t>
+            </a:r>
+            <a:r>
+              <a:rPr lang="en-US" sz="1500" dirty="0" smtClean="0">
+                <a:solidFill>
+                  <a:srgbClr val="FFFFFF"/>
+                </a:solidFill>
+              </a:rPr>
               <a:t>.</a:t>
             </a:r>
           </a:p>
           <a:p>
             <a:r>
-              <a:rPr lang="en-US" dirty="0"/>
-              <a:t>Let us take an animal: animals eat, and animals make noise. Animals also have a Food type that they expect to eat, a hunger level, and </a:t>
-            </a:r>
-            <a:r>
-              <a:rPr lang="en-US" dirty="0" smtClean="0"/>
-              <a:t>a </a:t>
-            </a:r>
-            <a:r>
-              <a:rPr lang="en-US" dirty="0"/>
-              <a:t>number representing how human friendly they are</a:t>
-            </a:r>
-            <a:r>
-              <a:rPr lang="en-US" dirty="0" smtClean="0"/>
-              <a:t>.</a:t>
-            </a:r>
-          </a:p>
-          <a:p>
-            <a:r>
-              <a:rPr lang="en-US" dirty="0"/>
-              <a:t>So we would make an animal, </a:t>
-            </a:r>
-            <a:r>
-              <a:rPr lang="en-US" dirty="0" err="1"/>
-              <a:t>IAnimal</a:t>
-            </a:r>
-            <a:r>
-              <a:rPr lang="en-US" dirty="0"/>
-              <a:t>, that has:	 		string </a:t>
-            </a:r>
-            <a:r>
-              <a:rPr lang="en-US" dirty="0" err="1"/>
-              <a:t>ExpectedFood</a:t>
-            </a:r>
-            <a:r>
-              <a:rPr lang="en-US" dirty="0"/>
-              <a:t>	 		</a:t>
-            </a:r>
-            <a:r>
-              <a:rPr lang="en-US" dirty="0" err="1"/>
-              <a:t>int</a:t>
-            </a:r>
-            <a:r>
-              <a:rPr lang="en-US" dirty="0"/>
-              <a:t> </a:t>
-            </a:r>
-            <a:r>
-              <a:rPr lang="en-US" dirty="0" err="1"/>
-              <a:t>HungerLevel</a:t>
-            </a:r>
-            <a:r>
-              <a:rPr lang="en-US" dirty="0"/>
-              <a:t>	 		</a:t>
-            </a:r>
-            <a:r>
-              <a:rPr lang="en-US" dirty="0" err="1"/>
-              <a:t>int</a:t>
-            </a:r>
-            <a:r>
-              <a:rPr lang="en-US" dirty="0"/>
-              <a:t> </a:t>
-            </a:r>
-            <a:r>
-              <a:rPr lang="en-US" dirty="0" err="1" smtClean="0"/>
-              <a:t>HumanFriendlyLevel</a:t>
-            </a:r>
-            <a:endParaRPr lang="en-US" dirty="0" smtClean="0"/>
-          </a:p>
-          <a:p>
-            <a:endParaRPr lang="en-US" dirty="0"/>
-          </a:p>
-          <a:p>
-            <a:r>
-              <a:rPr lang="en-US" dirty="0"/>
-              <a:t> </a:t>
-            </a:r>
-            <a:r>
-              <a:rPr lang="en-US" dirty="0" smtClean="0"/>
-              <a:t>When </a:t>
-            </a:r>
-            <a:r>
-              <a:rPr lang="en-US" dirty="0"/>
-              <a:t>we make animals, they would inherit from </a:t>
-            </a:r>
-            <a:r>
-              <a:rPr lang="en-US" dirty="0" err="1"/>
-              <a:t>IAnimal</a:t>
-            </a:r>
-            <a:r>
-              <a:rPr lang="en-US" dirty="0"/>
-              <a:t>, which means they would implement</a:t>
-            </a:r>
+              <a:rPr lang="en-US" sz="1500" dirty="0" smtClean="0">
+                <a:solidFill>
+                  <a:srgbClr val="FFFFFF"/>
+                </a:solidFill>
+              </a:rPr>
+              <a:t>Interfaces can implement other interfaces, as well!</a:t>
+            </a:r>
+            <a:endParaRPr lang="en-US" sz="1500" dirty="0">
+              <a:solidFill>
+                <a:srgbClr val="FFFFFF"/>
+              </a:solidFill>
+            </a:endParaRPr>
           </a:p>
         </p:txBody>
       </p:sp>
     </p:spTree>
     <p:extLst>
       <p:ext uri="{BB962C8B-B14F-4D97-AF65-F5344CB8AC3E}">
-        <p14:creationId xmlns:p14="http://schemas.microsoft.com/office/powerpoint/2010/main" val="1988835254"/>
+        <p14:creationId xmlns:p14="http://schemas.microsoft.com/office/powerpoint/2010/main" val="2930259487"/>
       </p:ext>
     </p:extLst>
   </p:cSld>
@@ -5680,6 +7498,179 @@
           <a:chExt cx="0" cy="0"/>
         </a:xfrm>
       </p:grpSpPr>
+      <p:sp useBgFill="1">
+        <p:nvSpPr>
+          <p:cNvPr id="16" name="Rectangle 15"/>
+          <p:cNvSpPr>
+            <a:spLocks noGrp="1" noRot="1" noChangeAspect="1" noMove="1" noResize="1" noEditPoints="1" noAdjustHandles="1" noChangeArrowheads="1" noChangeShapeType="1" noTextEdit="1"/>
+          </p:cNvSpPr>
+          <p:nvPr>
+            <p:extLst>
+              <p:ext uri="{386F3935-93C4-4BCD-93E2-E3B085C9AB24}">
+                <p16:designElem xmlns:p16="http://schemas.microsoft.com/office/powerpoint/2015/main" val="1"/>
+              </p:ext>
+            </p:extLst>
+          </p:nvPr>
+        </p:nvSpPr>
+        <p:spPr>
+          <a:xfrm>
+            <a:off x="0" y="0"/>
+            <a:ext cx="12186315" cy="6858000"/>
+          </a:xfrm>
+          <a:prstGeom prst="rect">
+            <a:avLst/>
+          </a:prstGeom>
+          <a:ln>
+            <a:noFill/>
+          </a:ln>
+        </p:spPr>
+        <p:style>
+          <a:lnRef idx="2">
+            <a:schemeClr val="accent6">
+              <a:shade val="50000"/>
+            </a:schemeClr>
+          </a:lnRef>
+          <a:fillRef idx="1001">
+            <a:schemeClr val="lt1"/>
+          </a:fillRef>
+          <a:effectRef idx="0">
+            <a:schemeClr val="accent6"/>
+          </a:effectRef>
+          <a:fontRef idx="minor">
+            <a:schemeClr val="lt1"/>
+          </a:fontRef>
+        </p:style>
+        <p:txBody>
+          <a:bodyPr rtlCol="0" anchor="ctr"/>
+          <a:lstStyle/>
+          <a:p>
+            <a:pPr algn="ctr"/>
+            <a:endParaRPr lang="en-US"/>
+          </a:p>
+        </p:txBody>
+      </p:sp>
+      <p:sp>
+        <p:nvSpPr>
+          <p:cNvPr id="18" name="Rectangle 17"/>
+          <p:cNvSpPr>
+            <a:spLocks noGrp="1" noRot="1" noChangeAspect="1" noMove="1" noResize="1" noEditPoints="1" noAdjustHandles="1" noChangeArrowheads="1" noChangeShapeType="1" noTextEdit="1"/>
+          </p:cNvSpPr>
+          <p:nvPr>
+            <p:extLst>
+              <p:ext uri="{386F3935-93C4-4BCD-93E2-E3B085C9AB24}">
+                <p16:designElem xmlns:p16="http://schemas.microsoft.com/office/powerpoint/2015/main" val="1"/>
+              </p:ext>
+            </p:extLst>
+          </p:nvPr>
+        </p:nvSpPr>
+        <p:spPr>
+          <a:xfrm>
+            <a:off x="16" y="0"/>
+            <a:ext cx="4050791" cy="6858000"/>
+          </a:xfrm>
+          <a:prstGeom prst="rect">
+            <a:avLst/>
+          </a:prstGeom>
+          <a:solidFill>
+            <a:schemeClr val="accent2"/>
+          </a:solidFill>
+          <a:ln>
+            <a:noFill/>
+          </a:ln>
+        </p:spPr>
+        <p:style>
+          <a:lnRef idx="2">
+            <a:schemeClr val="accent1">
+              <a:shade val="50000"/>
+            </a:schemeClr>
+          </a:lnRef>
+          <a:fillRef idx="1">
+            <a:schemeClr val="accent1"/>
+          </a:fillRef>
+          <a:effectRef idx="0">
+            <a:schemeClr val="accent1"/>
+          </a:effectRef>
+          <a:fontRef idx="minor">
+            <a:schemeClr val="lt1"/>
+          </a:fontRef>
+        </p:style>
+      </p:sp>
+      <p:sp>
+        <p:nvSpPr>
+          <p:cNvPr id="20" name="Rectangle 19"/>
+          <p:cNvSpPr>
+            <a:spLocks noGrp="1" noRot="1" noChangeAspect="1" noMove="1" noResize="1" noEditPoints="1" noAdjustHandles="1" noChangeArrowheads="1" noChangeShapeType="1" noTextEdit="1"/>
+          </p:cNvSpPr>
+          <p:nvPr>
+            <p:extLst>
+              <p:ext uri="{386F3935-93C4-4BCD-93E2-E3B085C9AB24}">
+                <p16:designElem xmlns:p16="http://schemas.microsoft.com/office/powerpoint/2015/main" val="1"/>
+              </p:ext>
+            </p:extLst>
+          </p:nvPr>
+        </p:nvSpPr>
+        <p:spPr>
+          <a:xfrm>
+            <a:off x="4040071" y="0"/>
+            <a:ext cx="64008" cy="6858000"/>
+          </a:xfrm>
+          <a:prstGeom prst="rect">
+            <a:avLst/>
+          </a:prstGeom>
+          <a:solidFill>
+            <a:schemeClr val="accent1"/>
+          </a:solidFill>
+          <a:ln>
+            <a:noFill/>
+          </a:ln>
+        </p:spPr>
+        <p:style>
+          <a:lnRef idx="2">
+            <a:schemeClr val="accent1">
+              <a:shade val="50000"/>
+            </a:schemeClr>
+          </a:lnRef>
+          <a:fillRef idx="1">
+            <a:schemeClr val="accent1"/>
+          </a:fillRef>
+          <a:effectRef idx="0">
+            <a:schemeClr val="accent1"/>
+          </a:effectRef>
+          <a:fontRef idx="minor">
+            <a:schemeClr val="lt1"/>
+          </a:fontRef>
+        </p:style>
+      </p:sp>
+      <p:pic>
+        <p:nvPicPr>
+          <p:cNvPr id="5" name="Picture 4"/>
+          <p:cNvPicPr>
+            <a:picLocks noChangeAspect="1"/>
+          </p:cNvPicPr>
+          <p:nvPr/>
+        </p:nvPicPr>
+        <p:blipFill>
+          <a:blip r:embed="rId2">
+            <a:extLst>
+              <a:ext uri="{28A0092B-C50C-407E-A947-70E740481C1C}">
+                <a14:useLocalDpi xmlns:a14="http://schemas.microsoft.com/office/drawing/2010/main" val="0"/>
+              </a:ext>
+            </a:extLst>
+          </a:blip>
+          <a:stretch>
+            <a:fillRect/>
+          </a:stretch>
+        </p:blipFill>
+        <p:spPr>
+          <a:xfrm>
+            <a:off x="4742017" y="1398073"/>
+            <a:ext cx="6798082" cy="4061853"/>
+          </a:xfrm>
+          <a:prstGeom prst="rect">
+            <a:avLst/>
+          </a:prstGeom>
+        </p:spPr>
+      </p:pic>
       <p:sp>
         <p:nvSpPr>
           <p:cNvPr id="2" name="Title 1"/>
@@ -5690,13 +7681,24 @@
             <p:ph type="title"/>
           </p:nvPr>
         </p:nvSpPr>
-        <p:spPr/>
-        <p:txBody>
-          <a:bodyPr/>
-          <a:lstStyle/>
-          <a:p>
-            <a:r>
-              <a:rPr lang="en-US" dirty="0"/>
+        <p:spPr>
+          <a:xfrm>
+            <a:off x="492370" y="516835"/>
+            <a:ext cx="3084844" cy="2103875"/>
+          </a:xfrm>
+        </p:spPr>
+        <p:txBody>
+          <a:bodyPr>
+            <a:normAutofit/>
+          </a:bodyPr>
+          <a:lstStyle/>
+          <a:p>
+            <a:r>
+              <a:rPr lang="en-US" sz="3600">
+                <a:solidFill>
+                  <a:srgbClr val="FFFFFF"/>
+                </a:solidFill>
+              </a:rPr>
               <a:t>How do we implement an interface in C#?</a:t>
             </a:r>
           </a:p>
@@ -5712,22 +7714,138 @@
             <p:ph idx="1"/>
           </p:nvPr>
         </p:nvSpPr>
-        <p:spPr/>
-        <p:txBody>
-          <a:bodyPr/>
-          <a:lstStyle/>
-          <a:p>
-            <a:r>
-              <a:rPr lang="en-US" dirty="0"/>
+        <p:spPr>
+          <a:xfrm>
+            <a:off x="492371" y="2653800"/>
+            <a:ext cx="3084844" cy="3335519"/>
+          </a:xfrm>
+        </p:spPr>
+        <p:txBody>
+          <a:bodyPr>
+            <a:normAutofit/>
+          </a:bodyPr>
+          <a:lstStyle/>
+          <a:p>
+            <a:r>
+              <a:rPr lang="en-US" sz="1500" dirty="0">
+                <a:solidFill>
+                  <a:srgbClr val="FFFFFF"/>
+                </a:solidFill>
+              </a:rPr>
               <a:t>Implementation is a fulfillment of an interface; to implement an interface, your class needs to have all the properties and methods defined in the interface.</a:t>
             </a:r>
+          </a:p>
+          <a:p>
+            <a:r>
+              <a:rPr lang="en-US" sz="1500" dirty="0">
+                <a:solidFill>
+                  <a:srgbClr val="FFFFFF"/>
+                </a:solidFill>
+              </a:rPr>
+              <a:t>Our </a:t>
+            </a:r>
+            <a:r>
+              <a:rPr lang="en-US" sz="1500" i="1" dirty="0">
+                <a:solidFill>
+                  <a:srgbClr val="FFFFFF"/>
+                </a:solidFill>
+              </a:rPr>
+              <a:t>Mammal</a:t>
+            </a:r>
+            <a:r>
+              <a:rPr lang="en-US" sz="1500" dirty="0">
+                <a:solidFill>
+                  <a:srgbClr val="FFFFFF"/>
+                </a:solidFill>
+              </a:rPr>
+              <a:t> class is going to implement </a:t>
+            </a:r>
+            <a:r>
+              <a:rPr lang="en-US" sz="1500" dirty="0" smtClean="0">
+                <a:solidFill>
+                  <a:srgbClr val="FFFFFF"/>
+                </a:solidFill>
+              </a:rPr>
+              <a:t>3 interfaces:</a:t>
+            </a:r>
+          </a:p>
+          <a:p>
+            <a:pPr lvl="1"/>
+            <a:r>
+              <a:rPr lang="en-US" sz="1300" dirty="0" err="1" smtClean="0">
+                <a:solidFill>
+                  <a:srgbClr val="FFFFFF"/>
+                </a:solidFill>
+              </a:rPr>
+              <a:t>IAnimal</a:t>
+            </a:r>
+            <a:endParaRPr lang="en-US" sz="1300" dirty="0" smtClean="0">
+              <a:solidFill>
+                <a:srgbClr val="FFFFFF"/>
+              </a:solidFill>
+            </a:endParaRPr>
+          </a:p>
+          <a:p>
+            <a:pPr lvl="1"/>
+            <a:r>
+              <a:rPr lang="en-US" sz="1300" dirty="0" err="1" smtClean="0">
+                <a:solidFill>
+                  <a:srgbClr val="FFFFFF"/>
+                </a:solidFill>
+              </a:rPr>
+              <a:t>IGenderable</a:t>
+            </a:r>
+            <a:endParaRPr lang="en-US" sz="1300" dirty="0" smtClean="0">
+              <a:solidFill>
+                <a:srgbClr val="FFFFFF"/>
+              </a:solidFill>
+            </a:endParaRPr>
+          </a:p>
+          <a:p>
+            <a:pPr lvl="1"/>
+            <a:r>
+              <a:rPr lang="en-US" sz="1300" dirty="0" err="1" smtClean="0">
+                <a:solidFill>
+                  <a:srgbClr val="FFFFFF"/>
+                </a:solidFill>
+              </a:rPr>
+              <a:t>IWalkable</a:t>
+            </a:r>
+            <a:endParaRPr lang="en-US" sz="1300" dirty="0" smtClean="0">
+              <a:solidFill>
+                <a:srgbClr val="FFFFFF"/>
+              </a:solidFill>
+            </a:endParaRPr>
+          </a:p>
+          <a:p>
+            <a:r>
+              <a:rPr lang="en-US" sz="1500" dirty="0" smtClean="0">
+                <a:solidFill>
+                  <a:srgbClr val="FFFFFF"/>
+                </a:solidFill>
+              </a:rPr>
+              <a:t>As such, it must implement all methods and all properties from all thos</a:t>
+            </a:r>
+            <a:r>
+              <a:rPr lang="en-US" sz="1500" dirty="0" smtClean="0">
+                <a:solidFill>
+                  <a:srgbClr val="FFFFFF"/>
+                </a:solidFill>
+              </a:rPr>
+              <a:t>e interfaces.</a:t>
+            </a:r>
+            <a:endParaRPr lang="en-US" sz="1500" dirty="0">
+              <a:solidFill>
+                <a:srgbClr val="FFFFFF"/>
+              </a:solidFill>
+            </a:endParaRPr>
           </a:p>
         </p:txBody>
       </p:sp>
     </p:spTree>
     <p:extLst>
       <p:ext uri="{BB962C8B-B14F-4D97-AF65-F5344CB8AC3E}">
-        <p14:creationId xmlns:p14="http://schemas.microsoft.com/office/powerpoint/2010/main" val="1865932794"/>
+        <p14:creationId xmlns:p14="http://schemas.microsoft.com/office/powerpoint/2010/main" val="479402989"/>
       </p:ext>
     </p:extLst>
   </p:cSld>
@@ -6018,4 +8136,265 @@
     </a:ext>
   </a:extLst>
 </a:theme>
+</file>
+
+<file path=ppt/theme/theme2.xml><?xml version="1.0" encoding="utf-8"?>
+<a:theme xmlns:a="http://schemas.openxmlformats.org/drawingml/2006/main" name="Office Theme">
+  <a:themeElements>
+    <a:clrScheme name="Office">
+      <a:dk1>
+        <a:sysClr val="windowText" lastClr="000000"/>
+      </a:dk1>
+      <a:lt1>
+        <a:sysClr val="window" lastClr="FFFFFF"/>
+      </a:lt1>
+      <a:dk2>
+        <a:srgbClr val="44546A"/>
+      </a:dk2>
+      <a:lt2>
+        <a:srgbClr val="E7E6E6"/>
+      </a:lt2>
+      <a:accent1>
+        <a:srgbClr val="4472C4"/>
+      </a:accent1>
+      <a:accent2>
+        <a:srgbClr val="ED7D31"/>
+      </a:accent2>
+      <a:accent3>
+        <a:srgbClr val="A5A5A5"/>
+      </a:accent3>
+      <a:accent4>
+        <a:srgbClr val="FFC000"/>
+      </a:accent4>
+      <a:accent5>
+        <a:srgbClr val="5B9BD5"/>
+      </a:accent5>
+      <a:accent6>
+        <a:srgbClr val="70AD47"/>
+      </a:accent6>
+      <a:hlink>
+        <a:srgbClr val="0563C1"/>
+      </a:hlink>
+      <a:folHlink>
+        <a:srgbClr val="954F72"/>
+      </a:folHlink>
+    </a:clrScheme>
+    <a:fontScheme name="Office">
+      <a:majorFont>
+        <a:latin typeface="Calibri Light" panose="020F0302020204030204"/>
+        <a:ea typeface=""/>
+        <a:cs typeface=""/>
+        <a:font script="Jpan" typeface="Yu Gothic Light"/>
+        <a:font script="Hang" typeface="맑은 고딕"/>
+        <a:font script="Hans" typeface="DengXian Light"/>
+        <a:font script="Hant" typeface="新細明體"/>
+        <a:font script="Arab" typeface="Times New Roman"/>
+        <a:font script="Hebr" typeface="Times New Roman"/>
+        <a:font script="Thai" typeface="Angsana New"/>
+        <a:font script="Ethi" typeface="Nyala"/>
+        <a:font script="Beng" typeface="Vrinda"/>
+        <a:font script="Gujr" typeface="Shruti"/>
+        <a:font script="Khmr" typeface="MoolBoran"/>
+        <a:font script="Knda" typeface="Tunga"/>
+        <a:font script="Guru" typeface="Raavi"/>
+        <a:font script="Cans" typeface="Euphemia"/>
+        <a:font script="Cher" typeface="Plantagenet Cherokee"/>
+        <a:font script="Yiii" typeface="Microsoft Yi Baiti"/>
+        <a:font script="Tibt" typeface="Microsoft Himalaya"/>
+        <a:font script="Thaa" typeface="MV Boli"/>
+        <a:font script="Deva" typeface="Mangal"/>
+        <a:font script="Telu" typeface="Gautami"/>
+        <a:font script="Taml" typeface="Latha"/>
+        <a:font script="Syrc" typeface="Estrangelo Edessa"/>
+        <a:font script="Orya" typeface="Kalinga"/>
+        <a:font script="Mlym" typeface="Kartika"/>
+        <a:font script="Laoo" typeface="DokChampa"/>
+        <a:font script="Sinh" typeface="Iskoola Pota"/>
+        <a:font script="Mong" typeface="Mongolian Baiti"/>
+        <a:font script="Viet" typeface="Times New Roman"/>
+        <a:font script="Uigh" typeface="Microsoft Uighur"/>
+        <a:font script="Geor" typeface="Sylfaen"/>
+      </a:majorFont>
+      <a:minorFont>
+        <a:latin typeface="Calibri" panose="020F0502020204030204"/>
+        <a:ea typeface=""/>
+        <a:cs typeface=""/>
+        <a:font script="Jpan" typeface="Yu Gothic"/>
+        <a:font script="Hang" typeface="맑은 고딕"/>
+        <a:font script="Hans" typeface="DengXian"/>
+        <a:font script="Hant" typeface="新細明體"/>
+        <a:font script="Arab" typeface="Arial"/>
+        <a:font script="Hebr" typeface="Arial"/>
+        <a:font script="Thai" typeface="Cordia New"/>
+        <a:font script="Ethi" typeface="Nyala"/>
+        <a:font script="Beng" typeface="Vrinda"/>
+        <a:font script="Gujr" typeface="Shruti"/>
+        <a:font script="Khmr" typeface="DaunPenh"/>
+        <a:font script="Knda" typeface="Tunga"/>
+        <a:font script="Guru" typeface="Raavi"/>
+        <a:font script="Cans" typeface="Euphemia"/>
+        <a:font script="Cher" typeface="Plantagenet Cherokee"/>
+        <a:font script="Yiii" typeface="Microsoft Yi Baiti"/>
+        <a:font script="Tibt" typeface="Microsoft Himalaya"/>
+        <a:font script="Thaa" typeface="MV Boli"/>
+        <a:font script="Deva" typeface="Mangal"/>
+        <a:font script="Telu" typeface="Gautami"/>
+        <a:font script="Taml" typeface="Latha"/>
+        <a:font script="Syrc" typeface="Estrangelo Edessa"/>
+        <a:font script="Orya" typeface="Kalinga"/>
+        <a:font script="Mlym" typeface="Kartika"/>
+        <a:font script="Laoo" typeface="DokChampa"/>
+        <a:font script="Sinh" typeface="Iskoola Pota"/>
+        <a:font script="Mong" typeface="Mongolian Baiti"/>
+        <a:font script="Viet" typeface="Arial"/>
+        <a:font script="Uigh" typeface="Microsoft Uighur"/>
+        <a:font script="Geor" typeface="Sylfaen"/>
+      </a:minorFont>
+    </a:fontScheme>
+    <a:fmtScheme name="Office">
+      <a:fillStyleLst>
+        <a:solidFill>
+          <a:schemeClr val="phClr"/>
+        </a:solidFill>
+        <a:gradFill rotWithShape="1">
+          <a:gsLst>
+            <a:gs pos="0">
+              <a:schemeClr val="phClr">
+                <a:lumMod val="110000"/>
+                <a:satMod val="105000"/>
+                <a:tint val="67000"/>
+              </a:schemeClr>
+            </a:gs>
+            <a:gs pos="50000">
+              <a:schemeClr val="phClr">
+                <a:lumMod val="105000"/>
+                <a:satMod val="103000"/>
+                <a:tint val="73000"/>
+              </a:schemeClr>
+            </a:gs>
+            <a:gs pos="100000">
+              <a:schemeClr val="phClr">
+                <a:lumMod val="105000"/>
+                <a:satMod val="109000"/>
+                <a:tint val="81000"/>
+              </a:schemeClr>
+            </a:gs>
+          </a:gsLst>
+          <a:lin ang="5400000" scaled="0"/>
+        </a:gradFill>
+        <a:gradFill rotWithShape="1">
+          <a:gsLst>
+            <a:gs pos="0">
+              <a:schemeClr val="phClr">
+                <a:satMod val="103000"/>
+                <a:lumMod val="102000"/>
+                <a:tint val="94000"/>
+              </a:schemeClr>
+            </a:gs>
+            <a:gs pos="50000">
+              <a:schemeClr val="phClr">
+                <a:satMod val="110000"/>
+                <a:lumMod val="100000"/>
+                <a:shade val="100000"/>
+              </a:schemeClr>
+            </a:gs>
+            <a:gs pos="100000">
+              <a:schemeClr val="phClr">
+                <a:lumMod val="99000"/>
+                <a:satMod val="120000"/>
+                <a:shade val="78000"/>
+              </a:schemeClr>
+            </a:gs>
+          </a:gsLst>
+          <a:lin ang="5400000" scaled="0"/>
+        </a:gradFill>
+      </a:fillStyleLst>
+      <a:lnStyleLst>
+        <a:ln w="6350" cap="flat" cmpd="sng" algn="ctr">
+          <a:solidFill>
+            <a:schemeClr val="phClr"/>
+          </a:solidFill>
+          <a:prstDash val="solid"/>
+          <a:miter lim="800000"/>
+        </a:ln>
+        <a:ln w="12700" cap="flat" cmpd="sng" algn="ctr">
+          <a:solidFill>
+            <a:schemeClr val="phClr"/>
+          </a:solidFill>
+          <a:prstDash val="solid"/>
+          <a:miter lim="800000"/>
+        </a:ln>
+        <a:ln w="19050" cap="flat" cmpd="sng" algn="ctr">
+          <a:solidFill>
+            <a:schemeClr val="phClr"/>
+          </a:solidFill>
+          <a:prstDash val="solid"/>
+          <a:miter lim="800000"/>
+        </a:ln>
+      </a:lnStyleLst>
+      <a:effectStyleLst>
+        <a:effectStyle>
+          <a:effectLst/>
+        </a:effectStyle>
+        <a:effectStyle>
+          <a:effectLst/>
+        </a:effectStyle>
+        <a:effectStyle>
+          <a:effectLst>
+            <a:outerShdw blurRad="57150" dist="19050" dir="5400000" algn="ctr" rotWithShape="0">
+              <a:srgbClr val="000000">
+                <a:alpha val="63000"/>
+              </a:srgbClr>
+            </a:outerShdw>
+          </a:effectLst>
+        </a:effectStyle>
+      </a:effectStyleLst>
+      <a:bgFillStyleLst>
+        <a:solidFill>
+          <a:schemeClr val="phClr"/>
+        </a:solidFill>
+        <a:solidFill>
+          <a:schemeClr val="phClr">
+            <a:tint val="95000"/>
+            <a:satMod val="170000"/>
+          </a:schemeClr>
+        </a:solidFill>
+        <a:gradFill rotWithShape="1">
+          <a:gsLst>
+            <a:gs pos="0">
+              <a:schemeClr val="phClr">
+                <a:tint val="93000"/>
+                <a:satMod val="150000"/>
+                <a:shade val="98000"/>
+                <a:lumMod val="102000"/>
+              </a:schemeClr>
+            </a:gs>
+            <a:gs pos="50000">
+              <a:schemeClr val="phClr">
+                <a:tint val="98000"/>
+                <a:satMod val="130000"/>
+                <a:shade val="90000"/>
+                <a:lumMod val="103000"/>
+              </a:schemeClr>
+            </a:gs>
+            <a:gs pos="100000">
+              <a:schemeClr val="phClr">
+                <a:shade val="63000"/>
+                <a:satMod val="120000"/>
+              </a:schemeClr>
+            </a:gs>
+          </a:gsLst>
+          <a:lin ang="5400000" scaled="0"/>
+        </a:gradFill>
+      </a:bgFillStyleLst>
+    </a:fmtScheme>
+  </a:themeElements>
+  <a:objectDefaults/>
+  <a:extraClrSchemeLst/>
+  <a:extLst>
+    <a:ext uri="{05A4C25C-085E-4340-85A3-A5531E510DB2}">
+      <thm15:themeFamily xmlns:thm15="http://schemas.microsoft.com/office/thememl/2012/main" name="Office Theme" id="{62F939B6-93AF-4DB8-9C6B-D6C7DFDC589F}" vid="{4A3C46E8-61CC-4603-A589-7422A47A8E4A}"/>
+    </a:ext>
+  </a:extLst>
+</a:theme>
 </file>
</xml_diff>

<commit_message>
Updates to parrot constructor and presentation to explain constructors
</commit_message>
<xml_diff>
--- a/presentation.pptx
+++ b/presentation.pptx
@@ -5,7 +5,7 @@
     <p:sldMasterId id="2147483648" r:id="rId1"/>
   </p:sldMasterIdLst>
   <p:notesMasterIdLst>
-    <p:notesMasterId r:id="rId20"/>
+    <p:notesMasterId r:id="rId21"/>
   </p:notesMasterIdLst>
   <p:sldIdLst>
     <p:sldId id="256" r:id="rId2"/>
@@ -17,15 +17,16 @@
     <p:sldId id="262" r:id="rId8"/>
     <p:sldId id="263" r:id="rId9"/>
     <p:sldId id="264" r:id="rId10"/>
-    <p:sldId id="276" r:id="rId11"/>
-    <p:sldId id="275" r:id="rId12"/>
-    <p:sldId id="265" r:id="rId13"/>
-    <p:sldId id="274" r:id="rId14"/>
-    <p:sldId id="267" r:id="rId15"/>
-    <p:sldId id="268" r:id="rId16"/>
-    <p:sldId id="269" r:id="rId17"/>
-    <p:sldId id="270" r:id="rId18"/>
-    <p:sldId id="271" r:id="rId19"/>
+    <p:sldId id="277" r:id="rId11"/>
+    <p:sldId id="276" r:id="rId12"/>
+    <p:sldId id="275" r:id="rId13"/>
+    <p:sldId id="265" r:id="rId14"/>
+    <p:sldId id="274" r:id="rId15"/>
+    <p:sldId id="267" r:id="rId16"/>
+    <p:sldId id="268" r:id="rId17"/>
+    <p:sldId id="269" r:id="rId18"/>
+    <p:sldId id="270" r:id="rId19"/>
+    <p:sldId id="271" r:id="rId20"/>
   </p:sldIdLst>
   <p:sldSz cx="12192000" cy="6858000"/>
   <p:notesSz cx="6858000" cy="9144000"/>
@@ -4227,6 +4228,179 @@
           <a:chExt cx="0" cy="0"/>
         </a:xfrm>
       </p:grpSpPr>
+      <p:sp useBgFill="1">
+        <p:nvSpPr>
+          <p:cNvPr id="12" name="Rectangle 11"/>
+          <p:cNvSpPr>
+            <a:spLocks noGrp="1" noRot="1" noChangeAspect="1" noMove="1" noResize="1" noEditPoints="1" noAdjustHandles="1" noChangeArrowheads="1" noChangeShapeType="1" noTextEdit="1"/>
+          </p:cNvSpPr>
+          <p:nvPr>
+            <p:extLst>
+              <p:ext uri="{386F3935-93C4-4BCD-93E2-E3B085C9AB24}">
+                <p16:designElem xmlns:p16="http://schemas.microsoft.com/office/powerpoint/2015/main" val="1"/>
+              </p:ext>
+            </p:extLst>
+          </p:nvPr>
+        </p:nvSpPr>
+        <p:spPr>
+          <a:xfrm>
+            <a:off x="0" y="0"/>
+            <a:ext cx="12186315" cy="6858000"/>
+          </a:xfrm>
+          <a:prstGeom prst="rect">
+            <a:avLst/>
+          </a:prstGeom>
+          <a:ln>
+            <a:noFill/>
+          </a:ln>
+        </p:spPr>
+        <p:style>
+          <a:lnRef idx="2">
+            <a:schemeClr val="accent6">
+              <a:shade val="50000"/>
+            </a:schemeClr>
+          </a:lnRef>
+          <a:fillRef idx="1001">
+            <a:schemeClr val="lt1"/>
+          </a:fillRef>
+          <a:effectRef idx="0">
+            <a:schemeClr val="accent6"/>
+          </a:effectRef>
+          <a:fontRef idx="minor">
+            <a:schemeClr val="lt1"/>
+          </a:fontRef>
+        </p:style>
+        <p:txBody>
+          <a:bodyPr rtlCol="0" anchor="ctr"/>
+          <a:lstStyle/>
+          <a:p>
+            <a:pPr algn="ctr"/>
+            <a:endParaRPr lang="en-US"/>
+          </a:p>
+        </p:txBody>
+      </p:sp>
+      <p:sp>
+        <p:nvSpPr>
+          <p:cNvPr id="14" name="Rectangle 13"/>
+          <p:cNvSpPr>
+            <a:spLocks noGrp="1" noRot="1" noChangeAspect="1" noMove="1" noResize="1" noEditPoints="1" noAdjustHandles="1" noChangeArrowheads="1" noChangeShapeType="1" noTextEdit="1"/>
+          </p:cNvSpPr>
+          <p:nvPr>
+            <p:extLst>
+              <p:ext uri="{386F3935-93C4-4BCD-93E2-E3B085C9AB24}">
+                <p16:designElem xmlns:p16="http://schemas.microsoft.com/office/powerpoint/2015/main" val="1"/>
+              </p:ext>
+            </p:extLst>
+          </p:nvPr>
+        </p:nvSpPr>
+        <p:spPr>
+          <a:xfrm>
+            <a:off x="16" y="0"/>
+            <a:ext cx="4050791" cy="6858000"/>
+          </a:xfrm>
+          <a:prstGeom prst="rect">
+            <a:avLst/>
+          </a:prstGeom>
+          <a:solidFill>
+            <a:schemeClr val="accent2"/>
+          </a:solidFill>
+          <a:ln>
+            <a:noFill/>
+          </a:ln>
+        </p:spPr>
+        <p:style>
+          <a:lnRef idx="2">
+            <a:schemeClr val="accent1">
+              <a:shade val="50000"/>
+            </a:schemeClr>
+          </a:lnRef>
+          <a:fillRef idx="1">
+            <a:schemeClr val="accent1"/>
+          </a:fillRef>
+          <a:effectRef idx="0">
+            <a:schemeClr val="accent1"/>
+          </a:effectRef>
+          <a:fontRef idx="minor">
+            <a:schemeClr val="lt1"/>
+          </a:fontRef>
+        </p:style>
+      </p:sp>
+      <p:sp>
+        <p:nvSpPr>
+          <p:cNvPr id="16" name="Rectangle 15"/>
+          <p:cNvSpPr>
+            <a:spLocks noGrp="1" noRot="1" noChangeAspect="1" noMove="1" noResize="1" noEditPoints="1" noAdjustHandles="1" noChangeArrowheads="1" noChangeShapeType="1" noTextEdit="1"/>
+          </p:cNvSpPr>
+          <p:nvPr>
+            <p:extLst>
+              <p:ext uri="{386F3935-93C4-4BCD-93E2-E3B085C9AB24}">
+                <p16:designElem xmlns:p16="http://schemas.microsoft.com/office/powerpoint/2015/main" val="1"/>
+              </p:ext>
+            </p:extLst>
+          </p:nvPr>
+        </p:nvSpPr>
+        <p:spPr>
+          <a:xfrm>
+            <a:off x="4040071" y="0"/>
+            <a:ext cx="64008" cy="6858000"/>
+          </a:xfrm>
+          <a:prstGeom prst="rect">
+            <a:avLst/>
+          </a:prstGeom>
+          <a:solidFill>
+            <a:schemeClr val="accent1"/>
+          </a:solidFill>
+          <a:ln>
+            <a:noFill/>
+          </a:ln>
+        </p:spPr>
+        <p:style>
+          <a:lnRef idx="2">
+            <a:schemeClr val="accent1">
+              <a:shade val="50000"/>
+            </a:schemeClr>
+          </a:lnRef>
+          <a:fillRef idx="1">
+            <a:schemeClr val="accent1"/>
+          </a:fillRef>
+          <a:effectRef idx="0">
+            <a:schemeClr val="accent1"/>
+          </a:effectRef>
+          <a:fontRef idx="minor">
+            <a:schemeClr val="lt1"/>
+          </a:fontRef>
+        </p:style>
+      </p:sp>
+      <p:pic>
+        <p:nvPicPr>
+          <p:cNvPr id="6" name="Content Placeholder 3"/>
+          <p:cNvPicPr>
+            <a:picLocks noChangeAspect="1"/>
+          </p:cNvPicPr>
+          <p:nvPr/>
+        </p:nvPicPr>
+        <p:blipFill>
+          <a:blip r:embed="rId2">
+            <a:extLst>
+              <a:ext uri="{28A0092B-C50C-407E-A947-70E740481C1C}">
+                <a14:useLocalDpi xmlns:a14="http://schemas.microsoft.com/office/drawing/2010/main" val="0"/>
+              </a:ext>
+            </a:extLst>
+          </a:blip>
+          <a:stretch>
+            <a:fillRect/>
+          </a:stretch>
+        </p:blipFill>
+        <p:spPr>
+          <a:xfrm>
+            <a:off x="4422407" y="189540"/>
+            <a:ext cx="6798082" cy="2634257"/>
+          </a:xfrm>
+          <a:prstGeom prst="rect">
+            <a:avLst/>
+          </a:prstGeom>
+        </p:spPr>
+      </p:pic>
       <p:sp>
         <p:nvSpPr>
           <p:cNvPr id="2" name="Title 1"/>
@@ -4237,30 +4411,12 @@
             <p:ph type="title"/>
           </p:nvPr>
         </p:nvSpPr>
-        <p:spPr/>
-        <p:txBody>
-          <a:bodyPr/>
-          <a:lstStyle/>
-          <a:p>
-            <a:r>
-              <a:rPr lang="en-US" dirty="0" smtClean="0"/>
-              <a:t>Practical: Abstraction and Encapsulation</a:t>
-            </a:r>
-            <a:endParaRPr lang="en-US" dirty="0"/>
-          </a:p>
-        </p:txBody>
-      </p:sp>
-      <p:sp>
-        <p:nvSpPr>
-          <p:cNvPr id="3" name="Content Placeholder 2"/>
-          <p:cNvSpPr>
-            <a:spLocks noGrp="1"/>
-          </p:cNvSpPr>
-          <p:nvPr>
-            <p:ph idx="1"/>
-          </p:nvPr>
-        </p:nvSpPr>
-        <p:spPr/>
+        <p:spPr>
+          <a:xfrm>
+            <a:off x="228600" y="258418"/>
+            <a:ext cx="3348614" cy="1150600"/>
+          </a:xfrm>
+        </p:spPr>
         <p:txBody>
           <a:bodyPr>
             <a:normAutofit/>
@@ -4268,168 +4424,480 @@
           <a:lstStyle/>
           <a:p>
             <a:r>
-              <a:rPr lang="en-US" dirty="0" smtClean="0"/>
-              <a:t>You will make an interface, </a:t>
-            </a:r>
-            <a:r>
-              <a:rPr lang="en-US" i="1" dirty="0" err="1" smtClean="0"/>
-              <a:t>IPerson.cs</a:t>
-            </a:r>
-            <a:r>
-              <a:rPr lang="en-US" dirty="0" smtClean="0"/>
-              <a:t>, which implements </a:t>
-            </a:r>
-            <a:r>
-              <a:rPr lang="en-US" i="1" dirty="0" err="1" smtClean="0"/>
-              <a:t>IGenderable</a:t>
-            </a:r>
-            <a:r>
-              <a:rPr lang="en-US" i="1" dirty="0" smtClean="0"/>
-              <a:t>, </a:t>
-            </a:r>
-            <a:r>
-              <a:rPr lang="en-US" i="1" dirty="0" err="1" smtClean="0"/>
-              <a:t>IWalkable</a:t>
-            </a:r>
-            <a:r>
-              <a:rPr lang="en-US" i="1" dirty="0" smtClean="0"/>
-              <a:t>, </a:t>
-            </a:r>
-            <a:r>
-              <a:rPr lang="en-US" dirty="0" smtClean="0"/>
-              <a:t>and</a:t>
-            </a:r>
-            <a:r>
-              <a:rPr lang="en-US" i="1" dirty="0" smtClean="0"/>
-              <a:t> </a:t>
-            </a:r>
-            <a:r>
-              <a:rPr lang="en-US" i="1" dirty="0" err="1" smtClean="0"/>
-              <a:t>IEatable</a:t>
-            </a:r>
-            <a:endParaRPr lang="en-US" dirty="0" smtClean="0"/>
-          </a:p>
-          <a:p>
-            <a:r>
-              <a:rPr lang="en-US" dirty="0" smtClean="0"/>
-              <a:t>Properties in </a:t>
-            </a:r>
-            <a:r>
-              <a:rPr lang="en-US" dirty="0" err="1" smtClean="0"/>
-              <a:t>IPerson</a:t>
-            </a:r>
-            <a:r>
-              <a:rPr lang="en-US" dirty="0" smtClean="0"/>
-              <a:t>:</a:t>
-            </a:r>
-          </a:p>
-          <a:p>
-            <a:pPr lvl="1"/>
-            <a:r>
-              <a:rPr lang="en-US" dirty="0" smtClean="0"/>
-              <a:t>Name: String</a:t>
-            </a:r>
-          </a:p>
-          <a:p>
-            <a:pPr lvl="1"/>
-            <a:r>
-              <a:rPr lang="en-US" dirty="0" smtClean="0"/>
-              <a:t>Age: </a:t>
-            </a:r>
-            <a:r>
-              <a:rPr lang="en-US" dirty="0" err="1" smtClean="0"/>
-              <a:t>int</a:t>
-            </a:r>
-            <a:endParaRPr lang="en-US" dirty="0" smtClean="0"/>
-          </a:p>
-          <a:p>
-            <a:pPr lvl="1"/>
-            <a:r>
-              <a:rPr lang="en-US" dirty="0" smtClean="0"/>
-              <a:t>Hobbies: </a:t>
-            </a:r>
-            <a:r>
-              <a:rPr lang="en-US" dirty="0" err="1" smtClean="0"/>
-              <a:t>HashSet</a:t>
-            </a:r>
-            <a:r>
-              <a:rPr lang="en-US" dirty="0" smtClean="0"/>
-              <a:t>&lt;string&gt;()</a:t>
-            </a:r>
-          </a:p>
-          <a:p>
-            <a:r>
-              <a:rPr lang="en-US" dirty="0" smtClean="0"/>
-              <a:t>Methods in </a:t>
-            </a:r>
-            <a:r>
-              <a:rPr lang="en-US" dirty="0" err="1" smtClean="0"/>
-              <a:t>IPerson</a:t>
-            </a:r>
-            <a:r>
-              <a:rPr lang="en-US" dirty="0" smtClean="0"/>
-              <a:t>:</a:t>
-            </a:r>
-          </a:p>
-          <a:p>
-            <a:pPr lvl="1"/>
-            <a:r>
-              <a:rPr lang="en-US" dirty="0" smtClean="0"/>
-              <a:t>void Talk(): If the person does not have a hobby, it will print to the console: </a:t>
-            </a:r>
-            <a:r>
-              <a:rPr lang="en-US" i="1" dirty="0" smtClean="0"/>
-              <a:t>I don’t have anything to talk about</a:t>
-            </a:r>
-            <a:r>
-              <a:rPr lang="en-US" dirty="0" smtClean="0"/>
-              <a:t>; if the person has hobbies, it will talk about one of the hobbies</a:t>
-            </a:r>
-          </a:p>
-          <a:p>
-            <a:pPr lvl="1"/>
-            <a:r>
-              <a:rPr lang="en-US" dirty="0" smtClean="0"/>
-              <a:t>void </a:t>
-            </a:r>
-            <a:r>
-              <a:rPr lang="en-US" dirty="0" err="1" smtClean="0"/>
-              <a:t>AddHoby</a:t>
-            </a:r>
-            <a:r>
-              <a:rPr lang="en-US" dirty="0" smtClean="0"/>
-              <a:t>(string hobby): will add an entry to the set of hobbies</a:t>
-            </a:r>
-          </a:p>
-          <a:p>
-            <a:r>
-              <a:rPr lang="en-US" dirty="0" smtClean="0"/>
-              <a:t>You will then write </a:t>
-            </a:r>
-            <a:r>
-              <a:rPr lang="en-US" i="1" dirty="0" err="1" smtClean="0"/>
-              <a:t>Person.cs</a:t>
-            </a:r>
-            <a:r>
-              <a:rPr lang="en-US" dirty="0" smtClean="0"/>
-              <a:t>, which will implement </a:t>
-            </a:r>
-            <a:r>
-              <a:rPr lang="en-US" dirty="0" err="1" smtClean="0"/>
-              <a:t>IPerson</a:t>
-            </a:r>
-            <a:r>
-              <a:rPr lang="en-US" dirty="0" smtClean="0"/>
-              <a:t>!</a:t>
-            </a:r>
-            <a:endParaRPr lang="en-US" i="1" dirty="0"/>
-          </a:p>
-        </p:txBody>
-      </p:sp>
+              <a:rPr lang="en-US" sz="3600" dirty="0">
+                <a:solidFill>
+                  <a:srgbClr val="FFFFFF"/>
+                </a:solidFill>
+              </a:rPr>
+              <a:t>Constructors and </a:t>
+            </a:r>
+            <a:r>
+              <a:rPr lang="en-US" sz="3600" dirty="0" smtClean="0">
+                <a:solidFill>
+                  <a:srgbClr val="FFFFFF"/>
+                </a:solidFill>
+              </a:rPr>
+              <a:t>initialization</a:t>
+            </a:r>
+            <a:endParaRPr lang="en-US" sz="3600" dirty="0">
+              <a:solidFill>
+                <a:srgbClr val="FFFFFF"/>
+              </a:solidFill>
+            </a:endParaRPr>
+          </a:p>
+        </p:txBody>
+      </p:sp>
+      <p:pic>
+        <p:nvPicPr>
+          <p:cNvPr id="3" name="Content Placeholder 2"/>
+          <p:cNvPicPr>
+            <a:picLocks noGrp="1" noChangeAspect="1"/>
+          </p:cNvPicPr>
+          <p:nvPr>
+            <p:ph idx="1"/>
+          </p:nvPr>
+        </p:nvPicPr>
+        <p:blipFill>
+          <a:blip r:embed="rId3">
+            <a:extLst>
+              <a:ext uri="{28A0092B-C50C-407E-A947-70E740481C1C}">
+                <a14:useLocalDpi xmlns:a14="http://schemas.microsoft.com/office/drawing/2010/main" val="0"/>
+              </a:ext>
+            </a:extLst>
+          </a:blip>
+          <a:stretch>
+            <a:fillRect/>
+          </a:stretch>
+        </p:blipFill>
+        <p:spPr>
+          <a:xfrm>
+            <a:off x="4337912" y="2937668"/>
+            <a:ext cx="6558713" cy="982663"/>
+          </a:xfrm>
+        </p:spPr>
+      </p:pic>
+      <p:sp>
+        <p:nvSpPr>
+          <p:cNvPr id="10" name="Content Placeholder 2"/>
+          <p:cNvSpPr txBox="1">
+            <a:spLocks/>
+          </p:cNvSpPr>
+          <p:nvPr/>
+        </p:nvSpPr>
+        <p:spPr>
+          <a:xfrm>
+            <a:off x="228600" y="1409018"/>
+            <a:ext cx="3577637" cy="5233829"/>
+          </a:xfrm>
+          <a:prstGeom prst="rect">
+            <a:avLst/>
+          </a:prstGeom>
+        </p:spPr>
+        <p:txBody>
+          <a:bodyPr vert="horz" lIns="0" tIns="45720" rIns="0" bIns="45720" rtlCol="0">
+            <a:normAutofit/>
+          </a:bodyPr>
+          <a:lstStyle>
+            <a:lvl1pPr marL="91440" indent="-91440" algn="l" defTabSz="914400" rtl="0" eaLnBrk="1" latinLnBrk="0" hangingPunct="1">
+              <a:lnSpc>
+                <a:spcPct val="90000"/>
+              </a:lnSpc>
+              <a:spcBef>
+                <a:spcPts val="1200"/>
+              </a:spcBef>
+              <a:spcAft>
+                <a:spcPts val="200"/>
+              </a:spcAft>
+              <a:buClr>
+                <a:schemeClr val="accent1"/>
+              </a:buClr>
+              <a:buSzPct val="100000"/>
+              <a:buFont typeface="Calibri" panose="020F0502020204030204" pitchFamily="34" charset="0"/>
+              <a:buChar char=" "/>
+              <a:defRPr sz="2000" kern="1200">
+                <a:solidFill>
+                  <a:schemeClr val="tx1">
+                    <a:lumMod val="75000"/>
+                    <a:lumOff val="25000"/>
+                  </a:schemeClr>
+                </a:solidFill>
+                <a:latin typeface="+mn-lt"/>
+                <a:ea typeface="+mn-ea"/>
+                <a:cs typeface="+mn-cs"/>
+              </a:defRPr>
+            </a:lvl1pPr>
+            <a:lvl2pPr marL="384048" indent="-182880" algn="l" defTabSz="914400" rtl="0" eaLnBrk="1" latinLnBrk="0" hangingPunct="1">
+              <a:lnSpc>
+                <a:spcPct val="90000"/>
+              </a:lnSpc>
+              <a:spcBef>
+                <a:spcPts val="200"/>
+              </a:spcBef>
+              <a:spcAft>
+                <a:spcPts val="400"/>
+              </a:spcAft>
+              <a:buClr>
+                <a:schemeClr val="accent1"/>
+              </a:buClr>
+              <a:buFont typeface="Calibri" pitchFamily="34" charset="0"/>
+              <a:buChar char="◦"/>
+              <a:defRPr sz="1800" kern="1200">
+                <a:solidFill>
+                  <a:schemeClr val="tx1">
+                    <a:lumMod val="75000"/>
+                    <a:lumOff val="25000"/>
+                  </a:schemeClr>
+                </a:solidFill>
+                <a:latin typeface="+mn-lt"/>
+                <a:ea typeface="+mn-ea"/>
+                <a:cs typeface="+mn-cs"/>
+              </a:defRPr>
+            </a:lvl2pPr>
+            <a:lvl3pPr marL="566928" indent="-182880" algn="l" defTabSz="914400" rtl="0" eaLnBrk="1" latinLnBrk="0" hangingPunct="1">
+              <a:lnSpc>
+                <a:spcPct val="90000"/>
+              </a:lnSpc>
+              <a:spcBef>
+                <a:spcPts val="200"/>
+              </a:spcBef>
+              <a:spcAft>
+                <a:spcPts val="400"/>
+              </a:spcAft>
+              <a:buClr>
+                <a:schemeClr val="accent1"/>
+              </a:buClr>
+              <a:buFont typeface="Calibri" pitchFamily="34" charset="0"/>
+              <a:buChar char="◦"/>
+              <a:defRPr sz="1400" kern="1200">
+                <a:solidFill>
+                  <a:schemeClr val="tx1">
+                    <a:lumMod val="75000"/>
+                    <a:lumOff val="25000"/>
+                  </a:schemeClr>
+                </a:solidFill>
+                <a:latin typeface="+mn-lt"/>
+                <a:ea typeface="+mn-ea"/>
+                <a:cs typeface="+mn-cs"/>
+              </a:defRPr>
+            </a:lvl3pPr>
+            <a:lvl4pPr marL="749808" indent="-182880" algn="l" defTabSz="914400" rtl="0" eaLnBrk="1" latinLnBrk="0" hangingPunct="1">
+              <a:lnSpc>
+                <a:spcPct val="90000"/>
+              </a:lnSpc>
+              <a:spcBef>
+                <a:spcPts val="200"/>
+              </a:spcBef>
+              <a:spcAft>
+                <a:spcPts val="400"/>
+              </a:spcAft>
+              <a:buClr>
+                <a:schemeClr val="accent1"/>
+              </a:buClr>
+              <a:buFont typeface="Calibri" pitchFamily="34" charset="0"/>
+              <a:buChar char="◦"/>
+              <a:defRPr sz="1400" kern="1200">
+                <a:solidFill>
+                  <a:schemeClr val="tx1">
+                    <a:lumMod val="75000"/>
+                    <a:lumOff val="25000"/>
+                  </a:schemeClr>
+                </a:solidFill>
+                <a:latin typeface="+mn-lt"/>
+                <a:ea typeface="+mn-ea"/>
+                <a:cs typeface="+mn-cs"/>
+              </a:defRPr>
+            </a:lvl4pPr>
+            <a:lvl5pPr marL="932688" indent="-182880" algn="l" defTabSz="914400" rtl="0" eaLnBrk="1" latinLnBrk="0" hangingPunct="1">
+              <a:lnSpc>
+                <a:spcPct val="90000"/>
+              </a:lnSpc>
+              <a:spcBef>
+                <a:spcPts val="200"/>
+              </a:spcBef>
+              <a:spcAft>
+                <a:spcPts val="400"/>
+              </a:spcAft>
+              <a:buClr>
+                <a:schemeClr val="accent1"/>
+              </a:buClr>
+              <a:buFont typeface="Calibri" pitchFamily="34" charset="0"/>
+              <a:buChar char="◦"/>
+              <a:defRPr sz="1400" kern="1200">
+                <a:solidFill>
+                  <a:schemeClr val="tx1">
+                    <a:lumMod val="75000"/>
+                    <a:lumOff val="25000"/>
+                  </a:schemeClr>
+                </a:solidFill>
+                <a:latin typeface="+mn-lt"/>
+                <a:ea typeface="+mn-ea"/>
+                <a:cs typeface="+mn-cs"/>
+              </a:defRPr>
+            </a:lvl5pPr>
+            <a:lvl6pPr marL="1100000" indent="-228600" algn="l" defTabSz="914400" rtl="0" eaLnBrk="1" latinLnBrk="0" hangingPunct="1">
+              <a:lnSpc>
+                <a:spcPct val="90000"/>
+              </a:lnSpc>
+              <a:spcBef>
+                <a:spcPts val="200"/>
+              </a:spcBef>
+              <a:spcAft>
+                <a:spcPts val="400"/>
+              </a:spcAft>
+              <a:buClr>
+                <a:schemeClr val="accent1"/>
+              </a:buClr>
+              <a:buFont typeface="Calibri" pitchFamily="34" charset="0"/>
+              <a:buChar char="◦"/>
+              <a:defRPr sz="1400" kern="1200">
+                <a:solidFill>
+                  <a:schemeClr val="tx1">
+                    <a:lumMod val="75000"/>
+                    <a:lumOff val="25000"/>
+                  </a:schemeClr>
+                </a:solidFill>
+                <a:latin typeface="+mn-lt"/>
+                <a:ea typeface="+mn-ea"/>
+                <a:cs typeface="+mn-cs"/>
+              </a:defRPr>
+            </a:lvl6pPr>
+            <a:lvl7pPr marL="1300000" indent="-228600" algn="l" defTabSz="914400" rtl="0" eaLnBrk="1" latinLnBrk="0" hangingPunct="1">
+              <a:lnSpc>
+                <a:spcPct val="90000"/>
+              </a:lnSpc>
+              <a:spcBef>
+                <a:spcPts val="200"/>
+              </a:spcBef>
+              <a:spcAft>
+                <a:spcPts val="400"/>
+              </a:spcAft>
+              <a:buClr>
+                <a:schemeClr val="accent1"/>
+              </a:buClr>
+              <a:buFont typeface="Calibri" pitchFamily="34" charset="0"/>
+              <a:buChar char="◦"/>
+              <a:defRPr sz="1400" kern="1200">
+                <a:solidFill>
+                  <a:schemeClr val="tx1">
+                    <a:lumMod val="75000"/>
+                    <a:lumOff val="25000"/>
+                  </a:schemeClr>
+                </a:solidFill>
+                <a:latin typeface="+mn-lt"/>
+                <a:ea typeface="+mn-ea"/>
+                <a:cs typeface="+mn-cs"/>
+              </a:defRPr>
+            </a:lvl7pPr>
+            <a:lvl8pPr marL="1500000" indent="-228600" algn="l" defTabSz="914400" rtl="0" eaLnBrk="1" latinLnBrk="0" hangingPunct="1">
+              <a:lnSpc>
+                <a:spcPct val="90000"/>
+              </a:lnSpc>
+              <a:spcBef>
+                <a:spcPts val="200"/>
+              </a:spcBef>
+              <a:spcAft>
+                <a:spcPts val="400"/>
+              </a:spcAft>
+              <a:buClr>
+                <a:schemeClr val="accent1"/>
+              </a:buClr>
+              <a:buFont typeface="Calibri" pitchFamily="34" charset="0"/>
+              <a:buChar char="◦"/>
+              <a:defRPr sz="1400" kern="1200">
+                <a:solidFill>
+                  <a:schemeClr val="tx1">
+                    <a:lumMod val="75000"/>
+                    <a:lumOff val="25000"/>
+                  </a:schemeClr>
+                </a:solidFill>
+                <a:latin typeface="+mn-lt"/>
+                <a:ea typeface="+mn-ea"/>
+                <a:cs typeface="+mn-cs"/>
+              </a:defRPr>
+            </a:lvl8pPr>
+            <a:lvl9pPr marL="1700000" indent="-228600" algn="l" defTabSz="914400" rtl="0" eaLnBrk="1" latinLnBrk="0" hangingPunct="1">
+              <a:lnSpc>
+                <a:spcPct val="90000"/>
+              </a:lnSpc>
+              <a:spcBef>
+                <a:spcPts val="200"/>
+              </a:spcBef>
+              <a:spcAft>
+                <a:spcPts val="400"/>
+              </a:spcAft>
+              <a:buClr>
+                <a:schemeClr val="accent1"/>
+              </a:buClr>
+              <a:buFont typeface="Calibri" pitchFamily="34" charset="0"/>
+              <a:buChar char="◦"/>
+              <a:defRPr sz="1400" kern="1200">
+                <a:solidFill>
+                  <a:schemeClr val="tx1">
+                    <a:lumMod val="75000"/>
+                    <a:lumOff val="25000"/>
+                  </a:schemeClr>
+                </a:solidFill>
+                <a:latin typeface="+mn-lt"/>
+                <a:ea typeface="+mn-ea"/>
+                <a:cs typeface="+mn-cs"/>
+              </a:defRPr>
+            </a:lvl9pPr>
+          </a:lstStyle>
+          <a:p>
+            <a:r>
+              <a:rPr lang="en-US" sz="1500" dirty="0" smtClean="0">
+                <a:solidFill>
+                  <a:srgbClr val="FFFFFF"/>
+                </a:solidFill>
+              </a:rPr>
+              <a:t>When creating a class, we create special methods call </a:t>
+            </a:r>
+            <a:r>
+              <a:rPr lang="en-US" sz="1500" i="1" dirty="0" smtClean="0">
+                <a:solidFill>
+                  <a:srgbClr val="FFFFFF"/>
+                </a:solidFill>
+              </a:rPr>
+              <a:t>constructors</a:t>
+            </a:r>
+            <a:r>
+              <a:rPr lang="en-US" sz="1500" dirty="0" smtClean="0">
+                <a:solidFill>
+                  <a:srgbClr val="FFFFFF"/>
+                </a:solidFill>
+              </a:rPr>
+              <a:t> that are called when we make a new </a:t>
+            </a:r>
+            <a:r>
+              <a:rPr lang="en-US" sz="1500" b="1" dirty="0" smtClean="0">
+                <a:solidFill>
+                  <a:srgbClr val="FFFFFF"/>
+                </a:solidFill>
+              </a:rPr>
+              <a:t>instance</a:t>
+            </a:r>
+            <a:r>
+              <a:rPr lang="en-US" sz="1500" dirty="0" smtClean="0">
+                <a:solidFill>
+                  <a:srgbClr val="FFFFFF"/>
+                </a:solidFill>
+              </a:rPr>
+              <a:t> of the class. The constructor method name is the same as the class name.</a:t>
+            </a:r>
+          </a:p>
+          <a:p>
+            <a:r>
+              <a:rPr lang="en-US" sz="1500" dirty="0" smtClean="0">
+                <a:solidFill>
+                  <a:srgbClr val="FFFFFF"/>
+                </a:solidFill>
+              </a:rPr>
+              <a:t>Constructors are extremely important, as they allow you to setup all the data for </a:t>
+            </a:r>
+            <a:r>
+              <a:rPr lang="en-US" sz="1500" b="1" dirty="0" smtClean="0">
+                <a:solidFill>
+                  <a:srgbClr val="FFFFFF"/>
+                </a:solidFill>
+              </a:rPr>
+              <a:t>each instance of the class</a:t>
+            </a:r>
+            <a:r>
+              <a:rPr lang="en-US" sz="1500" dirty="0" smtClean="0">
+                <a:solidFill>
+                  <a:srgbClr val="FFFFFF"/>
+                </a:solidFill>
+              </a:rPr>
+              <a:t>.</a:t>
+            </a:r>
+          </a:p>
+          <a:p>
+            <a:r>
+              <a:rPr lang="en-US" sz="1500" dirty="0" smtClean="0">
+                <a:solidFill>
+                  <a:srgbClr val="FFFFFF"/>
+                </a:solidFill>
+              </a:rPr>
+              <a:t>We often pass data about the instance of that class into the constructor, so that we can setup </a:t>
+            </a:r>
+          </a:p>
+          <a:p>
+            <a:r>
+              <a:rPr lang="en-US" sz="1500" dirty="0" smtClean="0">
+                <a:solidFill>
+                  <a:srgbClr val="FFFFFF"/>
+                </a:solidFill>
+              </a:rPr>
+              <a:t>Here, we see that the Dog has a constructor method that takes the dog’s name, breed, favorite food, and gender and sets up the properties of that class instance based on those parameters.</a:t>
+            </a:r>
+          </a:p>
+          <a:p>
+            <a:r>
+              <a:rPr lang="en-US" sz="1500" dirty="0" smtClean="0">
+                <a:solidFill>
+                  <a:srgbClr val="FFFFFF"/>
+                </a:solidFill>
+              </a:rPr>
+              <a:t>Constructors also allow us to initialize data that does not come from the parameters, such as setting the parrot’s </a:t>
+            </a:r>
+            <a:r>
+              <a:rPr lang="en-US" sz="1500" dirty="0" err="1" smtClean="0">
+                <a:solidFill>
+                  <a:srgbClr val="FFFFFF"/>
+                </a:solidFill>
+              </a:rPr>
+              <a:t>PhrasesHeader</a:t>
+            </a:r>
+            <a:r>
+              <a:rPr lang="en-US" sz="1500" dirty="0" smtClean="0">
+                <a:solidFill>
+                  <a:srgbClr val="FFFFFF"/>
+                </a:solidFill>
+              </a:rPr>
+              <a:t> property to a brand new hash set at the time of construction.</a:t>
+            </a:r>
+            <a:endParaRPr lang="en-US" sz="1500" dirty="0">
+              <a:solidFill>
+                <a:srgbClr val="FFFFFF"/>
+              </a:solidFill>
+            </a:endParaRPr>
+          </a:p>
+        </p:txBody>
+      </p:sp>
+      <p:pic>
+        <p:nvPicPr>
+          <p:cNvPr id="7" name="Picture 6"/>
+          <p:cNvPicPr>
+            <a:picLocks noChangeAspect="1"/>
+          </p:cNvPicPr>
+          <p:nvPr/>
+        </p:nvPicPr>
+        <p:blipFill>
+          <a:blip r:embed="rId4">
+            <a:extLst>
+              <a:ext uri="{28A0092B-C50C-407E-A947-70E740481C1C}">
+                <a14:useLocalDpi xmlns:a14="http://schemas.microsoft.com/office/drawing/2010/main" val="0"/>
+              </a:ext>
+            </a:extLst>
+          </a:blip>
+          <a:stretch>
+            <a:fillRect/>
+          </a:stretch>
+        </p:blipFill>
+        <p:spPr>
+          <a:xfrm>
+            <a:off x="4422407" y="4322353"/>
+            <a:ext cx="7336908" cy="2421776"/>
+          </a:xfrm>
+          <a:prstGeom prst="rect">
+            <a:avLst/>
+          </a:prstGeom>
+        </p:spPr>
+      </p:pic>
     </p:spTree>
     <p:extLst>
       <p:ext uri="{BB962C8B-B14F-4D97-AF65-F5344CB8AC3E}">
-        <p14:creationId xmlns:p14="http://schemas.microsoft.com/office/powerpoint/2010/main" val="1584339635"/>
+        <p14:creationId xmlns:p14="http://schemas.microsoft.com/office/powerpoint/2010/main" val="2960523463"/>
       </p:ext>
     </p:extLst>
   </p:cSld>
@@ -4463,7 +4931,7 @@
             <a:spLocks noGrp="1"/>
           </p:cNvSpPr>
           <p:nvPr>
-            <p:ph type="ctrTitle"/>
+            <p:ph type="title"/>
           </p:nvPr>
         </p:nvSpPr>
         <p:spPr/>
@@ -4473,7 +4941,7 @@
           <a:p>
             <a:r>
               <a:rPr lang="en-US" dirty="0" smtClean="0"/>
-              <a:t>Advanced OOP: Inheritance and Polymorphism</a:t>
+              <a:t>Practical: Abstraction and Encapsulation</a:t>
             </a:r>
             <a:endParaRPr lang="en-US" dirty="0"/>
           </a:p>
@@ -4481,27 +4949,184 @@
       </p:sp>
       <p:sp>
         <p:nvSpPr>
-          <p:cNvPr id="3" name="Subtitle 2"/>
-          <p:cNvSpPr>
-            <a:spLocks noGrp="1"/>
-          </p:cNvSpPr>
-          <p:nvPr>
-            <p:ph type="subTitle" idx="1"/>
+          <p:cNvPr id="3" name="Content Placeholder 2"/>
+          <p:cNvSpPr>
+            <a:spLocks noGrp="1"/>
+          </p:cNvSpPr>
+          <p:nvPr>
+            <p:ph idx="1"/>
           </p:nvPr>
         </p:nvSpPr>
         <p:spPr/>
         <p:txBody>
-          <a:bodyPr/>
+          <a:bodyPr>
+            <a:normAutofit/>
+          </a:bodyPr>
           <a:lstStyle/>
           <a:p>
-            <a:endParaRPr lang="en-US"/>
+            <a:r>
+              <a:rPr lang="en-US" dirty="0" smtClean="0"/>
+              <a:t>You will make an interface, </a:t>
+            </a:r>
+            <a:r>
+              <a:rPr lang="en-US" i="1" dirty="0" err="1" smtClean="0"/>
+              <a:t>IPerson.cs</a:t>
+            </a:r>
+            <a:r>
+              <a:rPr lang="en-US" dirty="0" smtClean="0"/>
+              <a:t>, which implements </a:t>
+            </a:r>
+            <a:r>
+              <a:rPr lang="en-US" i="1" dirty="0" err="1" smtClean="0"/>
+              <a:t>IGenderable</a:t>
+            </a:r>
+            <a:r>
+              <a:rPr lang="en-US" i="1" dirty="0" smtClean="0"/>
+              <a:t>, </a:t>
+            </a:r>
+            <a:r>
+              <a:rPr lang="en-US" i="1" dirty="0" err="1" smtClean="0"/>
+              <a:t>IWalkable</a:t>
+            </a:r>
+            <a:r>
+              <a:rPr lang="en-US" i="1" dirty="0" smtClean="0"/>
+              <a:t>, </a:t>
+            </a:r>
+            <a:r>
+              <a:rPr lang="en-US" dirty="0" smtClean="0"/>
+              <a:t>and</a:t>
+            </a:r>
+            <a:r>
+              <a:rPr lang="en-US" i="1" dirty="0" smtClean="0"/>
+              <a:t> </a:t>
+            </a:r>
+            <a:r>
+              <a:rPr lang="en-US" i="1" dirty="0" err="1" smtClean="0"/>
+              <a:t>IEatable</a:t>
+            </a:r>
+            <a:endParaRPr lang="en-US" dirty="0" smtClean="0"/>
+          </a:p>
+          <a:p>
+            <a:r>
+              <a:rPr lang="en-US" dirty="0" smtClean="0"/>
+              <a:t>Properties in </a:t>
+            </a:r>
+            <a:r>
+              <a:rPr lang="en-US" dirty="0" err="1" smtClean="0"/>
+              <a:t>IPerson</a:t>
+            </a:r>
+            <a:r>
+              <a:rPr lang="en-US" dirty="0" smtClean="0"/>
+              <a:t>:</a:t>
+            </a:r>
+          </a:p>
+          <a:p>
+            <a:pPr lvl="1"/>
+            <a:r>
+              <a:rPr lang="en-US" dirty="0" smtClean="0"/>
+              <a:t>Name: String</a:t>
+            </a:r>
+          </a:p>
+          <a:p>
+            <a:pPr lvl="1"/>
+            <a:r>
+              <a:rPr lang="en-US" dirty="0" smtClean="0"/>
+              <a:t>Age: </a:t>
+            </a:r>
+            <a:r>
+              <a:rPr lang="en-US" dirty="0" err="1" smtClean="0"/>
+              <a:t>int</a:t>
+            </a:r>
+            <a:endParaRPr lang="en-US" dirty="0" smtClean="0"/>
+          </a:p>
+          <a:p>
+            <a:pPr lvl="1"/>
+            <a:r>
+              <a:rPr lang="en-US" dirty="0" smtClean="0"/>
+              <a:t>Hobbies: </a:t>
+            </a:r>
+            <a:r>
+              <a:rPr lang="en-US" dirty="0" err="1" smtClean="0"/>
+              <a:t>HashSet</a:t>
+            </a:r>
+            <a:r>
+              <a:rPr lang="en-US" dirty="0" smtClean="0"/>
+              <a:t>&lt;string&gt;()</a:t>
+            </a:r>
+          </a:p>
+          <a:p>
+            <a:r>
+              <a:rPr lang="en-US" dirty="0" smtClean="0"/>
+              <a:t>Methods in </a:t>
+            </a:r>
+            <a:r>
+              <a:rPr lang="en-US" dirty="0" err="1" smtClean="0"/>
+              <a:t>IPerson</a:t>
+            </a:r>
+            <a:r>
+              <a:rPr lang="en-US" dirty="0" smtClean="0"/>
+              <a:t>:</a:t>
+            </a:r>
+          </a:p>
+          <a:p>
+            <a:pPr lvl="1"/>
+            <a:r>
+              <a:rPr lang="en-US" dirty="0" smtClean="0"/>
+              <a:t>void Talk(): If the person does not have a hobby, it will print to the console: </a:t>
+            </a:r>
+            <a:r>
+              <a:rPr lang="en-US" i="1" dirty="0" smtClean="0"/>
+              <a:t>I don’t have anything to talk about</a:t>
+            </a:r>
+            <a:r>
+              <a:rPr lang="en-US" dirty="0" smtClean="0"/>
+              <a:t>; if the person has hobbies, it will talk about one of the hobbies</a:t>
+            </a:r>
+          </a:p>
+          <a:p>
+            <a:pPr lvl="1"/>
+            <a:r>
+              <a:rPr lang="en-US" dirty="0" smtClean="0"/>
+              <a:t>void </a:t>
+            </a:r>
+            <a:r>
+              <a:rPr lang="en-US" dirty="0" err="1" smtClean="0"/>
+              <a:t>AddHoby</a:t>
+            </a:r>
+            <a:r>
+              <a:rPr lang="en-US" dirty="0" smtClean="0"/>
+              <a:t>(string hobby): will add an entry to the set of hobbies</a:t>
+            </a:r>
+          </a:p>
+          <a:p>
+            <a:r>
+              <a:rPr lang="en-US" dirty="0" smtClean="0"/>
+              <a:t>You will then write </a:t>
+            </a:r>
+            <a:r>
+              <a:rPr lang="en-US" i="1" dirty="0" err="1" smtClean="0"/>
+              <a:t>Person.cs</a:t>
+            </a:r>
+            <a:r>
+              <a:rPr lang="en-US" dirty="0" smtClean="0"/>
+              <a:t>, which will implement </a:t>
+            </a:r>
+            <a:r>
+              <a:rPr lang="en-US" dirty="0" err="1" smtClean="0"/>
+              <a:t>IPerson</a:t>
+            </a:r>
+            <a:r>
+              <a:rPr lang="en-US" dirty="0" smtClean="0"/>
+              <a:t>!</a:t>
+            </a:r>
+            <a:endParaRPr lang="en-US" i="1" dirty="0"/>
           </a:p>
         </p:txBody>
       </p:sp>
     </p:spTree>
     <p:extLst>
       <p:ext uri="{BB962C8B-B14F-4D97-AF65-F5344CB8AC3E}">
-        <p14:creationId xmlns:p14="http://schemas.microsoft.com/office/powerpoint/2010/main" val="711584714"/>
+        <p14:creationId xmlns:p14="http://schemas.microsoft.com/office/powerpoint/2010/main" val="1584339635"/>
       </p:ext>
     </p:extLst>
   </p:cSld>
@@ -4528,315 +5153,52 @@
           <a:chExt cx="0" cy="0"/>
         </a:xfrm>
       </p:grpSpPr>
-      <p:sp useBgFill="1">
-        <p:nvSpPr>
-          <p:cNvPr id="8" name="Rectangle 7"/>
-          <p:cNvSpPr>
-            <a:spLocks noGrp="1" noRot="1" noChangeAspect="1" noMove="1" noResize="1" noEditPoints="1" noAdjustHandles="1" noChangeArrowheads="1" noChangeShapeType="1" noTextEdit="1"/>
-          </p:cNvSpPr>
-          <p:nvPr>
-            <p:extLst>
-              <p:ext uri="{386F3935-93C4-4BCD-93E2-E3B085C9AB24}">
-                <p16:designElem xmlns:p16="http://schemas.microsoft.com/office/powerpoint/2015/main" val="1"/>
-              </p:ext>
-            </p:extLst>
-          </p:nvPr>
-        </p:nvSpPr>
-        <p:spPr>
-          <a:xfrm>
-            <a:off x="0" y="0"/>
-            <a:ext cx="12186315" cy="6858000"/>
-          </a:xfrm>
-          <a:prstGeom prst="rect">
-            <a:avLst/>
-          </a:prstGeom>
-          <a:ln>
-            <a:noFill/>
-          </a:ln>
-        </p:spPr>
-        <p:style>
-          <a:lnRef idx="2">
-            <a:schemeClr val="accent6">
-              <a:shade val="50000"/>
-            </a:schemeClr>
-          </a:lnRef>
-          <a:fillRef idx="1001">
-            <a:schemeClr val="lt1"/>
-          </a:fillRef>
-          <a:effectRef idx="0">
-            <a:schemeClr val="accent6"/>
-          </a:effectRef>
-          <a:fontRef idx="minor">
-            <a:schemeClr val="lt1"/>
-          </a:fontRef>
-        </p:style>
-        <p:txBody>
-          <a:bodyPr rtlCol="0" anchor="ctr"/>
+      <p:sp>
+        <p:nvSpPr>
+          <p:cNvPr id="2" name="Title 1"/>
+          <p:cNvSpPr>
+            <a:spLocks noGrp="1"/>
+          </p:cNvSpPr>
+          <p:nvPr>
+            <p:ph type="ctrTitle"/>
+          </p:nvPr>
+        </p:nvSpPr>
+        <p:spPr/>
+        <p:txBody>
+          <a:bodyPr/>
           <a:lstStyle/>
           <a:p>
-            <a:pPr algn="ctr"/>
+            <a:r>
+              <a:rPr lang="en-US" dirty="0" smtClean="0"/>
+              <a:t>Advanced OOP: Inheritance and Polymorphism</a:t>
+            </a:r>
+            <a:endParaRPr lang="en-US" dirty="0"/>
+          </a:p>
+        </p:txBody>
+      </p:sp>
+      <p:sp>
+        <p:nvSpPr>
+          <p:cNvPr id="3" name="Subtitle 2"/>
+          <p:cNvSpPr>
+            <a:spLocks noGrp="1"/>
+          </p:cNvSpPr>
+          <p:nvPr>
+            <p:ph type="subTitle" idx="1"/>
+          </p:nvPr>
+        </p:nvSpPr>
+        <p:spPr/>
+        <p:txBody>
+          <a:bodyPr/>
+          <a:lstStyle/>
+          <a:p>
             <a:endParaRPr lang="en-US"/>
-          </a:p>
-        </p:txBody>
-      </p:sp>
-      <p:sp>
-        <p:nvSpPr>
-          <p:cNvPr id="10" name="Rectangle 9"/>
-          <p:cNvSpPr>
-            <a:spLocks noGrp="1" noRot="1" noChangeAspect="1" noMove="1" noResize="1" noEditPoints="1" noAdjustHandles="1" noChangeArrowheads="1" noChangeShapeType="1" noTextEdit="1"/>
-          </p:cNvSpPr>
-          <p:nvPr>
-            <p:extLst>
-              <p:ext uri="{386F3935-93C4-4BCD-93E2-E3B085C9AB24}">
-                <p16:designElem xmlns:p16="http://schemas.microsoft.com/office/powerpoint/2015/main" val="1"/>
-              </p:ext>
-            </p:extLst>
-          </p:nvPr>
-        </p:nvSpPr>
-        <p:spPr>
-          <a:xfrm>
-            <a:off x="16" y="0"/>
-            <a:ext cx="4050791" cy="6858000"/>
-          </a:xfrm>
-          <a:prstGeom prst="rect">
-            <a:avLst/>
-          </a:prstGeom>
-          <a:solidFill>
-            <a:schemeClr val="accent2"/>
-          </a:solidFill>
-          <a:ln>
-            <a:noFill/>
-          </a:ln>
-        </p:spPr>
-        <p:style>
-          <a:lnRef idx="2">
-            <a:schemeClr val="accent1">
-              <a:shade val="50000"/>
-            </a:schemeClr>
-          </a:lnRef>
-          <a:fillRef idx="1">
-            <a:schemeClr val="accent1"/>
-          </a:fillRef>
-          <a:effectRef idx="0">
-            <a:schemeClr val="accent1"/>
-          </a:effectRef>
-          <a:fontRef idx="minor">
-            <a:schemeClr val="lt1"/>
-          </a:fontRef>
-        </p:style>
-      </p:sp>
-      <p:sp>
-        <p:nvSpPr>
-          <p:cNvPr id="12" name="Rectangle 11"/>
-          <p:cNvSpPr>
-            <a:spLocks noGrp="1" noRot="1" noChangeAspect="1" noMove="1" noResize="1" noEditPoints="1" noAdjustHandles="1" noChangeArrowheads="1" noChangeShapeType="1" noTextEdit="1"/>
-          </p:cNvSpPr>
-          <p:nvPr>
-            <p:extLst>
-              <p:ext uri="{386F3935-93C4-4BCD-93E2-E3B085C9AB24}">
-                <p16:designElem xmlns:p16="http://schemas.microsoft.com/office/powerpoint/2015/main" val="1"/>
-              </p:ext>
-            </p:extLst>
-          </p:nvPr>
-        </p:nvSpPr>
-        <p:spPr>
-          <a:xfrm>
-            <a:off x="4040071" y="0"/>
-            <a:ext cx="64008" cy="6858000"/>
-          </a:xfrm>
-          <a:prstGeom prst="rect">
-            <a:avLst/>
-          </a:prstGeom>
-          <a:solidFill>
-            <a:schemeClr val="accent1"/>
-          </a:solidFill>
-          <a:ln>
-            <a:noFill/>
-          </a:ln>
-        </p:spPr>
-        <p:style>
-          <a:lnRef idx="2">
-            <a:schemeClr val="accent1">
-              <a:shade val="50000"/>
-            </a:schemeClr>
-          </a:lnRef>
-          <a:fillRef idx="1">
-            <a:schemeClr val="accent1"/>
-          </a:fillRef>
-          <a:effectRef idx="0">
-            <a:schemeClr val="accent1"/>
-          </a:effectRef>
-          <a:fontRef idx="minor">
-            <a:schemeClr val="lt1"/>
-          </a:fontRef>
-        </p:style>
-      </p:sp>
-      <p:pic>
-        <p:nvPicPr>
-          <p:cNvPr id="4" name="Picture 3"/>
-          <p:cNvPicPr>
-            <a:picLocks noChangeAspect="1"/>
-          </p:cNvPicPr>
-          <p:nvPr/>
-        </p:nvPicPr>
-        <p:blipFill>
-          <a:blip r:embed="rId2">
-            <a:extLst>
-              <a:ext uri="{28A0092B-C50C-407E-A947-70E740481C1C}">
-                <a14:useLocalDpi xmlns:a14="http://schemas.microsoft.com/office/drawing/2010/main" val="0"/>
-              </a:ext>
-            </a:extLst>
-          </a:blip>
-          <a:stretch>
-            <a:fillRect/>
-          </a:stretch>
-        </p:blipFill>
-        <p:spPr>
-          <a:xfrm>
-            <a:off x="4742017" y="1228121"/>
-            <a:ext cx="6798082" cy="4401758"/>
-          </a:xfrm>
-          <a:prstGeom prst="rect">
-            <a:avLst/>
-          </a:prstGeom>
-        </p:spPr>
-      </p:pic>
-      <p:sp>
-        <p:nvSpPr>
-          <p:cNvPr id="2" name="Title 1"/>
-          <p:cNvSpPr>
-            <a:spLocks noGrp="1"/>
-          </p:cNvSpPr>
-          <p:nvPr>
-            <p:ph type="title"/>
-          </p:nvPr>
-        </p:nvSpPr>
-        <p:spPr>
-          <a:xfrm>
-            <a:off x="492370" y="516835"/>
-            <a:ext cx="3084844" cy="2103875"/>
-          </a:xfrm>
-        </p:spPr>
-        <p:txBody>
-          <a:bodyPr>
-            <a:normAutofit/>
-          </a:bodyPr>
-          <a:lstStyle/>
-          <a:p>
-            <a:r>
-              <a:rPr lang="en-US" sz="3600">
-                <a:solidFill>
-                  <a:srgbClr val="FFFFFF"/>
-                </a:solidFill>
-              </a:rPr>
-              <a:t>What is inheritance?</a:t>
-            </a:r>
-          </a:p>
-        </p:txBody>
-      </p:sp>
-      <p:sp>
-        <p:nvSpPr>
-          <p:cNvPr id="3" name="Content Placeholder 2"/>
-          <p:cNvSpPr>
-            <a:spLocks noGrp="1"/>
-          </p:cNvSpPr>
-          <p:nvPr>
-            <p:ph idx="1"/>
-          </p:nvPr>
-        </p:nvSpPr>
-        <p:spPr>
-          <a:xfrm>
-            <a:off x="492371" y="2653800"/>
-            <a:ext cx="3084844" cy="3335519"/>
-          </a:xfrm>
-        </p:spPr>
-        <p:txBody>
-          <a:bodyPr>
-            <a:normAutofit/>
-          </a:bodyPr>
-          <a:lstStyle/>
-          <a:p>
-            <a:pPr>
-              <a:lnSpc>
-                <a:spcPct val="70000"/>
-              </a:lnSpc>
-            </a:pPr>
-            <a:r>
-              <a:rPr lang="en-US" sz="1400" dirty="0">
-                <a:solidFill>
-                  <a:srgbClr val="FFFFFF"/>
-                </a:solidFill>
-              </a:rPr>
-              <a:t>Inheritance is the concept of allowing classes to be created that exist "on top" of other classes. </a:t>
-            </a:r>
-          </a:p>
-          <a:p>
-            <a:pPr>
-              <a:lnSpc>
-                <a:spcPct val="70000"/>
-              </a:lnSpc>
-            </a:pPr>
-            <a:r>
-              <a:rPr lang="en-US" sz="1400" dirty="0">
-                <a:solidFill>
-                  <a:srgbClr val="FFFFFF"/>
-                </a:solidFill>
-              </a:rPr>
-              <a:t>For example, we can make a class for mammals, and have dogs inherit from that class. Often, we will inherit from abstract or partial classes. </a:t>
-            </a:r>
-          </a:p>
-          <a:p>
-            <a:pPr>
-              <a:lnSpc>
-                <a:spcPct val="70000"/>
-              </a:lnSpc>
-            </a:pPr>
-            <a:r>
-              <a:rPr lang="en-US" sz="1400" dirty="0">
-                <a:solidFill>
-                  <a:srgbClr val="FFFFFF"/>
-                </a:solidFill>
-              </a:rPr>
-              <a:t>Is is often useful to make an abstract class, which is a "partial class", or to use virtual methods when making a class. You can't make a new instance of an abstract class since it's incomplete, but you can inherit from them and build on top of them.</a:t>
-            </a:r>
-          </a:p>
-          <a:p>
-            <a:pPr>
-              <a:lnSpc>
-                <a:spcPct val="70000"/>
-              </a:lnSpc>
-            </a:pPr>
-            <a:r>
-              <a:rPr lang="en-US" sz="1400" dirty="0">
-                <a:solidFill>
-                  <a:srgbClr val="FFFFFF"/>
-                </a:solidFill>
-              </a:rPr>
-              <a:t>Our Mammal class was an abstract class, and our </a:t>
-            </a:r>
-            <a:r>
-              <a:rPr lang="en-US" sz="1400" dirty="0" err="1">
-                <a:solidFill>
-                  <a:srgbClr val="FFFFFF"/>
-                </a:solidFill>
-              </a:rPr>
-              <a:t>HoneyBadger</a:t>
-            </a:r>
-            <a:r>
-              <a:rPr lang="en-US" sz="1400" dirty="0">
-                <a:solidFill>
-                  <a:srgbClr val="FFFFFF"/>
-                </a:solidFill>
-              </a:rPr>
-              <a:t> class inherits the Mammal class and finishes it up.</a:t>
-            </a:r>
           </a:p>
         </p:txBody>
       </p:sp>
     </p:spTree>
     <p:extLst>
       <p:ext uri="{BB962C8B-B14F-4D97-AF65-F5344CB8AC3E}">
-        <p14:creationId xmlns:p14="http://schemas.microsoft.com/office/powerpoint/2010/main" val="716345250"/>
+        <p14:creationId xmlns:p14="http://schemas.microsoft.com/office/powerpoint/2010/main" val="711584714"/>
       </p:ext>
     </p:extLst>
   </p:cSld>
@@ -4863,6 +5225,179 @@
           <a:chExt cx="0" cy="0"/>
         </a:xfrm>
       </p:grpSpPr>
+      <p:sp useBgFill="1">
+        <p:nvSpPr>
+          <p:cNvPr id="8" name="Rectangle 7"/>
+          <p:cNvSpPr>
+            <a:spLocks noGrp="1" noRot="1" noChangeAspect="1" noMove="1" noResize="1" noEditPoints="1" noAdjustHandles="1" noChangeArrowheads="1" noChangeShapeType="1" noTextEdit="1"/>
+          </p:cNvSpPr>
+          <p:nvPr>
+            <p:extLst>
+              <p:ext uri="{386F3935-93C4-4BCD-93E2-E3B085C9AB24}">
+                <p16:designElem xmlns:p16="http://schemas.microsoft.com/office/powerpoint/2015/main" val="1"/>
+              </p:ext>
+            </p:extLst>
+          </p:nvPr>
+        </p:nvSpPr>
+        <p:spPr>
+          <a:xfrm>
+            <a:off x="0" y="0"/>
+            <a:ext cx="12186315" cy="6858000"/>
+          </a:xfrm>
+          <a:prstGeom prst="rect">
+            <a:avLst/>
+          </a:prstGeom>
+          <a:ln>
+            <a:noFill/>
+          </a:ln>
+        </p:spPr>
+        <p:style>
+          <a:lnRef idx="2">
+            <a:schemeClr val="accent6">
+              <a:shade val="50000"/>
+            </a:schemeClr>
+          </a:lnRef>
+          <a:fillRef idx="1001">
+            <a:schemeClr val="lt1"/>
+          </a:fillRef>
+          <a:effectRef idx="0">
+            <a:schemeClr val="accent6"/>
+          </a:effectRef>
+          <a:fontRef idx="minor">
+            <a:schemeClr val="lt1"/>
+          </a:fontRef>
+        </p:style>
+        <p:txBody>
+          <a:bodyPr rtlCol="0" anchor="ctr"/>
+          <a:lstStyle/>
+          <a:p>
+            <a:pPr algn="ctr"/>
+            <a:endParaRPr lang="en-US"/>
+          </a:p>
+        </p:txBody>
+      </p:sp>
+      <p:sp>
+        <p:nvSpPr>
+          <p:cNvPr id="10" name="Rectangle 9"/>
+          <p:cNvSpPr>
+            <a:spLocks noGrp="1" noRot="1" noChangeAspect="1" noMove="1" noResize="1" noEditPoints="1" noAdjustHandles="1" noChangeArrowheads="1" noChangeShapeType="1" noTextEdit="1"/>
+          </p:cNvSpPr>
+          <p:nvPr>
+            <p:extLst>
+              <p:ext uri="{386F3935-93C4-4BCD-93E2-E3B085C9AB24}">
+                <p16:designElem xmlns:p16="http://schemas.microsoft.com/office/powerpoint/2015/main" val="1"/>
+              </p:ext>
+            </p:extLst>
+          </p:nvPr>
+        </p:nvSpPr>
+        <p:spPr>
+          <a:xfrm>
+            <a:off x="16" y="0"/>
+            <a:ext cx="4050791" cy="6858000"/>
+          </a:xfrm>
+          <a:prstGeom prst="rect">
+            <a:avLst/>
+          </a:prstGeom>
+          <a:solidFill>
+            <a:schemeClr val="accent2"/>
+          </a:solidFill>
+          <a:ln>
+            <a:noFill/>
+          </a:ln>
+        </p:spPr>
+        <p:style>
+          <a:lnRef idx="2">
+            <a:schemeClr val="accent1">
+              <a:shade val="50000"/>
+            </a:schemeClr>
+          </a:lnRef>
+          <a:fillRef idx="1">
+            <a:schemeClr val="accent1"/>
+          </a:fillRef>
+          <a:effectRef idx="0">
+            <a:schemeClr val="accent1"/>
+          </a:effectRef>
+          <a:fontRef idx="minor">
+            <a:schemeClr val="lt1"/>
+          </a:fontRef>
+        </p:style>
+      </p:sp>
+      <p:sp>
+        <p:nvSpPr>
+          <p:cNvPr id="12" name="Rectangle 11"/>
+          <p:cNvSpPr>
+            <a:spLocks noGrp="1" noRot="1" noChangeAspect="1" noMove="1" noResize="1" noEditPoints="1" noAdjustHandles="1" noChangeArrowheads="1" noChangeShapeType="1" noTextEdit="1"/>
+          </p:cNvSpPr>
+          <p:nvPr>
+            <p:extLst>
+              <p:ext uri="{386F3935-93C4-4BCD-93E2-E3B085C9AB24}">
+                <p16:designElem xmlns:p16="http://schemas.microsoft.com/office/powerpoint/2015/main" val="1"/>
+              </p:ext>
+            </p:extLst>
+          </p:nvPr>
+        </p:nvSpPr>
+        <p:spPr>
+          <a:xfrm>
+            <a:off x="4040071" y="0"/>
+            <a:ext cx="64008" cy="6858000"/>
+          </a:xfrm>
+          <a:prstGeom prst="rect">
+            <a:avLst/>
+          </a:prstGeom>
+          <a:solidFill>
+            <a:schemeClr val="accent1"/>
+          </a:solidFill>
+          <a:ln>
+            <a:noFill/>
+          </a:ln>
+        </p:spPr>
+        <p:style>
+          <a:lnRef idx="2">
+            <a:schemeClr val="accent1">
+              <a:shade val="50000"/>
+            </a:schemeClr>
+          </a:lnRef>
+          <a:fillRef idx="1">
+            <a:schemeClr val="accent1"/>
+          </a:fillRef>
+          <a:effectRef idx="0">
+            <a:schemeClr val="accent1"/>
+          </a:effectRef>
+          <a:fontRef idx="minor">
+            <a:schemeClr val="lt1"/>
+          </a:fontRef>
+        </p:style>
+      </p:sp>
+      <p:pic>
+        <p:nvPicPr>
+          <p:cNvPr id="4" name="Picture 3"/>
+          <p:cNvPicPr>
+            <a:picLocks noChangeAspect="1"/>
+          </p:cNvPicPr>
+          <p:nvPr/>
+        </p:nvPicPr>
+        <p:blipFill>
+          <a:blip r:embed="rId2">
+            <a:extLst>
+              <a:ext uri="{28A0092B-C50C-407E-A947-70E740481C1C}">
+                <a14:useLocalDpi xmlns:a14="http://schemas.microsoft.com/office/drawing/2010/main" val="0"/>
+              </a:ext>
+            </a:extLst>
+          </a:blip>
+          <a:stretch>
+            <a:fillRect/>
+          </a:stretch>
+        </p:blipFill>
+        <p:spPr>
+          <a:xfrm>
+            <a:off x="4742017" y="1228121"/>
+            <a:ext cx="6798082" cy="4401758"/>
+          </a:xfrm>
+          <a:prstGeom prst="rect">
+            <a:avLst/>
+          </a:prstGeom>
+        </p:spPr>
+      </p:pic>
       <p:sp>
         <p:nvSpPr>
           <p:cNvPr id="2" name="Title 1"/>
@@ -4873,16 +5408,26 @@
             <p:ph type="title"/>
           </p:nvPr>
         </p:nvSpPr>
-        <p:spPr/>
-        <p:txBody>
-          <a:bodyPr/>
+        <p:spPr>
+          <a:xfrm>
+            <a:off x="492370" y="516835"/>
+            <a:ext cx="3084844" cy="2103875"/>
+          </a:xfrm>
+        </p:spPr>
+        <p:txBody>
+          <a:bodyPr>
+            <a:normAutofit/>
+          </a:bodyPr>
           <a:lstStyle/>
           <a:p>
             <a:r>
-              <a:rPr lang="en-US" dirty="0" smtClean="0"/>
-              <a:t>Multiple Inheritance</a:t>
-            </a:r>
-            <a:endParaRPr lang="en-US" dirty="0"/>
+              <a:rPr lang="en-US" sz="3600">
+                <a:solidFill>
+                  <a:srgbClr val="FFFFFF"/>
+                </a:solidFill>
+              </a:rPr>
+              <a:t>What is inheritance?</a:t>
+            </a:r>
           </a:p>
         </p:txBody>
       </p:sp>
@@ -4896,136 +5441,99 @@
             <p:ph idx="1"/>
           </p:nvPr>
         </p:nvSpPr>
-        <p:spPr/>
-        <p:txBody>
-          <a:bodyPr/>
+        <p:spPr>
+          <a:xfrm>
+            <a:off x="492371" y="2653800"/>
+            <a:ext cx="3084844" cy="3335519"/>
+          </a:xfrm>
+        </p:spPr>
+        <p:txBody>
+          <a:bodyPr>
+            <a:normAutofit/>
+          </a:bodyPr>
           <a:lstStyle/>
           <a:p>
-            <a:r>
-              <a:rPr lang="en-US" dirty="0" smtClean="0"/>
-              <a:t>Interfaces and classes can both inherit from multiple interfaces at a time. This allows us to create small interfaces that describe a very reusable slice of functionality. </a:t>
-            </a:r>
-            <a:endParaRPr lang="en-US" dirty="0"/>
-          </a:p>
-          <a:p>
-            <a:r>
-              <a:rPr lang="en-US" dirty="0" smtClean="0"/>
-              <a:t>For example, our animals all can move! But they all move in different ways.</a:t>
-            </a:r>
-          </a:p>
-          <a:p>
-            <a:r>
-              <a:rPr lang="en-US" dirty="0" smtClean="0"/>
-              <a:t>Rather than declare that all our animals follow the interface rules of </a:t>
-            </a:r>
-            <a:r>
-              <a:rPr lang="en-US" dirty="0" err="1" smtClean="0"/>
-              <a:t>IWalkable</a:t>
-            </a:r>
-            <a:r>
-              <a:rPr lang="en-US" dirty="0" smtClean="0"/>
-              <a:t>, or </a:t>
-            </a:r>
-            <a:r>
-              <a:rPr lang="en-US" dirty="0" err="1" smtClean="0"/>
-              <a:t>IFlyable</a:t>
-            </a:r>
-            <a:r>
-              <a:rPr lang="en-US" dirty="0" smtClean="0"/>
-              <a:t>, we have each particular abstract class define inherit from </a:t>
-            </a:r>
-            <a:r>
-              <a:rPr lang="en-US" dirty="0" err="1" smtClean="0"/>
-              <a:t>IAnimal</a:t>
-            </a:r>
-            <a:r>
-              <a:rPr lang="en-US" dirty="0" smtClean="0"/>
-              <a:t> and whichever movement patterns describe them best.</a:t>
-            </a:r>
-          </a:p>
-          <a:p>
-            <a:pPr lvl="1"/>
-            <a:r>
-              <a:rPr lang="en-US" dirty="0" smtClean="0"/>
-              <a:t>Mammal inherits from </a:t>
-            </a:r>
-            <a:r>
-              <a:rPr lang="en-US" dirty="0" err="1" smtClean="0"/>
-              <a:t>IWalkable</a:t>
-            </a:r>
-            <a:r>
-              <a:rPr lang="en-US" dirty="0" smtClean="0"/>
-              <a:t> and </a:t>
-            </a:r>
-            <a:r>
-              <a:rPr lang="en-US" dirty="0" err="1" smtClean="0"/>
-              <a:t>IAnimal</a:t>
-            </a:r>
-            <a:endParaRPr lang="en-US" dirty="0" smtClean="0"/>
-          </a:p>
-          <a:p>
-            <a:pPr lvl="1"/>
-            <a:r>
-              <a:rPr lang="en-US" dirty="0" smtClean="0"/>
-              <a:t>Avian inherits from </a:t>
-            </a:r>
-            <a:r>
-              <a:rPr lang="en-US" dirty="0" err="1" smtClean="0"/>
-              <a:t>IWalkable</a:t>
-            </a:r>
-            <a:r>
-              <a:rPr lang="en-US" dirty="0" smtClean="0"/>
-              <a:t>, </a:t>
-            </a:r>
-            <a:r>
-              <a:rPr lang="en-US" dirty="0" err="1" smtClean="0"/>
-              <a:t>IFlyable</a:t>
-            </a:r>
-            <a:r>
-              <a:rPr lang="en-US" dirty="0" smtClean="0"/>
-              <a:t>, and </a:t>
-            </a:r>
-            <a:r>
-              <a:rPr lang="en-US" dirty="0" err="1" smtClean="0"/>
-              <a:t>IAnimal</a:t>
-            </a:r>
-            <a:endParaRPr lang="en-US" dirty="0"/>
-          </a:p>
-          <a:p>
-            <a:r>
-              <a:rPr lang="en-US" dirty="0" smtClean="0"/>
-              <a:t>This can be extended to a school of thought known as </a:t>
-            </a:r>
-            <a:r>
-              <a:rPr lang="en-US" i="1" dirty="0" smtClean="0"/>
-              <a:t>composition over inheritance</a:t>
-            </a:r>
-          </a:p>
-          <a:p>
-            <a:pPr lvl="1"/>
-            <a:r>
-              <a:rPr lang="en-US" dirty="0">
-                <a:hlinkClick r:id="rId2"/>
+            <a:pPr>
+              <a:lnSpc>
+                <a:spcPct val="70000"/>
+              </a:lnSpc>
+            </a:pPr>
+            <a:r>
+              <a:rPr lang="en-US" sz="1400" dirty="0">
+                <a:solidFill>
+                  <a:srgbClr val="FFFFFF"/>
+                </a:solidFill>
               </a:rPr>
-              <a:t>https://</a:t>
-            </a:r>
-            <a:r>
-              <a:rPr lang="en-US" dirty="0" smtClean="0">
-                <a:hlinkClick r:id="rId2"/>
+              <a:t>Inheritance is the concept of allowing classes to be created that exist "on top" of other classes. </a:t>
+            </a:r>
+          </a:p>
+          <a:p>
+            <a:pPr>
+              <a:lnSpc>
+                <a:spcPct val="70000"/>
+              </a:lnSpc>
+            </a:pPr>
+            <a:r>
+              <a:rPr lang="en-US" sz="1400" dirty="0">
+                <a:solidFill>
+                  <a:srgbClr val="FFFFFF"/>
+                </a:solidFill>
               </a:rPr>
-              <a:t>en.wikipedia.org/wiki/Composition_over_inheritance</a:t>
-            </a:r>
-            <a:endParaRPr lang="en-US" dirty="0" smtClean="0"/>
-          </a:p>
-          <a:p>
-            <a:endParaRPr lang="en-US" dirty="0"/>
+              <a:t>For example, we can make a class for mammals, and have dogs inherit from that class. Often, we will inherit from abstract or partial classes. </a:t>
+            </a:r>
+          </a:p>
+          <a:p>
+            <a:pPr>
+              <a:lnSpc>
+                <a:spcPct val="70000"/>
+              </a:lnSpc>
+            </a:pPr>
+            <a:r>
+              <a:rPr lang="en-US" sz="1400" dirty="0">
+                <a:solidFill>
+                  <a:srgbClr val="FFFFFF"/>
+                </a:solidFill>
+              </a:rPr>
+              <a:t>Is is often useful to make an abstract class, which is a "partial class", or to use virtual methods when making a class. You can't make a new instance of an abstract class since it's incomplete, but you can inherit from them and build on top of them.</a:t>
+            </a:r>
+          </a:p>
+          <a:p>
+            <a:pPr>
+              <a:lnSpc>
+                <a:spcPct val="70000"/>
+              </a:lnSpc>
+            </a:pPr>
+            <a:r>
+              <a:rPr lang="en-US" sz="1400" dirty="0">
+                <a:solidFill>
+                  <a:srgbClr val="FFFFFF"/>
+                </a:solidFill>
+              </a:rPr>
+              <a:t>Our Mammal class was an abstract class, and our </a:t>
+            </a:r>
+            <a:r>
+              <a:rPr lang="en-US" sz="1400" dirty="0" err="1">
+                <a:solidFill>
+                  <a:srgbClr val="FFFFFF"/>
+                </a:solidFill>
+              </a:rPr>
+              <a:t>HoneyBadger</a:t>
+            </a:r>
+            <a:r>
+              <a:rPr lang="en-US" sz="1400" dirty="0">
+                <a:solidFill>
+                  <a:srgbClr val="FFFFFF"/>
+                </a:solidFill>
+              </a:rPr>
+              <a:t> class inherits the Mammal class and finishes it up.</a:t>
+            </a:r>
           </a:p>
         </p:txBody>
       </p:sp>
     </p:spTree>
     <p:extLst>
       <p:ext uri="{BB962C8B-B14F-4D97-AF65-F5344CB8AC3E}">
-        <p14:creationId xmlns:p14="http://schemas.microsoft.com/office/powerpoint/2010/main" val="1948332637"/>
+        <p14:creationId xmlns:p14="http://schemas.microsoft.com/office/powerpoint/2010/main" val="716345250"/>
       </p:ext>
     </p:extLst>
   </p:cSld>
@@ -5068,9 +5576,10 @@
           <a:lstStyle/>
           <a:p>
             <a:r>
-              <a:rPr lang="en-US" dirty="0"/>
-              <a:t>What is polymorphism?</a:t>
-            </a:r>
+              <a:rPr lang="en-US" dirty="0" smtClean="0"/>
+              <a:t>Multiple Inheritance</a:t>
+            </a:r>
+            <a:endParaRPr lang="en-US" dirty="0"/>
           </a:p>
         </p:txBody>
       </p:sp>
@@ -5090,13 +5599,120 @@
           <a:lstStyle/>
           <a:p>
             <a:r>
-              <a:rPr lang="en-US" dirty="0"/>
-              <a:t>Polymorphism is the concept of your classes using the same name to represent the same action occurring, but in different ways. This comes in two forms: overriding, and </a:t>
-            </a:r>
-            <a:r>
               <a:rPr lang="en-US" dirty="0" smtClean="0"/>
-              <a:t>overloading</a:t>
-            </a:r>
+              <a:t>Interfaces and classes can both inherit from multiple interfaces at a time. This allows us to create small interfaces that describe a very reusable slice of functionality. </a:t>
+            </a:r>
+            <a:endParaRPr lang="en-US" dirty="0"/>
+          </a:p>
+          <a:p>
+            <a:r>
+              <a:rPr lang="en-US" dirty="0" smtClean="0"/>
+              <a:t>For example, our animals all can move! But they all move in different ways.</a:t>
+            </a:r>
+          </a:p>
+          <a:p>
+            <a:r>
+              <a:rPr lang="en-US" dirty="0" smtClean="0"/>
+              <a:t>Rather than declare that all our animals follow the interface rules of </a:t>
+            </a:r>
+            <a:r>
+              <a:rPr lang="en-US" dirty="0" err="1" smtClean="0"/>
+              <a:t>IWalkable</a:t>
+            </a:r>
+            <a:r>
+              <a:rPr lang="en-US" dirty="0" smtClean="0"/>
+              <a:t>, or </a:t>
+            </a:r>
+            <a:r>
+              <a:rPr lang="en-US" dirty="0" err="1" smtClean="0"/>
+              <a:t>IFlyable</a:t>
+            </a:r>
+            <a:r>
+              <a:rPr lang="en-US" dirty="0" smtClean="0"/>
+              <a:t>, we have each particular abstract class define inherit from </a:t>
+            </a:r>
+            <a:r>
+              <a:rPr lang="en-US" dirty="0" err="1" smtClean="0"/>
+              <a:t>IAnimal</a:t>
+            </a:r>
+            <a:r>
+              <a:rPr lang="en-US" dirty="0" smtClean="0"/>
+              <a:t> and whichever movement patterns describe them best.</a:t>
+            </a:r>
+          </a:p>
+          <a:p>
+            <a:pPr lvl="1"/>
+            <a:r>
+              <a:rPr lang="en-US" dirty="0" smtClean="0"/>
+              <a:t>Mammal inherits from </a:t>
+            </a:r>
+            <a:r>
+              <a:rPr lang="en-US" dirty="0" err="1" smtClean="0"/>
+              <a:t>IWalkable</a:t>
+            </a:r>
+            <a:r>
+              <a:rPr lang="en-US" dirty="0" smtClean="0"/>
+              <a:t> and </a:t>
+            </a:r>
+            <a:r>
+              <a:rPr lang="en-US" dirty="0" err="1" smtClean="0"/>
+              <a:t>IAnimal</a:t>
+            </a:r>
+            <a:endParaRPr lang="en-US" dirty="0" smtClean="0"/>
+          </a:p>
+          <a:p>
+            <a:pPr lvl="1"/>
+            <a:r>
+              <a:rPr lang="en-US" dirty="0" smtClean="0"/>
+              <a:t>Avian inherits from </a:t>
+            </a:r>
+            <a:r>
+              <a:rPr lang="en-US" dirty="0" err="1" smtClean="0"/>
+              <a:t>IWalkable</a:t>
+            </a:r>
+            <a:r>
+              <a:rPr lang="en-US" dirty="0" smtClean="0"/>
+              <a:t>, </a:t>
+            </a:r>
+            <a:r>
+              <a:rPr lang="en-US" dirty="0" err="1" smtClean="0"/>
+              <a:t>IFlyable</a:t>
+            </a:r>
+            <a:r>
+              <a:rPr lang="en-US" dirty="0" smtClean="0"/>
+              <a:t>, and </a:t>
+            </a:r>
+            <a:r>
+              <a:rPr lang="en-US" dirty="0" err="1" smtClean="0"/>
+              <a:t>IAnimal</a:t>
+            </a:r>
+            <a:endParaRPr lang="en-US" dirty="0"/>
+          </a:p>
+          <a:p>
+            <a:r>
+              <a:rPr lang="en-US" dirty="0" smtClean="0"/>
+              <a:t>This can be extended to a school of thought known as </a:t>
+            </a:r>
+            <a:r>
+              <a:rPr lang="en-US" i="1" dirty="0" smtClean="0"/>
+              <a:t>composition over inheritance</a:t>
+            </a:r>
+          </a:p>
+          <a:p>
+            <a:pPr lvl="1"/>
+            <a:r>
+              <a:rPr lang="en-US" dirty="0">
+                <a:hlinkClick r:id="rId2"/>
+              </a:rPr>
+              <a:t>https://</a:t>
+            </a:r>
+            <a:r>
+              <a:rPr lang="en-US" dirty="0" smtClean="0">
+                <a:hlinkClick r:id="rId2"/>
+              </a:rPr>
+              <a:t>en.wikipedia.org/wiki/Composition_over_inheritance</a:t>
+            </a:r>
+            <a:endParaRPr lang="en-US" dirty="0" smtClean="0"/>
           </a:p>
           <a:p>
             <a:endParaRPr lang="en-US" dirty="0"/>
@@ -5106,7 +5722,7 @@
     </p:spTree>
     <p:extLst>
       <p:ext uri="{BB962C8B-B14F-4D97-AF65-F5344CB8AC3E}">
-        <p14:creationId xmlns:p14="http://schemas.microsoft.com/office/powerpoint/2010/main" val="1666164392"/>
+        <p14:creationId xmlns:p14="http://schemas.microsoft.com/office/powerpoint/2010/main" val="1948332637"/>
       </p:ext>
     </p:extLst>
   </p:cSld>
@@ -5133,291 +5749,61 @@
           <a:chExt cx="0" cy="0"/>
         </a:xfrm>
       </p:grpSpPr>
-      <p:sp useBgFill="1">
-        <p:nvSpPr>
-          <p:cNvPr id="8" name="Rectangle 7"/>
-          <p:cNvSpPr>
-            <a:spLocks noGrp="1" noRot="1" noChangeAspect="1" noMove="1" noResize="1" noEditPoints="1" noAdjustHandles="1" noChangeArrowheads="1" noChangeShapeType="1" noTextEdit="1"/>
-          </p:cNvSpPr>
-          <p:nvPr>
-            <p:extLst>
-              <p:ext uri="{386F3935-93C4-4BCD-93E2-E3B085C9AB24}">
-                <p16:designElem xmlns:p16="http://schemas.microsoft.com/office/powerpoint/2015/main" val="1"/>
-              </p:ext>
-            </p:extLst>
-          </p:nvPr>
-        </p:nvSpPr>
-        <p:spPr>
-          <a:xfrm>
-            <a:off x="0" y="0"/>
-            <a:ext cx="12186315" cy="6858000"/>
-          </a:xfrm>
-          <a:prstGeom prst="rect">
-            <a:avLst/>
-          </a:prstGeom>
-          <a:ln>
-            <a:noFill/>
-          </a:ln>
-        </p:spPr>
-        <p:style>
-          <a:lnRef idx="2">
-            <a:schemeClr val="accent6">
-              <a:shade val="50000"/>
-            </a:schemeClr>
-          </a:lnRef>
-          <a:fillRef idx="1001">
-            <a:schemeClr val="lt1"/>
-          </a:fillRef>
-          <a:effectRef idx="0">
-            <a:schemeClr val="accent6"/>
-          </a:effectRef>
-          <a:fontRef idx="minor">
-            <a:schemeClr val="lt1"/>
-          </a:fontRef>
-        </p:style>
-        <p:txBody>
-          <a:bodyPr rtlCol="0" anchor="ctr"/>
+      <p:sp>
+        <p:nvSpPr>
+          <p:cNvPr id="2" name="Title 1"/>
+          <p:cNvSpPr>
+            <a:spLocks noGrp="1"/>
+          </p:cNvSpPr>
+          <p:nvPr>
+            <p:ph type="title"/>
+          </p:nvPr>
+        </p:nvSpPr>
+        <p:spPr/>
+        <p:txBody>
+          <a:bodyPr/>
           <a:lstStyle/>
           <a:p>
-            <a:pPr algn="ctr"/>
-            <a:endParaRPr lang="en-US"/>
-          </a:p>
-        </p:txBody>
-      </p:sp>
-      <p:sp>
-        <p:nvSpPr>
-          <p:cNvPr id="10" name="Rectangle 9"/>
-          <p:cNvSpPr>
-            <a:spLocks noGrp="1" noRot="1" noChangeAspect="1" noMove="1" noResize="1" noEditPoints="1" noAdjustHandles="1" noChangeArrowheads="1" noChangeShapeType="1" noTextEdit="1"/>
-          </p:cNvSpPr>
-          <p:nvPr>
-            <p:extLst>
-              <p:ext uri="{386F3935-93C4-4BCD-93E2-E3B085C9AB24}">
-                <p16:designElem xmlns:p16="http://schemas.microsoft.com/office/powerpoint/2015/main" val="1"/>
-              </p:ext>
-            </p:extLst>
-          </p:nvPr>
-        </p:nvSpPr>
-        <p:spPr>
-          <a:xfrm>
-            <a:off x="16" y="0"/>
-            <a:ext cx="4050791" cy="6858000"/>
-          </a:xfrm>
-          <a:prstGeom prst="rect">
-            <a:avLst/>
-          </a:prstGeom>
-          <a:solidFill>
-            <a:schemeClr val="accent2"/>
-          </a:solidFill>
-          <a:ln>
-            <a:noFill/>
-          </a:ln>
-        </p:spPr>
-        <p:style>
-          <a:lnRef idx="2">
-            <a:schemeClr val="accent1">
-              <a:shade val="50000"/>
-            </a:schemeClr>
-          </a:lnRef>
-          <a:fillRef idx="1">
-            <a:schemeClr val="accent1"/>
-          </a:fillRef>
-          <a:effectRef idx="0">
-            <a:schemeClr val="accent1"/>
-          </a:effectRef>
-          <a:fontRef idx="minor">
-            <a:schemeClr val="lt1"/>
-          </a:fontRef>
-        </p:style>
-      </p:sp>
-      <p:sp>
-        <p:nvSpPr>
-          <p:cNvPr id="12" name="Rectangle 11"/>
-          <p:cNvSpPr>
-            <a:spLocks noGrp="1" noRot="1" noChangeAspect="1" noMove="1" noResize="1" noEditPoints="1" noAdjustHandles="1" noChangeArrowheads="1" noChangeShapeType="1" noTextEdit="1"/>
-          </p:cNvSpPr>
-          <p:nvPr>
-            <p:extLst>
-              <p:ext uri="{386F3935-93C4-4BCD-93E2-E3B085C9AB24}">
-                <p16:designElem xmlns:p16="http://schemas.microsoft.com/office/powerpoint/2015/main" val="1"/>
-              </p:ext>
-            </p:extLst>
-          </p:nvPr>
-        </p:nvSpPr>
-        <p:spPr>
-          <a:xfrm>
-            <a:off x="4040071" y="0"/>
-            <a:ext cx="64008" cy="6858000"/>
-          </a:xfrm>
-          <a:prstGeom prst="rect">
-            <a:avLst/>
-          </a:prstGeom>
-          <a:solidFill>
-            <a:schemeClr val="accent1"/>
-          </a:solidFill>
-          <a:ln>
-            <a:noFill/>
-          </a:ln>
-        </p:spPr>
-        <p:style>
-          <a:lnRef idx="2">
-            <a:schemeClr val="accent1">
-              <a:shade val="50000"/>
-            </a:schemeClr>
-          </a:lnRef>
-          <a:fillRef idx="1">
-            <a:schemeClr val="accent1"/>
-          </a:fillRef>
-          <a:effectRef idx="0">
-            <a:schemeClr val="accent1"/>
-          </a:effectRef>
-          <a:fontRef idx="minor">
-            <a:schemeClr val="lt1"/>
-          </a:fontRef>
-        </p:style>
-      </p:sp>
-      <p:pic>
-        <p:nvPicPr>
-          <p:cNvPr id="4" name="Picture 3"/>
-          <p:cNvPicPr>
-            <a:picLocks noChangeAspect="1"/>
-          </p:cNvPicPr>
-          <p:nvPr/>
-        </p:nvPicPr>
-        <p:blipFill>
-          <a:blip r:embed="rId2">
-            <a:extLst>
-              <a:ext uri="{28A0092B-C50C-407E-A947-70E740481C1C}">
-                <a14:useLocalDpi xmlns:a14="http://schemas.microsoft.com/office/drawing/2010/main" val="0"/>
-              </a:ext>
-            </a:extLst>
-          </a:blip>
-          <a:stretch>
-            <a:fillRect/>
-          </a:stretch>
-        </p:blipFill>
-        <p:spPr>
-          <a:xfrm>
-            <a:off x="5791393" y="640080"/>
-            <a:ext cx="4699329" cy="5577840"/>
-          </a:xfrm>
-          <a:prstGeom prst="rect">
-            <a:avLst/>
-          </a:prstGeom>
-        </p:spPr>
-      </p:pic>
-      <p:sp>
-        <p:nvSpPr>
-          <p:cNvPr id="2" name="Title 1"/>
-          <p:cNvSpPr>
-            <a:spLocks noGrp="1"/>
-          </p:cNvSpPr>
-          <p:nvPr>
-            <p:ph type="title"/>
-          </p:nvPr>
-        </p:nvSpPr>
-        <p:spPr>
-          <a:xfrm>
-            <a:off x="492370" y="516835"/>
-            <a:ext cx="3084844" cy="2103875"/>
-          </a:xfrm>
-        </p:spPr>
-        <p:txBody>
-          <a:bodyPr>
-            <a:normAutofit/>
-          </a:bodyPr>
+            <a:r>
+              <a:rPr lang="en-US" dirty="0"/>
+              <a:t>What is polymorphism?</a:t>
+            </a:r>
+          </a:p>
+        </p:txBody>
+      </p:sp>
+      <p:sp>
+        <p:nvSpPr>
+          <p:cNvPr id="3" name="Content Placeholder 2"/>
+          <p:cNvSpPr>
+            <a:spLocks noGrp="1"/>
+          </p:cNvSpPr>
+          <p:nvPr>
+            <p:ph idx="1"/>
+          </p:nvPr>
+        </p:nvSpPr>
+        <p:spPr/>
+        <p:txBody>
+          <a:bodyPr/>
           <a:lstStyle/>
           <a:p>
             <a:r>
-              <a:rPr lang="en-US" sz="3600">
-                <a:solidFill>
-                  <a:srgbClr val="FFFFFF"/>
-                </a:solidFill>
-              </a:rPr>
-              <a:t>Overloading</a:t>
-            </a:r>
-          </a:p>
-        </p:txBody>
-      </p:sp>
-      <p:sp>
-        <p:nvSpPr>
-          <p:cNvPr id="3" name="Content Placeholder 2"/>
-          <p:cNvSpPr>
-            <a:spLocks noGrp="1"/>
-          </p:cNvSpPr>
-          <p:nvPr>
-            <p:ph idx="1"/>
-          </p:nvPr>
-        </p:nvSpPr>
-        <p:spPr>
-          <a:xfrm>
-            <a:off x="492371" y="2653800"/>
-            <a:ext cx="3084844" cy="3335519"/>
-          </a:xfrm>
-        </p:spPr>
-        <p:txBody>
-          <a:bodyPr>
-            <a:normAutofit/>
-          </a:bodyPr>
-          <a:lstStyle/>
-          <a:p>
-            <a:r>
-              <a:rPr lang="en-US" sz="1500" dirty="0" smtClean="0">
-                <a:solidFill>
-                  <a:srgbClr val="FFFFFF"/>
-                </a:solidFill>
-              </a:rPr>
-              <a:t>Overloading is </a:t>
-            </a:r>
-            <a:r>
-              <a:rPr lang="en-US" sz="1500" dirty="0">
-                <a:solidFill>
-                  <a:srgbClr val="FFFFFF"/>
-                </a:solidFill>
-              </a:rPr>
-              <a:t>when a class has a method with the same </a:t>
-            </a:r>
-            <a:r>
-              <a:rPr lang="en-US" sz="1500" dirty="0" smtClean="0">
-                <a:solidFill>
-                  <a:srgbClr val="FFFFFF"/>
-                </a:solidFill>
-              </a:rPr>
-              <a:t>signature and return type, but different parameters. It is common to see overloads calling other overloads with different parameters. </a:t>
-            </a:r>
-          </a:p>
-          <a:p>
-            <a:r>
-              <a:rPr lang="en-US" sz="1500" dirty="0" smtClean="0">
-                <a:solidFill>
-                  <a:srgbClr val="FFFFFF"/>
-                </a:solidFill>
-              </a:rPr>
-              <a:t>Here, we see how a Dog has two </a:t>
-            </a:r>
-            <a:r>
-              <a:rPr lang="en-US" sz="1500" i="1" dirty="0" err="1" smtClean="0">
-                <a:solidFill>
-                  <a:srgbClr val="FFFFFF"/>
-                </a:solidFill>
-              </a:rPr>
-              <a:t>DoTrick</a:t>
-            </a:r>
-            <a:r>
-              <a:rPr lang="en-US" sz="1500" dirty="0" smtClean="0">
-                <a:solidFill>
-                  <a:srgbClr val="FFFFFF"/>
-                </a:solidFill>
-              </a:rPr>
-              <a:t> overloads: one of them has no particular trick specified, while one of them allows you to specify which trick to have the dog perform.</a:t>
-            </a:r>
+              <a:rPr lang="en-US" dirty="0"/>
+              <a:t>Polymorphism is the concept of your classes using the same name to represent the same action occurring, but in different ways. This comes in two forms: overriding, and </a:t>
+            </a:r>
+            <a:r>
+              <a:rPr lang="en-US" dirty="0" smtClean="0"/>
+              <a:t>overloading</a:t>
+            </a:r>
+          </a:p>
+          <a:p>
+            <a:endParaRPr lang="en-US" dirty="0"/>
           </a:p>
         </p:txBody>
       </p:sp>
     </p:spTree>
     <p:extLst>
       <p:ext uri="{BB962C8B-B14F-4D97-AF65-F5344CB8AC3E}">
-        <p14:creationId xmlns:p14="http://schemas.microsoft.com/office/powerpoint/2010/main" val="4055466655"/>
+        <p14:creationId xmlns:p14="http://schemas.microsoft.com/office/powerpoint/2010/main" val="1666164392"/>
       </p:ext>
     </p:extLst>
   </p:cSld>
@@ -5609,8 +5995,8 @@
         </p:blipFill>
         <p:spPr>
           <a:xfrm>
-            <a:off x="4742017" y="1746474"/>
-            <a:ext cx="6798082" cy="3365051"/>
+            <a:off x="5791393" y="640080"/>
+            <a:ext cx="4699329" cy="5577840"/>
           </a:xfrm>
           <a:prstGeom prst="rect">
             <a:avLst/>
@@ -5645,7 +6031,7 @@
                   <a:srgbClr val="FFFFFF"/>
                 </a:solidFill>
               </a:rPr>
-              <a:t>Overriding</a:t>
+              <a:t>Overloading</a:t>
             </a:r>
           </a:p>
         </p:txBody>
@@ -5672,112 +6058,55 @@
           </a:bodyPr>
           <a:lstStyle/>
           <a:p>
-            <a:pPr>
-              <a:lnSpc>
-                <a:spcPct val="70000"/>
-              </a:lnSpc>
-            </a:pPr>
-            <a:r>
-              <a:rPr lang="en-US" sz="1300" dirty="0" smtClean="0">
+            <a:r>
+              <a:rPr lang="en-US" sz="1500" dirty="0" smtClean="0">
                 <a:solidFill>
                   <a:srgbClr val="FFFFFF"/>
                 </a:solidFill>
               </a:rPr>
-              <a:t>Overriding </a:t>
-            </a:r>
-            <a:r>
-              <a:rPr lang="en-US" sz="1300" dirty="0">
+              <a:t>Overloading is </a:t>
+            </a:r>
+            <a:r>
+              <a:rPr lang="en-US" sz="1500" dirty="0">
                 <a:solidFill>
                   <a:srgbClr val="FFFFFF"/>
                 </a:solidFill>
               </a:rPr>
-              <a:t>is when a child class makes a method that overrides a parent class's version of the same </a:t>
-            </a:r>
-            <a:r>
-              <a:rPr lang="en-US" sz="1300" dirty="0" smtClean="0">
+              <a:t>when a class has a method with the same </a:t>
+            </a:r>
+            <a:r>
+              <a:rPr lang="en-US" sz="1500" dirty="0" smtClean="0">
                 <a:solidFill>
                   <a:srgbClr val="FFFFFF"/>
                 </a:solidFill>
               </a:rPr>
-              <a:t>method. </a:t>
-            </a:r>
-          </a:p>
-          <a:p>
-            <a:pPr>
-              <a:lnSpc>
-                <a:spcPct val="70000"/>
-              </a:lnSpc>
-            </a:pPr>
-            <a:r>
-              <a:rPr lang="en-US" sz="1300" dirty="0" smtClean="0">
+              <a:t>signature and return type, but different parameters. It is common to see overloads calling other overloads with different parameters. </a:t>
+            </a:r>
+          </a:p>
+          <a:p>
+            <a:r>
+              <a:rPr lang="en-US" sz="1500" dirty="0" smtClean="0">
                 <a:solidFill>
                   <a:srgbClr val="FFFFFF"/>
                 </a:solidFill>
               </a:rPr>
-              <a:t>Even if we override a method on our child class, inside of our class we can actually still call our parent methods by using the </a:t>
-            </a:r>
-            <a:r>
-              <a:rPr lang="en-US" sz="1300" i="1" dirty="0" smtClean="0">
+              <a:t>Here, we see how a Dog has two </a:t>
+            </a:r>
+            <a:r>
+              <a:rPr lang="en-US" sz="1500" i="1" dirty="0" err="1" smtClean="0">
                 <a:solidFill>
                   <a:srgbClr val="FFFFFF"/>
                 </a:solidFill>
               </a:rPr>
-              <a:t>base</a:t>
-            </a:r>
-            <a:r>
-              <a:rPr lang="en-US" sz="1300" dirty="0" smtClean="0">
+              <a:t>DoTrick</a:t>
+            </a:r>
+            <a:r>
+              <a:rPr lang="en-US" sz="1500" dirty="0" smtClean="0">
                 <a:solidFill>
                   <a:srgbClr val="FFFFFF"/>
                 </a:solidFill>
               </a:rPr>
-              <a:t> reference. </a:t>
-            </a:r>
-          </a:p>
-          <a:p>
-            <a:pPr>
-              <a:lnSpc>
-                <a:spcPct val="70000"/>
-              </a:lnSpc>
-            </a:pPr>
-            <a:r>
-              <a:rPr lang="en-US" sz="1300" dirty="0" smtClean="0">
-                <a:solidFill>
-                  <a:srgbClr val="FFFFFF"/>
-                </a:solidFill>
-              </a:rPr>
-              <a:t>We see this in most of our animals. This demonstration can be found in </a:t>
-            </a:r>
-            <a:r>
-              <a:rPr lang="en-US" sz="1300" i="1" dirty="0" err="1" smtClean="0">
-                <a:solidFill>
-                  <a:srgbClr val="FFFFFF"/>
-                </a:solidFill>
-              </a:rPr>
-              <a:t>Parrot.cs</a:t>
-            </a:r>
-            <a:r>
-              <a:rPr lang="en-US" sz="1300" dirty="0" smtClean="0">
-                <a:solidFill>
-                  <a:srgbClr val="FFFFFF"/>
-                </a:solidFill>
-              </a:rPr>
-              <a:t>, where the Parrot will only eat if it’s their </a:t>
-            </a:r>
-            <a:r>
-              <a:rPr lang="en-US" sz="1300" dirty="0" err="1" smtClean="0">
-                <a:solidFill>
-                  <a:srgbClr val="FFFFFF"/>
-                </a:solidFill>
-              </a:rPr>
-              <a:t>prefered</a:t>
-            </a:r>
-            <a:r>
-              <a:rPr lang="en-US" sz="1300" dirty="0" smtClean="0">
-                <a:solidFill>
-                  <a:srgbClr val="FFFFFF"/>
-                </a:solidFill>
-              </a:rPr>
-              <a:t> food.</a:t>
+              <a:t> overloads: one of them has no particular trick specified, while one of them allows you to specify which trick to have the dog perform.</a:t>
             </a:r>
           </a:p>
         </p:txBody>
@@ -5785,7 +6114,7 @@
     </p:spTree>
     <p:extLst>
       <p:ext uri="{BB962C8B-B14F-4D97-AF65-F5344CB8AC3E}">
-        <p14:creationId xmlns:p14="http://schemas.microsoft.com/office/powerpoint/2010/main" val="3989909902"/>
+        <p14:creationId xmlns:p14="http://schemas.microsoft.com/office/powerpoint/2010/main" val="4055466655"/>
       </p:ext>
     </p:extLst>
   </p:cSld>
@@ -5812,6 +6141,374 @@
           <a:chExt cx="0" cy="0"/>
         </a:xfrm>
       </p:grpSpPr>
+      <p:sp useBgFill="1">
+        <p:nvSpPr>
+          <p:cNvPr id="8" name="Rectangle 7"/>
+          <p:cNvSpPr>
+            <a:spLocks noGrp="1" noRot="1" noChangeAspect="1" noMove="1" noResize="1" noEditPoints="1" noAdjustHandles="1" noChangeArrowheads="1" noChangeShapeType="1" noTextEdit="1"/>
+          </p:cNvSpPr>
+          <p:nvPr>
+            <p:extLst>
+              <p:ext uri="{386F3935-93C4-4BCD-93E2-E3B085C9AB24}">
+                <p16:designElem xmlns:p16="http://schemas.microsoft.com/office/powerpoint/2015/main" val="1"/>
+              </p:ext>
+            </p:extLst>
+          </p:nvPr>
+        </p:nvSpPr>
+        <p:spPr>
+          <a:xfrm>
+            <a:off x="0" y="0"/>
+            <a:ext cx="12186315" cy="6858000"/>
+          </a:xfrm>
+          <a:prstGeom prst="rect">
+            <a:avLst/>
+          </a:prstGeom>
+          <a:ln>
+            <a:noFill/>
+          </a:ln>
+        </p:spPr>
+        <p:style>
+          <a:lnRef idx="2">
+            <a:schemeClr val="accent6">
+              <a:shade val="50000"/>
+            </a:schemeClr>
+          </a:lnRef>
+          <a:fillRef idx="1001">
+            <a:schemeClr val="lt1"/>
+          </a:fillRef>
+          <a:effectRef idx="0">
+            <a:schemeClr val="accent6"/>
+          </a:effectRef>
+          <a:fontRef idx="minor">
+            <a:schemeClr val="lt1"/>
+          </a:fontRef>
+        </p:style>
+        <p:txBody>
+          <a:bodyPr rtlCol="0" anchor="ctr"/>
+          <a:lstStyle/>
+          <a:p>
+            <a:pPr algn="ctr"/>
+            <a:endParaRPr lang="en-US"/>
+          </a:p>
+        </p:txBody>
+      </p:sp>
+      <p:sp>
+        <p:nvSpPr>
+          <p:cNvPr id="10" name="Rectangle 9"/>
+          <p:cNvSpPr>
+            <a:spLocks noGrp="1" noRot="1" noChangeAspect="1" noMove="1" noResize="1" noEditPoints="1" noAdjustHandles="1" noChangeArrowheads="1" noChangeShapeType="1" noTextEdit="1"/>
+          </p:cNvSpPr>
+          <p:nvPr>
+            <p:extLst>
+              <p:ext uri="{386F3935-93C4-4BCD-93E2-E3B085C9AB24}">
+                <p16:designElem xmlns:p16="http://schemas.microsoft.com/office/powerpoint/2015/main" val="1"/>
+              </p:ext>
+            </p:extLst>
+          </p:nvPr>
+        </p:nvSpPr>
+        <p:spPr>
+          <a:xfrm>
+            <a:off x="16" y="0"/>
+            <a:ext cx="4050791" cy="6858000"/>
+          </a:xfrm>
+          <a:prstGeom prst="rect">
+            <a:avLst/>
+          </a:prstGeom>
+          <a:solidFill>
+            <a:schemeClr val="accent2"/>
+          </a:solidFill>
+          <a:ln>
+            <a:noFill/>
+          </a:ln>
+        </p:spPr>
+        <p:style>
+          <a:lnRef idx="2">
+            <a:schemeClr val="accent1">
+              <a:shade val="50000"/>
+            </a:schemeClr>
+          </a:lnRef>
+          <a:fillRef idx="1">
+            <a:schemeClr val="accent1"/>
+          </a:fillRef>
+          <a:effectRef idx="0">
+            <a:schemeClr val="accent1"/>
+          </a:effectRef>
+          <a:fontRef idx="minor">
+            <a:schemeClr val="lt1"/>
+          </a:fontRef>
+        </p:style>
+      </p:sp>
+      <p:sp>
+        <p:nvSpPr>
+          <p:cNvPr id="12" name="Rectangle 11"/>
+          <p:cNvSpPr>
+            <a:spLocks noGrp="1" noRot="1" noChangeAspect="1" noMove="1" noResize="1" noEditPoints="1" noAdjustHandles="1" noChangeArrowheads="1" noChangeShapeType="1" noTextEdit="1"/>
+          </p:cNvSpPr>
+          <p:nvPr>
+            <p:extLst>
+              <p:ext uri="{386F3935-93C4-4BCD-93E2-E3B085C9AB24}">
+                <p16:designElem xmlns:p16="http://schemas.microsoft.com/office/powerpoint/2015/main" val="1"/>
+              </p:ext>
+            </p:extLst>
+          </p:nvPr>
+        </p:nvSpPr>
+        <p:spPr>
+          <a:xfrm>
+            <a:off x="4040071" y="0"/>
+            <a:ext cx="64008" cy="6858000"/>
+          </a:xfrm>
+          <a:prstGeom prst="rect">
+            <a:avLst/>
+          </a:prstGeom>
+          <a:solidFill>
+            <a:schemeClr val="accent1"/>
+          </a:solidFill>
+          <a:ln>
+            <a:noFill/>
+          </a:ln>
+        </p:spPr>
+        <p:style>
+          <a:lnRef idx="2">
+            <a:schemeClr val="accent1">
+              <a:shade val="50000"/>
+            </a:schemeClr>
+          </a:lnRef>
+          <a:fillRef idx="1">
+            <a:schemeClr val="accent1"/>
+          </a:fillRef>
+          <a:effectRef idx="0">
+            <a:schemeClr val="accent1"/>
+          </a:effectRef>
+          <a:fontRef idx="minor">
+            <a:schemeClr val="lt1"/>
+          </a:fontRef>
+        </p:style>
+      </p:sp>
+      <p:pic>
+        <p:nvPicPr>
+          <p:cNvPr id="4" name="Picture 3"/>
+          <p:cNvPicPr>
+            <a:picLocks noChangeAspect="1"/>
+          </p:cNvPicPr>
+          <p:nvPr/>
+        </p:nvPicPr>
+        <p:blipFill>
+          <a:blip r:embed="rId2">
+            <a:extLst>
+              <a:ext uri="{28A0092B-C50C-407E-A947-70E740481C1C}">
+                <a14:useLocalDpi xmlns:a14="http://schemas.microsoft.com/office/drawing/2010/main" val="0"/>
+              </a:ext>
+            </a:extLst>
+          </a:blip>
+          <a:stretch>
+            <a:fillRect/>
+          </a:stretch>
+        </p:blipFill>
+        <p:spPr>
+          <a:xfrm>
+            <a:off x="4742017" y="1746474"/>
+            <a:ext cx="6798082" cy="3365051"/>
+          </a:xfrm>
+          <a:prstGeom prst="rect">
+            <a:avLst/>
+          </a:prstGeom>
+        </p:spPr>
+      </p:pic>
+      <p:sp>
+        <p:nvSpPr>
+          <p:cNvPr id="2" name="Title 1"/>
+          <p:cNvSpPr>
+            <a:spLocks noGrp="1"/>
+          </p:cNvSpPr>
+          <p:nvPr>
+            <p:ph type="title"/>
+          </p:nvPr>
+        </p:nvSpPr>
+        <p:spPr>
+          <a:xfrm>
+            <a:off x="492370" y="516835"/>
+            <a:ext cx="3084844" cy="2103875"/>
+          </a:xfrm>
+        </p:spPr>
+        <p:txBody>
+          <a:bodyPr>
+            <a:normAutofit/>
+          </a:bodyPr>
+          <a:lstStyle/>
+          <a:p>
+            <a:r>
+              <a:rPr lang="en-US" sz="3600">
+                <a:solidFill>
+                  <a:srgbClr val="FFFFFF"/>
+                </a:solidFill>
+              </a:rPr>
+              <a:t>Overriding</a:t>
+            </a:r>
+          </a:p>
+        </p:txBody>
+      </p:sp>
+      <p:sp>
+        <p:nvSpPr>
+          <p:cNvPr id="3" name="Content Placeholder 2"/>
+          <p:cNvSpPr>
+            <a:spLocks noGrp="1"/>
+          </p:cNvSpPr>
+          <p:nvPr>
+            <p:ph idx="1"/>
+          </p:nvPr>
+        </p:nvSpPr>
+        <p:spPr>
+          <a:xfrm>
+            <a:off x="492371" y="2653800"/>
+            <a:ext cx="3084844" cy="3335519"/>
+          </a:xfrm>
+        </p:spPr>
+        <p:txBody>
+          <a:bodyPr>
+            <a:normAutofit/>
+          </a:bodyPr>
+          <a:lstStyle/>
+          <a:p>
+            <a:pPr>
+              <a:lnSpc>
+                <a:spcPct val="70000"/>
+              </a:lnSpc>
+            </a:pPr>
+            <a:r>
+              <a:rPr lang="en-US" sz="1300" dirty="0" smtClean="0">
+                <a:solidFill>
+                  <a:srgbClr val="FFFFFF"/>
+                </a:solidFill>
+              </a:rPr>
+              <a:t>Overriding </a:t>
+            </a:r>
+            <a:r>
+              <a:rPr lang="en-US" sz="1300" dirty="0">
+                <a:solidFill>
+                  <a:srgbClr val="FFFFFF"/>
+                </a:solidFill>
+              </a:rPr>
+              <a:t>is when a child class makes a method that overrides a parent class's version of the same </a:t>
+            </a:r>
+            <a:r>
+              <a:rPr lang="en-US" sz="1300" dirty="0" smtClean="0">
+                <a:solidFill>
+                  <a:srgbClr val="FFFFFF"/>
+                </a:solidFill>
+              </a:rPr>
+              <a:t>method. </a:t>
+            </a:r>
+          </a:p>
+          <a:p>
+            <a:pPr>
+              <a:lnSpc>
+                <a:spcPct val="70000"/>
+              </a:lnSpc>
+            </a:pPr>
+            <a:r>
+              <a:rPr lang="en-US" sz="1300" dirty="0" smtClean="0">
+                <a:solidFill>
+                  <a:srgbClr val="FFFFFF"/>
+                </a:solidFill>
+              </a:rPr>
+              <a:t>Even if we override a method on our child class, inside of our class we can actually still call our parent methods by using the </a:t>
+            </a:r>
+            <a:r>
+              <a:rPr lang="en-US" sz="1300" i="1" dirty="0" smtClean="0">
+                <a:solidFill>
+                  <a:srgbClr val="FFFFFF"/>
+                </a:solidFill>
+              </a:rPr>
+              <a:t>base</a:t>
+            </a:r>
+            <a:r>
+              <a:rPr lang="en-US" sz="1300" dirty="0" smtClean="0">
+                <a:solidFill>
+                  <a:srgbClr val="FFFFFF"/>
+                </a:solidFill>
+              </a:rPr>
+              <a:t> reference. </a:t>
+            </a:r>
+          </a:p>
+          <a:p>
+            <a:pPr>
+              <a:lnSpc>
+                <a:spcPct val="70000"/>
+              </a:lnSpc>
+            </a:pPr>
+            <a:r>
+              <a:rPr lang="en-US" sz="1300" dirty="0" smtClean="0">
+                <a:solidFill>
+                  <a:srgbClr val="FFFFFF"/>
+                </a:solidFill>
+              </a:rPr>
+              <a:t>We see this in most of our animals. This demonstration can be found in </a:t>
+            </a:r>
+            <a:r>
+              <a:rPr lang="en-US" sz="1300" i="1" dirty="0" err="1" smtClean="0">
+                <a:solidFill>
+                  <a:srgbClr val="FFFFFF"/>
+                </a:solidFill>
+              </a:rPr>
+              <a:t>Parrot.cs</a:t>
+            </a:r>
+            <a:r>
+              <a:rPr lang="en-US" sz="1300" dirty="0" smtClean="0">
+                <a:solidFill>
+                  <a:srgbClr val="FFFFFF"/>
+                </a:solidFill>
+              </a:rPr>
+              <a:t>, where the Parrot will only eat if it’s their </a:t>
+            </a:r>
+            <a:r>
+              <a:rPr lang="en-US" sz="1300" dirty="0" err="1" smtClean="0">
+                <a:solidFill>
+                  <a:srgbClr val="FFFFFF"/>
+                </a:solidFill>
+              </a:rPr>
+              <a:t>prefered</a:t>
+            </a:r>
+            <a:r>
+              <a:rPr lang="en-US" sz="1300" dirty="0" smtClean="0">
+                <a:solidFill>
+                  <a:srgbClr val="FFFFFF"/>
+                </a:solidFill>
+              </a:rPr>
+              <a:t> food.</a:t>
+            </a:r>
+          </a:p>
+        </p:txBody>
+      </p:sp>
+    </p:spTree>
+    <p:extLst>
+      <p:ext uri="{BB962C8B-B14F-4D97-AF65-F5344CB8AC3E}">
+        <p14:creationId xmlns:p14="http://schemas.microsoft.com/office/powerpoint/2010/main" val="3989909902"/>
+      </p:ext>
+    </p:extLst>
+  </p:cSld>
+  <p:clrMapOvr>
+    <a:masterClrMapping/>
+  </p:clrMapOvr>
+</p:sld>
+</file>
+
+<file path=ppt/slides/slide18.xml><?xml version="1.0" encoding="utf-8"?>
+<p:sld xmlns:a="http://schemas.openxmlformats.org/drawingml/2006/main" xmlns:r="http://schemas.openxmlformats.org/officeDocument/2006/relationships" xmlns:p="http://schemas.openxmlformats.org/presentationml/2006/main">
+  <p:cSld>
+    <p:spTree>
+      <p:nvGrpSpPr>
+        <p:cNvPr id="1" name=""/>
+        <p:cNvGrpSpPr/>
+        <p:nvPr/>
+      </p:nvGrpSpPr>
+      <p:grpSpPr>
+        <a:xfrm>
+          <a:off x="0" y="0"/>
+          <a:ext cx="0" cy="0"/>
+          <a:chOff x="0" y="0"/>
+          <a:chExt cx="0" cy="0"/>
+        </a:xfrm>
+      </p:grpSpPr>
       <p:sp>
         <p:nvSpPr>
           <p:cNvPr id="2" name="Title 1"/>
@@ -5876,7 +6573,7 @@
 </p:sld>
 </file>
 
-<file path=ppt/slides/slide18.xml><?xml version="1.0" encoding="utf-8"?>
+<file path=ppt/slides/slide19.xml><?xml version="1.0" encoding="utf-8"?>
 <p:sld xmlns:a="http://schemas.openxmlformats.org/drawingml/2006/main" xmlns:r="http://schemas.openxmlformats.org/officeDocument/2006/relationships" xmlns:p="http://schemas.openxmlformats.org/presentationml/2006/main">
   <p:cSld>
     <p:spTree>
@@ -6217,7 +6914,6 @@
               <a:rPr lang="en-US" dirty="0" smtClean="0"/>
               <a:t>and how it interacts with itself, and other objects.</a:t>
             </a:r>
-            <a:endParaRPr lang="en-US" dirty="0" smtClean="0"/>
           </a:p>
           <a:p>
             <a:r>
@@ -6377,7 +7073,6 @@
               <a:rPr lang="en-US" dirty="0" smtClean="0"/>
               <a:t>: hiding internal logic that the outside world does not care about</a:t>
             </a:r>
-            <a:endParaRPr lang="en-US" dirty="0" smtClean="0"/>
           </a:p>
           <a:p>
             <a:r>
@@ -6388,7 +7083,6 @@
               <a:rPr lang="en-US" dirty="0" smtClean="0"/>
               <a:t>: objects can be based off other objects</a:t>
             </a:r>
-            <a:endParaRPr lang="en-US" dirty="0" smtClean="0"/>
           </a:p>
           <a:p>
             <a:r>
@@ -6823,11 +7517,6 @@
               </a:rPr>
               <a:t> in order to see how we’d define an interface for our animal.</a:t>
             </a:r>
-            <a:endParaRPr lang="en-US" sz="1800" dirty="0" smtClean="0">
-              <a:solidFill>
-                <a:srgbClr val="FFFFFF"/>
-              </a:solidFill>
-            </a:endParaRPr>
           </a:p>
           <a:p>
             <a:endParaRPr lang="en-US" sz="1800" dirty="0">
@@ -7084,13 +7773,8 @@
             </a:r>
             <a:r>
               <a:rPr lang="en-US" dirty="0" smtClean="0"/>
-              <a:t>method for an abstraction of that!</a:t>
-            </a:r>
-            <a:r>
-              <a:rPr lang="en-US" dirty="0" smtClean="0"/>
-              <a:t>)</a:t>
-            </a:r>
-            <a:endParaRPr lang="en-US" dirty="0" smtClean="0"/>
+              <a:t>method for an abstraction of that!)</a:t>
+            </a:r>
           </a:p>
           <a:p>
             <a:r>
@@ -7824,15 +8508,7 @@
                   <a:srgbClr val="FFFFFF"/>
                 </a:solidFill>
               </a:rPr>
-              <a:t>As such, it must implement all methods and all properties from all thos</a:t>
-            </a:r>
-            <a:r>
-              <a:rPr lang="en-US" sz="1500" dirty="0" smtClean="0">
-                <a:solidFill>
-                  <a:srgbClr val="FFFFFF"/>
-                </a:solidFill>
-              </a:rPr>
-              <a:t>e interfaces.</a:t>
+              <a:t>As such, it must implement all methods and all properties from all those interfaces.</a:t>
             </a:r>
             <a:endParaRPr lang="en-US" sz="1500" dirty="0">
               <a:solidFill>

</xml_diff>

<commit_message>
Fixed typo in ctor slide
</commit_message>
<xml_diff>
--- a/presentation.pptx
+++ b/presentation.pptx
@@ -4820,6 +4820,27 @@
               </a:rPr>
               <a:t>We often pass data about the instance of that class into the constructor, so that we can setup </a:t>
             </a:r>
+            <a:r>
+              <a:rPr lang="en-US" sz="1500" dirty="0" smtClean="0">
+                <a:solidFill>
+                  <a:srgbClr val="FFFFFF"/>
+                </a:solidFill>
+              </a:rPr>
+              <a:t>that instance </a:t>
+            </a:r>
+            <a:r>
+              <a:rPr lang="en-US" sz="1500" smtClean="0">
+                <a:solidFill>
+                  <a:srgbClr val="FFFFFF"/>
+                </a:solidFill>
+              </a:rPr>
+              <a:t>with relevant data.</a:t>
+            </a:r>
+            <a:endParaRPr lang="en-US" sz="1500" dirty="0" smtClean="0">
+              <a:solidFill>
+                <a:srgbClr val="FFFFFF"/>
+              </a:solidFill>
+            </a:endParaRPr>
           </a:p>
           <a:p>
             <a:r>

</xml_diff>

<commit_message>
Updated instructions for OSX
</commit_message>
<xml_diff>
--- a/presentation.pptx
+++ b/presentation.pptx
@@ -4826,15 +4826,7 @@
                   <a:srgbClr val="FFFFFF"/>
                 </a:solidFill>
               </a:rPr>
-              <a:t>that instance </a:t>
-            </a:r>
-            <a:r>
-              <a:rPr lang="en-US" sz="1500" smtClean="0">
-                <a:solidFill>
-                  <a:srgbClr val="FFFFFF"/>
-                </a:solidFill>
-              </a:rPr>
-              <a:t>with relevant data.</a:t>
+              <a:t>that instance with relevant data.</a:t>
             </a:r>
             <a:endParaRPr lang="en-US" sz="1500" dirty="0" smtClean="0">
               <a:solidFill>

</xml_diff>

<commit_message>
Cleared up abstract class explanation in inheritance slide
</commit_message>
<xml_diff>
--- a/presentation.pptx
+++ b/presentation.pptx
@@ -5755,11 +5755,15 @@
             </a:r>
             <a:r>
               <a:rPr lang="en-US" dirty="0" err="1" smtClean="0"/>
-              <a:t>AddHoby</a:t>
+              <a:t>AddHobby</a:t>
             </a:r>
             <a:r>
               <a:rPr lang="en-US" dirty="0" smtClean="0"/>
-              <a:t>(string hobby): will add an entry to the set of hobbies</a:t>
+              <a:t>(string </a:t>
+            </a:r>
+            <a:r>
+              <a:rPr lang="en-US" dirty="0" smtClean="0"/>
+              <a:t>hobby): will add an entry to the set of hobbies</a:t>
             </a:r>
           </a:p>
           <a:p>
@@ -5905,7 +5909,7 @@
       </p:grpSpPr>
       <p:sp useBgFill="1">
         <p:nvSpPr>
-          <p:cNvPr id="8" name="Rectangle 7"/>
+          <p:cNvPr id="16" name="Rectangle 15"/>
           <p:cNvSpPr>
             <a:spLocks noGrp="1" noRot="1" noChangeAspect="1" noMove="1" noResize="1" noEditPoints="1" noAdjustHandles="1" noChangeArrowheads="1" noChangeShapeType="1" noTextEdit="1"/>
           </p:cNvSpPr>
@@ -5956,7 +5960,7 @@
       </p:sp>
       <p:sp>
         <p:nvSpPr>
-          <p:cNvPr id="10" name="Rectangle 9"/>
+          <p:cNvPr id="18" name="Rectangle 17"/>
           <p:cNvSpPr>
             <a:spLocks noGrp="1" noRot="1" noChangeAspect="1" noMove="1" noResize="1" noEditPoints="1" noAdjustHandles="1" noChangeArrowheads="1" noChangeShapeType="1" noTextEdit="1"/>
           </p:cNvSpPr>
@@ -6002,7 +6006,7 @@
       </p:sp>
       <p:sp>
         <p:nvSpPr>
-          <p:cNvPr id="12" name="Rectangle 11"/>
+          <p:cNvPr id="20" name="Rectangle 19"/>
           <p:cNvSpPr>
             <a:spLocks noGrp="1" noRot="1" noChangeAspect="1" noMove="1" noResize="1" noEditPoints="1" noAdjustHandles="1" noChangeArrowheads="1" noChangeShapeType="1" noTextEdit="1"/>
           </p:cNvSpPr>
@@ -6088,8 +6092,8 @@
         </p:nvSpPr>
         <p:spPr>
           <a:xfrm>
-            <a:off x="492370" y="516835"/>
-            <a:ext cx="3084844" cy="2103875"/>
+            <a:off x="492370" y="516836"/>
+            <a:ext cx="3084844" cy="1268284"/>
           </a:xfrm>
         </p:spPr>
         <p:txBody>
@@ -6121,8 +6125,8 @@
         </p:nvSpPr>
         <p:spPr>
           <a:xfrm>
-            <a:off x="492371" y="2653800"/>
-            <a:ext cx="3084844" cy="3335519"/>
+            <a:off x="492371" y="1785120"/>
+            <a:ext cx="3084844" cy="4204199"/>
           </a:xfrm>
         </p:spPr>
         <p:txBody>
@@ -6137,7 +6141,7 @@
               </a:lnSpc>
             </a:pPr>
             <a:r>
-              <a:rPr lang="en-US" sz="1400" dirty="0">
+              <a:rPr lang="en-US" sz="1600" dirty="0">
                 <a:solidFill>
                   <a:srgbClr val="FFFFFF"/>
                 </a:solidFill>
@@ -6152,12 +6156,12 @@
               </a:lnSpc>
             </a:pPr>
             <a:r>
-              <a:rPr lang="en-US" sz="1400" dirty="0">
+              <a:rPr lang="en-US" sz="1600" dirty="0">
                 <a:solidFill>
                   <a:srgbClr val="FFFFFF"/>
                 </a:solidFill>
               </a:rPr>
-              <a:t>For example, we can make a class for mammals, and have dogs inherit from that class. Often, we will inherit from abstract or partial classes. </a:t>
+              <a:t>For example, we can make a class for mammals, and have dogs inherit from that class. Often, we will inherit from abstract classes. </a:t>
             </a:r>
           </a:p>
           <a:p>
@@ -6167,12 +6171,12 @@
               </a:lnSpc>
             </a:pPr>
             <a:r>
-              <a:rPr lang="en-US" sz="1400" dirty="0">
+              <a:rPr lang="en-US" sz="1600" dirty="0">
                 <a:solidFill>
                   <a:srgbClr val="FFFFFF"/>
                 </a:solidFill>
               </a:rPr>
-              <a:t>Is is often useful to make an abstract class, which is a "partial class", or to use virtual methods when making a class. You can't make a new instance of an abstract class since it's incomplete, but you can inherit from them and build on top of them.</a:t>
+              <a:t>It is often useful to make an abstract class, which is an ”incomplete class", or to use virtual methods when making a class that will act as a parent class. You can't make a new instance of an abstract class since it's incomplete, but you can inherit from them and build on top of them.</a:t>
             </a:r>
           </a:p>
           <a:p>
@@ -6182,7 +6186,7 @@
               </a:lnSpc>
             </a:pPr>
             <a:r>
-              <a:rPr lang="en-US" sz="1400" dirty="0">
+              <a:rPr lang="en-US" sz="1600" dirty="0">
                 <a:solidFill>
                   <a:srgbClr val="FFFFFF"/>
                 </a:solidFill>
@@ -6190,7 +6194,7 @@
               <a:t>Our Mammal class was an abstract class, and our </a:t>
             </a:r>
             <a:r>
-              <a:rPr lang="en-US" sz="1400" dirty="0" err="1">
+              <a:rPr lang="en-US" sz="1600" dirty="0" err="1">
                 <a:solidFill>
                   <a:srgbClr val="FFFFFF"/>
                 </a:solidFill>
@@ -6198,7 +6202,7 @@
               <a:t>HoneyBadger</a:t>
             </a:r>
             <a:r>
-              <a:rPr lang="en-US" sz="1400" dirty="0">
+              <a:rPr lang="en-US" sz="1600" dirty="0">
                 <a:solidFill>
                   <a:srgbClr val="FFFFFF"/>
                 </a:solidFill>
@@ -6211,20 +6215,13 @@
     </p:spTree>
     <p:extLst>
       <p:ext uri="{BB962C8B-B14F-4D97-AF65-F5344CB8AC3E}">
-        <p14:creationId xmlns:p14="http://schemas.microsoft.com/office/powerpoint/2010/main" val="716345250"/>
+        <p14:creationId xmlns:p14="http://schemas.microsoft.com/office/powerpoint/2010/main" val="2964798596"/>
       </p:ext>
     </p:extLst>
   </p:cSld>
   <p:clrMapOvr>
     <a:masterClrMapping/>
   </p:clrMapOvr>
-  <p:timing>
-    <p:tnLst>
-      <p:par>
-        <p:cTn id="1" dur="indefinite" restart="never" nodeType="tmRoot"/>
-      </p:par>
-    </p:tnLst>
-  </p:timing>
 </p:sld>
 </file>
 

</xml_diff>